<commit_message>
Groupe size & distance
</commit_message>
<xml_diff>
--- a/outputs/Figure_dispersal_probas.pptx
+++ b/outputs/Figure_dispersal_probas.pptx
@@ -5,9 +5,15 @@
     <p:sldMasterId id="2147483648" r:id="rId1"/>
   </p:sldMasterIdLst>
   <p:sldIdLst>
-    <p:sldId id="256" r:id="rId2"/>
-    <p:sldId id="257" r:id="rId3"/>
-    <p:sldId id="258" r:id="rId4"/>
+    <p:sldId id="264" r:id="rId2"/>
+    <p:sldId id="256" r:id="rId3"/>
+    <p:sldId id="259" r:id="rId4"/>
+    <p:sldId id="260" r:id="rId5"/>
+    <p:sldId id="257" r:id="rId6"/>
+    <p:sldId id="258" r:id="rId7"/>
+    <p:sldId id="261" r:id="rId8"/>
+    <p:sldId id="262" r:id="rId9"/>
+    <p:sldId id="263" r:id="rId10"/>
   </p:sldIdLst>
   <p:sldSz cx="12192000" cy="6858000"/>
   <p:notesSz cx="6858000" cy="9144000"/>
@@ -261,7 +267,7 @@
           <a:p>
             <a:fld id="{72B74021-820B-4C79-8184-8F300167CCBF}" type="datetimeFigureOut">
               <a:rPr lang="fr-FR" smtClean="0"/>
-              <a:t>20/09/2023</a:t>
+              <a:t>26/09/2023</a:t>
             </a:fld>
             <a:endParaRPr lang="fr-FR"/>
           </a:p>
@@ -459,7 +465,7 @@
           <a:p>
             <a:fld id="{72B74021-820B-4C79-8184-8F300167CCBF}" type="datetimeFigureOut">
               <a:rPr lang="fr-FR" smtClean="0"/>
-              <a:t>20/09/2023</a:t>
+              <a:t>26/09/2023</a:t>
             </a:fld>
             <a:endParaRPr lang="fr-FR"/>
           </a:p>
@@ -667,7 +673,7 @@
           <a:p>
             <a:fld id="{72B74021-820B-4C79-8184-8F300167CCBF}" type="datetimeFigureOut">
               <a:rPr lang="fr-FR" smtClean="0"/>
-              <a:t>20/09/2023</a:t>
+              <a:t>26/09/2023</a:t>
             </a:fld>
             <a:endParaRPr lang="fr-FR"/>
           </a:p>
@@ -865,7 +871,7 @@
           <a:p>
             <a:fld id="{72B74021-820B-4C79-8184-8F300167CCBF}" type="datetimeFigureOut">
               <a:rPr lang="fr-FR" smtClean="0"/>
-              <a:t>20/09/2023</a:t>
+              <a:t>26/09/2023</a:t>
             </a:fld>
             <a:endParaRPr lang="fr-FR"/>
           </a:p>
@@ -1140,7 +1146,7 @@
           <a:p>
             <a:fld id="{72B74021-820B-4C79-8184-8F300167CCBF}" type="datetimeFigureOut">
               <a:rPr lang="fr-FR" smtClean="0"/>
-              <a:t>20/09/2023</a:t>
+              <a:t>26/09/2023</a:t>
             </a:fld>
             <a:endParaRPr lang="fr-FR"/>
           </a:p>
@@ -1405,7 +1411,7 @@
           <a:p>
             <a:fld id="{72B74021-820B-4C79-8184-8F300167CCBF}" type="datetimeFigureOut">
               <a:rPr lang="fr-FR" smtClean="0"/>
-              <a:t>20/09/2023</a:t>
+              <a:t>26/09/2023</a:t>
             </a:fld>
             <a:endParaRPr lang="fr-FR"/>
           </a:p>
@@ -1817,7 +1823,7 @@
           <a:p>
             <a:fld id="{72B74021-820B-4C79-8184-8F300167CCBF}" type="datetimeFigureOut">
               <a:rPr lang="fr-FR" smtClean="0"/>
-              <a:t>20/09/2023</a:t>
+              <a:t>26/09/2023</a:t>
             </a:fld>
             <a:endParaRPr lang="fr-FR"/>
           </a:p>
@@ -1958,7 +1964,7 @@
           <a:p>
             <a:fld id="{72B74021-820B-4C79-8184-8F300167CCBF}" type="datetimeFigureOut">
               <a:rPr lang="fr-FR" smtClean="0"/>
-              <a:t>20/09/2023</a:t>
+              <a:t>26/09/2023</a:t>
             </a:fld>
             <a:endParaRPr lang="fr-FR"/>
           </a:p>
@@ -2071,7 +2077,7 @@
           <a:p>
             <a:fld id="{72B74021-820B-4C79-8184-8F300167CCBF}" type="datetimeFigureOut">
               <a:rPr lang="fr-FR" smtClean="0"/>
-              <a:t>20/09/2023</a:t>
+              <a:t>26/09/2023</a:t>
             </a:fld>
             <a:endParaRPr lang="fr-FR"/>
           </a:p>
@@ -2382,7 +2388,7 @@
           <a:p>
             <a:fld id="{72B74021-820B-4C79-8184-8F300167CCBF}" type="datetimeFigureOut">
               <a:rPr lang="fr-FR" smtClean="0"/>
-              <a:t>20/09/2023</a:t>
+              <a:t>26/09/2023</a:t>
             </a:fld>
             <a:endParaRPr lang="fr-FR"/>
           </a:p>
@@ -2670,7 +2676,7 @@
           <a:p>
             <a:fld id="{72B74021-820B-4C79-8184-8F300167CCBF}" type="datetimeFigureOut">
               <a:rPr lang="fr-FR" smtClean="0"/>
-              <a:t>20/09/2023</a:t>
+              <a:t>26/09/2023</a:t>
             </a:fld>
             <a:endParaRPr lang="fr-FR"/>
           </a:p>
@@ -2911,7 +2917,7 @@
           <a:p>
             <a:fld id="{72B74021-820B-4C79-8184-8F300167CCBF}" type="datetimeFigureOut">
               <a:rPr lang="fr-FR" smtClean="0"/>
-              <a:t>20/09/2023</a:t>
+              <a:t>26/09/2023</a:t>
             </a:fld>
             <a:endParaRPr lang="fr-FR"/>
           </a:p>
@@ -3330,6 +3336,122 @@
       </p:grpSpPr>
       <p:sp>
         <p:nvSpPr>
+          <p:cNvPr id="2" name="Titre 1">
+            <a:extLst>
+              <a:ext uri="{FF2B5EF4-FFF2-40B4-BE49-F238E27FC236}">
+                <a16:creationId xmlns:a16="http://schemas.microsoft.com/office/drawing/2014/main" id="{A83A85BA-8BF9-4AE7-A568-8BCD408D934D}"/>
+              </a:ext>
+            </a:extLst>
+          </p:cNvPr>
+          <p:cNvSpPr>
+            <a:spLocks noGrp="1"/>
+          </p:cNvSpPr>
+          <p:nvPr>
+            <p:ph type="ctrTitle"/>
+          </p:nvPr>
+        </p:nvSpPr>
+        <p:spPr/>
+        <p:txBody>
+          <a:bodyPr/>
+          <a:lstStyle/>
+          <a:p>
+            <a:endParaRPr lang="fr-FR"/>
+          </a:p>
+        </p:txBody>
+      </p:sp>
+      <p:sp>
+        <p:nvSpPr>
+          <p:cNvPr id="3" name="Sous-titre 2">
+            <a:extLst>
+              <a:ext uri="{FF2B5EF4-FFF2-40B4-BE49-F238E27FC236}">
+                <a16:creationId xmlns:a16="http://schemas.microsoft.com/office/drawing/2014/main" id="{C418E279-1E88-4EBC-8F89-375B9BD8B9F0}"/>
+              </a:ext>
+            </a:extLst>
+          </p:cNvPr>
+          <p:cNvSpPr>
+            <a:spLocks noGrp="1"/>
+          </p:cNvSpPr>
+          <p:nvPr>
+            <p:ph type="subTitle" idx="1"/>
+          </p:nvPr>
+        </p:nvSpPr>
+        <p:spPr/>
+        <p:txBody>
+          <a:bodyPr/>
+          <a:lstStyle/>
+          <a:p>
+            <a:endParaRPr lang="fr-FR"/>
+          </a:p>
+        </p:txBody>
+      </p:sp>
+      <p:pic>
+        <p:nvPicPr>
+          <p:cNvPr id="6" name="Image 5">
+            <a:extLst>
+              <a:ext uri="{FF2B5EF4-FFF2-40B4-BE49-F238E27FC236}">
+                <a16:creationId xmlns:a16="http://schemas.microsoft.com/office/drawing/2014/main" id="{8DE65467-B8BB-40FF-A832-7C93FD8590F9}"/>
+              </a:ext>
+            </a:extLst>
+          </p:cNvPr>
+          <p:cNvPicPr>
+            <a:picLocks noChangeAspect="1"/>
+          </p:cNvPicPr>
+          <p:nvPr/>
+        </p:nvPicPr>
+        <p:blipFill>
+          <a:blip r:embed="rId2">
+            <a:extLst>
+              <a:ext uri="{28A0092B-C50C-407E-A947-70E740481C1C}">
+                <a14:useLocalDpi xmlns:a14="http://schemas.microsoft.com/office/drawing/2010/main" val="0"/>
+              </a:ext>
+            </a:extLst>
+          </a:blip>
+          <a:stretch>
+            <a:fillRect/>
+          </a:stretch>
+        </p:blipFill>
+        <p:spPr>
+          <a:xfrm>
+            <a:off x="381000" y="0"/>
+            <a:ext cx="11430000" cy="6858000"/>
+          </a:xfrm>
+          <a:prstGeom prst="rect">
+            <a:avLst/>
+          </a:prstGeom>
+        </p:spPr>
+      </p:pic>
+    </p:spTree>
+    <p:extLst>
+      <p:ext uri="{BB962C8B-B14F-4D97-AF65-F5344CB8AC3E}">
+        <p14:creationId xmlns:p14="http://schemas.microsoft.com/office/powerpoint/2010/main" val="1362801885"/>
+      </p:ext>
+    </p:extLst>
+  </p:cSld>
+  <p:clrMapOvr>
+    <a:masterClrMapping/>
+  </p:clrMapOvr>
+</p:sld>
+</file>
+
+<file path=ppt/slides/slide2.xml><?xml version="1.0" encoding="utf-8"?>
+<p:sld xmlns:a="http://schemas.openxmlformats.org/drawingml/2006/main" xmlns:r="http://schemas.openxmlformats.org/officeDocument/2006/relationships" xmlns:p="http://schemas.openxmlformats.org/presentationml/2006/main">
+  <p:cSld>
+    <p:spTree>
+      <p:nvGrpSpPr>
+        <p:cNvPr id="1" name=""/>
+        <p:cNvGrpSpPr/>
+        <p:nvPr/>
+      </p:nvGrpSpPr>
+      <p:grpSpPr>
+        <a:xfrm>
+          <a:off x="0" y="0"/>
+          <a:ext cx="0" cy="0"/>
+          <a:chOff x="0" y="0"/>
+          <a:chExt cx="0" cy="0"/>
+        </a:xfrm>
+      </p:grpSpPr>
+      <p:sp>
+        <p:nvSpPr>
           <p:cNvPr id="20" name="Rectangle 19">
             <a:extLst>
               <a:ext uri="{FF2B5EF4-FFF2-40B4-BE49-F238E27FC236}">
@@ -5221,6 +5343,208 @@
           </a:prstGeom>
         </p:spPr>
       </p:pic>
+      <p:sp>
+        <p:nvSpPr>
+          <p:cNvPr id="2" name="ZoneTexte 1">
+            <a:extLst>
+              <a:ext uri="{FF2B5EF4-FFF2-40B4-BE49-F238E27FC236}">
+                <a16:creationId xmlns:a16="http://schemas.microsoft.com/office/drawing/2014/main" id="{A802C23E-C500-4D88-8D97-8BCB19D474F3}"/>
+              </a:ext>
+            </a:extLst>
+          </p:cNvPr>
+          <p:cNvSpPr txBox="1"/>
+          <p:nvPr/>
+        </p:nvSpPr>
+        <p:spPr>
+          <a:xfrm>
+            <a:off x="480853" y="386862"/>
+            <a:ext cx="6491650" cy="584775"/>
+          </a:xfrm>
+          <a:prstGeom prst="rect">
+            <a:avLst/>
+          </a:prstGeom>
+          <a:noFill/>
+        </p:spPr>
+        <p:txBody>
+          <a:bodyPr wrap="square" rtlCol="0">
+            <a:spAutoFit/>
+          </a:bodyPr>
+          <a:lstStyle/>
+          <a:p>
+            <a:r>
+              <a:rPr lang="fr-FR" sz="3200" b="1" dirty="0" err="1"/>
+              <a:t>Modelled</a:t>
+            </a:r>
+            <a:r>
+              <a:rPr lang="fr-FR" sz="3200" b="1" dirty="0"/>
+              <a:t> states</a:t>
+            </a:r>
+          </a:p>
+        </p:txBody>
+      </p:sp>
+      <p:cxnSp>
+        <p:nvCxnSpPr>
+          <p:cNvPr id="6" name="Connecteur droit 5">
+            <a:extLst>
+              <a:ext uri="{FF2B5EF4-FFF2-40B4-BE49-F238E27FC236}">
+                <a16:creationId xmlns:a16="http://schemas.microsoft.com/office/drawing/2014/main" id="{A5C08F3B-7FB9-4451-A610-F773D4898DC1}"/>
+              </a:ext>
+            </a:extLst>
+          </p:cNvPr>
+          <p:cNvCxnSpPr/>
+          <p:nvPr/>
+        </p:nvCxnSpPr>
+        <p:spPr>
+          <a:xfrm>
+            <a:off x="816550" y="5143500"/>
+            <a:ext cx="634181" cy="0"/>
+          </a:xfrm>
+          <a:prstGeom prst="line">
+            <a:avLst/>
+          </a:prstGeom>
+          <a:ln w="28575">
+            <a:solidFill>
+              <a:schemeClr val="tx1"/>
+            </a:solidFill>
+          </a:ln>
+        </p:spPr>
+        <p:style>
+          <a:lnRef idx="1">
+            <a:schemeClr val="accent1"/>
+          </a:lnRef>
+          <a:fillRef idx="0">
+            <a:schemeClr val="accent1"/>
+          </a:fillRef>
+          <a:effectRef idx="0">
+            <a:schemeClr val="accent1"/>
+          </a:effectRef>
+          <a:fontRef idx="minor">
+            <a:schemeClr val="tx1"/>
+          </a:fontRef>
+        </p:style>
+      </p:cxnSp>
+      <p:cxnSp>
+        <p:nvCxnSpPr>
+          <p:cNvPr id="40" name="Connecteur droit 39">
+            <a:extLst>
+              <a:ext uri="{FF2B5EF4-FFF2-40B4-BE49-F238E27FC236}">
+                <a16:creationId xmlns:a16="http://schemas.microsoft.com/office/drawing/2014/main" id="{9032ADBD-3510-44C1-9E19-5539CAB70611}"/>
+              </a:ext>
+            </a:extLst>
+          </p:cNvPr>
+          <p:cNvCxnSpPr/>
+          <p:nvPr/>
+        </p:nvCxnSpPr>
+        <p:spPr>
+          <a:xfrm>
+            <a:off x="816549" y="5700347"/>
+            <a:ext cx="634181" cy="0"/>
+          </a:xfrm>
+          <a:prstGeom prst="line">
+            <a:avLst/>
+          </a:prstGeom>
+          <a:ln w="28575">
+            <a:solidFill>
+              <a:schemeClr val="tx1"/>
+            </a:solidFill>
+            <a:prstDash val="dash"/>
+          </a:ln>
+        </p:spPr>
+        <p:style>
+          <a:lnRef idx="1">
+            <a:schemeClr val="accent1"/>
+          </a:lnRef>
+          <a:fillRef idx="0">
+            <a:schemeClr val="accent1"/>
+          </a:fillRef>
+          <a:effectRef idx="0">
+            <a:schemeClr val="accent1"/>
+          </a:effectRef>
+          <a:fontRef idx="minor">
+            <a:schemeClr val="tx1"/>
+          </a:fontRef>
+        </p:style>
+      </p:cxnSp>
+      <p:sp>
+        <p:nvSpPr>
+          <p:cNvPr id="41" name="ZoneTexte 40">
+            <a:extLst>
+              <a:ext uri="{FF2B5EF4-FFF2-40B4-BE49-F238E27FC236}">
+                <a16:creationId xmlns:a16="http://schemas.microsoft.com/office/drawing/2014/main" id="{8598E8DB-63A1-438B-BCCF-3ECEED937BFD}"/>
+              </a:ext>
+            </a:extLst>
+          </p:cNvPr>
+          <p:cNvSpPr txBox="1"/>
+          <p:nvPr/>
+        </p:nvSpPr>
+        <p:spPr>
+          <a:xfrm>
+            <a:off x="1586326" y="4940740"/>
+            <a:ext cx="2891800" cy="369332"/>
+          </a:xfrm>
+          <a:prstGeom prst="rect">
+            <a:avLst/>
+          </a:prstGeom>
+          <a:noFill/>
+        </p:spPr>
+        <p:txBody>
+          <a:bodyPr wrap="square" rtlCol="0">
+            <a:spAutoFit/>
+          </a:bodyPr>
+          <a:lstStyle/>
+          <a:p>
+            <a:r>
+              <a:rPr lang="fr-FR" dirty="0">
+                <a:latin typeface="Avenir Next LT Pro Light" panose="020B0304020202020204" pitchFamily="34" charset="0"/>
+              </a:rPr>
+              <a:t>First dispersal</a:t>
+            </a:r>
+          </a:p>
+        </p:txBody>
+      </p:sp>
+      <p:sp>
+        <p:nvSpPr>
+          <p:cNvPr id="45" name="ZoneTexte 44">
+            <a:extLst>
+              <a:ext uri="{FF2B5EF4-FFF2-40B4-BE49-F238E27FC236}">
+                <a16:creationId xmlns:a16="http://schemas.microsoft.com/office/drawing/2014/main" id="{806CA812-0F23-4A7E-A0FE-1BF2F0313FF5}"/>
+              </a:ext>
+            </a:extLst>
+          </p:cNvPr>
+          <p:cNvSpPr txBox="1"/>
+          <p:nvPr/>
+        </p:nvSpPr>
+        <p:spPr>
+          <a:xfrm>
+            <a:off x="1572192" y="5494503"/>
+            <a:ext cx="2891800" cy="369332"/>
+          </a:xfrm>
+          <a:prstGeom prst="rect">
+            <a:avLst/>
+          </a:prstGeom>
+          <a:noFill/>
+        </p:spPr>
+        <p:txBody>
+          <a:bodyPr wrap="square" rtlCol="0">
+            <a:spAutoFit/>
+          </a:bodyPr>
+          <a:lstStyle/>
+          <a:p>
+            <a:r>
+              <a:rPr lang="fr-FR" dirty="0" err="1">
+                <a:latin typeface="Avenir Next LT Pro Light" panose="020B0304020202020204" pitchFamily="34" charset="0"/>
+              </a:rPr>
+              <a:t>Secondary</a:t>
+            </a:r>
+            <a:r>
+              <a:rPr lang="fr-FR" dirty="0">
+                <a:latin typeface="Avenir Next LT Pro Light" panose="020B0304020202020204" pitchFamily="34" charset="0"/>
+              </a:rPr>
+              <a:t> dispersal</a:t>
+            </a:r>
+          </a:p>
+        </p:txBody>
+      </p:sp>
     </p:spTree>
     <p:extLst>
       <p:ext uri="{BB962C8B-B14F-4D97-AF65-F5344CB8AC3E}">
@@ -5234,7 +5558,3209 @@
 </p:sld>
 </file>
 
-<file path=ppt/slides/slide2.xml><?xml version="1.0" encoding="utf-8"?>
+<file path=ppt/slides/slide3.xml><?xml version="1.0" encoding="utf-8"?>
+<p:sld xmlns:a="http://schemas.openxmlformats.org/drawingml/2006/main" xmlns:r="http://schemas.openxmlformats.org/officeDocument/2006/relationships" xmlns:p="http://schemas.openxmlformats.org/presentationml/2006/main">
+  <p:cSld>
+    <p:spTree>
+      <p:nvGrpSpPr>
+        <p:cNvPr id="1" name=""/>
+        <p:cNvGrpSpPr/>
+        <p:nvPr/>
+      </p:nvGrpSpPr>
+      <p:grpSpPr>
+        <a:xfrm>
+          <a:off x="0" y="0"/>
+          <a:ext cx="0" cy="0"/>
+          <a:chOff x="0" y="0"/>
+          <a:chExt cx="0" cy="0"/>
+        </a:xfrm>
+      </p:grpSpPr>
+      <p:sp>
+        <p:nvSpPr>
+          <p:cNvPr id="2" name="Titre 1">
+            <a:extLst>
+              <a:ext uri="{FF2B5EF4-FFF2-40B4-BE49-F238E27FC236}">
+                <a16:creationId xmlns:a16="http://schemas.microsoft.com/office/drawing/2014/main" id="{F1E60462-D522-4CB1-9FD3-322C7934CDF2}"/>
+              </a:ext>
+            </a:extLst>
+          </p:cNvPr>
+          <p:cNvSpPr>
+            <a:spLocks noGrp="1"/>
+          </p:cNvSpPr>
+          <p:nvPr>
+            <p:ph type="ctrTitle"/>
+          </p:nvPr>
+        </p:nvSpPr>
+        <p:spPr/>
+        <p:txBody>
+          <a:bodyPr/>
+          <a:lstStyle/>
+          <a:p>
+            <a:endParaRPr lang="fr-FR"/>
+          </a:p>
+        </p:txBody>
+      </p:sp>
+      <p:sp>
+        <p:nvSpPr>
+          <p:cNvPr id="3" name="Sous-titre 2">
+            <a:extLst>
+              <a:ext uri="{FF2B5EF4-FFF2-40B4-BE49-F238E27FC236}">
+                <a16:creationId xmlns:a16="http://schemas.microsoft.com/office/drawing/2014/main" id="{A8C704D1-6702-4053-AEB6-3AAD0B665544}"/>
+              </a:ext>
+            </a:extLst>
+          </p:cNvPr>
+          <p:cNvSpPr>
+            <a:spLocks noGrp="1"/>
+          </p:cNvSpPr>
+          <p:nvPr>
+            <p:ph type="subTitle" idx="1"/>
+          </p:nvPr>
+        </p:nvSpPr>
+        <p:spPr/>
+        <p:txBody>
+          <a:bodyPr/>
+          <a:lstStyle/>
+          <a:p>
+            <a:endParaRPr lang="fr-FR"/>
+          </a:p>
+        </p:txBody>
+      </p:sp>
+      <p:graphicFrame>
+        <p:nvGraphicFramePr>
+          <p:cNvPr id="4" name="Tableau 3">
+            <a:extLst>
+              <a:ext uri="{FF2B5EF4-FFF2-40B4-BE49-F238E27FC236}">
+                <a16:creationId xmlns:a16="http://schemas.microsoft.com/office/drawing/2014/main" id="{869A76E3-6AAA-4743-8FFA-470949F53D2A}"/>
+              </a:ext>
+            </a:extLst>
+          </p:cNvPr>
+          <p:cNvGraphicFramePr>
+            <a:graphicFrameLocks noGrp="1"/>
+          </p:cNvGraphicFramePr>
+          <p:nvPr>
+            <p:extLst>
+              <p:ext uri="{D42A27DB-BD31-4B8C-83A1-F6EECF244321}">
+                <p14:modId xmlns:p14="http://schemas.microsoft.com/office/powerpoint/2010/main" val="1900248174"/>
+              </p:ext>
+            </p:extLst>
+          </p:nvPr>
+        </p:nvGraphicFramePr>
+        <p:xfrm>
+          <a:off x="1257300" y="889488"/>
+          <a:ext cx="9545517" cy="5559285"/>
+        </p:xfrm>
+        <a:graphic>
+          <a:graphicData uri="http://schemas.openxmlformats.org/drawingml/2006/table">
+            <a:tbl>
+              <a:tblPr>
+                <a:tableStyleId>{7DF18680-E054-41AD-8BC1-D1AEF772440D}</a:tableStyleId>
+              </a:tblPr>
+              <a:tblGrid>
+                <a:gridCol w="3228361">
+                  <a:extLst>
+                    <a:ext uri="{9D8B030D-6E8A-4147-A177-3AD203B41FA5}">
+                      <a16:colId xmlns:a16="http://schemas.microsoft.com/office/drawing/2014/main" val="4280220780"/>
+                    </a:ext>
+                  </a:extLst>
+                </a:gridCol>
+                <a:gridCol w="1579289">
+                  <a:extLst>
+                    <a:ext uri="{9D8B030D-6E8A-4147-A177-3AD203B41FA5}">
+                      <a16:colId xmlns:a16="http://schemas.microsoft.com/office/drawing/2014/main" val="2895387877"/>
+                    </a:ext>
+                  </a:extLst>
+                </a:gridCol>
+                <a:gridCol w="1579289">
+                  <a:extLst>
+                    <a:ext uri="{9D8B030D-6E8A-4147-A177-3AD203B41FA5}">
+                      <a16:colId xmlns:a16="http://schemas.microsoft.com/office/drawing/2014/main" val="3135472330"/>
+                    </a:ext>
+                  </a:extLst>
+                </a:gridCol>
+                <a:gridCol w="1579289">
+                  <a:extLst>
+                    <a:ext uri="{9D8B030D-6E8A-4147-A177-3AD203B41FA5}">
+                      <a16:colId xmlns:a16="http://schemas.microsoft.com/office/drawing/2014/main" val="39416284"/>
+                    </a:ext>
+                  </a:extLst>
+                </a:gridCol>
+                <a:gridCol w="1579289">
+                  <a:extLst>
+                    <a:ext uri="{9D8B030D-6E8A-4147-A177-3AD203B41FA5}">
+                      <a16:colId xmlns:a16="http://schemas.microsoft.com/office/drawing/2014/main" val="53188810"/>
+                    </a:ext>
+                  </a:extLst>
+                </a:gridCol>
+              </a:tblGrid>
+              <a:tr h="288000">
+                <a:tc>
+                  <a:txBody>
+                    <a:bodyPr/>
+                    <a:lstStyle/>
+                    <a:p>
+                      <a:pPr algn="l" fontAlgn="b"/>
+                      <a:r>
+                        <a:rPr lang="fr-FR" sz="1600" b="1" u="none" strike="noStrike" dirty="0" err="1">
+                          <a:effectLst/>
+                          <a:latin typeface="Avenir Next LT Pro Light" panose="020B0304020202020204" pitchFamily="34" charset="0"/>
+                        </a:rPr>
+                        <a:t>Models</a:t>
+                      </a:r>
+                      <a:endParaRPr lang="fr-FR" sz="1600" b="1" i="0" u="none" strike="noStrike" dirty="0">
+                        <a:solidFill>
+                          <a:srgbClr val="000000"/>
+                        </a:solidFill>
+                        <a:effectLst/>
+                        <a:latin typeface="Avenir Next LT Pro Light" panose="020B0304020202020204" pitchFamily="34" charset="0"/>
+                      </a:endParaRPr>
+                    </a:p>
+                  </a:txBody>
+                  <a:tcPr marL="9525" marR="9525" marT="9525" marB="0" anchor="b"/>
+                </a:tc>
+                <a:tc>
+                  <a:txBody>
+                    <a:bodyPr/>
+                    <a:lstStyle/>
+                    <a:p>
+                      <a:pPr algn="ctr" fontAlgn="b"/>
+                      <a:r>
+                        <a:rPr lang="fr-FR" sz="1600" b="1" u="none" strike="noStrike" dirty="0">
+                          <a:effectLst/>
+                          <a:latin typeface="Avenir Next LT Pro Light" panose="020B0304020202020204" pitchFamily="34" charset="0"/>
+                        </a:rPr>
+                        <a:t># Id. Par.</a:t>
+                      </a:r>
+                      <a:endParaRPr lang="fr-FR" sz="1600" b="1" i="0" u="none" strike="noStrike" dirty="0">
+                        <a:solidFill>
+                          <a:srgbClr val="000000"/>
+                        </a:solidFill>
+                        <a:effectLst/>
+                        <a:latin typeface="Avenir Next LT Pro Light" panose="020B0304020202020204" pitchFamily="34" charset="0"/>
+                      </a:endParaRPr>
+                    </a:p>
+                  </a:txBody>
+                  <a:tcPr marL="9525" marR="9525" marT="9525" marB="0" anchor="b"/>
+                </a:tc>
+                <a:tc>
+                  <a:txBody>
+                    <a:bodyPr/>
+                    <a:lstStyle/>
+                    <a:p>
+                      <a:pPr algn="ctr" fontAlgn="b"/>
+                      <a:r>
+                        <a:rPr lang="fr-FR" sz="1600" b="1" u="none" strike="noStrike" dirty="0" err="1">
+                          <a:effectLst/>
+                          <a:latin typeface="Avenir Next LT Pro Light" panose="020B0304020202020204" pitchFamily="34" charset="0"/>
+                        </a:rPr>
+                        <a:t>Deviance</a:t>
+                      </a:r>
+                      <a:endParaRPr lang="fr-FR" sz="1600" b="1" i="0" u="none" strike="noStrike" dirty="0">
+                        <a:solidFill>
+                          <a:srgbClr val="000000"/>
+                        </a:solidFill>
+                        <a:effectLst/>
+                        <a:latin typeface="Avenir Next LT Pro Light" panose="020B0304020202020204" pitchFamily="34" charset="0"/>
+                      </a:endParaRPr>
+                    </a:p>
+                  </a:txBody>
+                  <a:tcPr marL="9525" marR="9525" marT="9525" marB="0" anchor="b"/>
+                </a:tc>
+                <a:tc>
+                  <a:txBody>
+                    <a:bodyPr/>
+                    <a:lstStyle/>
+                    <a:p>
+                      <a:pPr algn="ctr" fontAlgn="b"/>
+                      <a:r>
+                        <a:rPr lang="fr-FR" sz="1600" b="1" u="none" strike="noStrike" dirty="0">
+                          <a:effectLst/>
+                          <a:latin typeface="Avenir Next LT Pro Light" panose="020B0304020202020204" pitchFamily="34" charset="0"/>
+                        </a:rPr>
+                        <a:t>QAIC</a:t>
+                      </a:r>
+                      <a:endParaRPr lang="fr-FR" sz="1600" b="1" i="0" u="none" strike="noStrike" dirty="0">
+                        <a:solidFill>
+                          <a:srgbClr val="000000"/>
+                        </a:solidFill>
+                        <a:effectLst/>
+                        <a:latin typeface="Avenir Next LT Pro Light" panose="020B0304020202020204" pitchFamily="34" charset="0"/>
+                      </a:endParaRPr>
+                    </a:p>
+                  </a:txBody>
+                  <a:tcPr marL="9525" marR="9525" marT="9525" marB="0" anchor="b"/>
+                </a:tc>
+                <a:tc>
+                  <a:txBody>
+                    <a:bodyPr/>
+                    <a:lstStyle/>
+                    <a:p>
+                      <a:pPr algn="ctr" fontAlgn="b"/>
+                      <a:r>
+                        <a:rPr lang="fr-FR" sz="1600" b="1" u="none" strike="noStrike" dirty="0" err="1">
+                          <a:effectLst/>
+                          <a:latin typeface="Avenir Next LT Pro Light" panose="020B0304020202020204" pitchFamily="34" charset="0"/>
+                        </a:rPr>
+                        <a:t>QAICc</a:t>
+                      </a:r>
+                      <a:endParaRPr lang="fr-FR" sz="1600" b="1" i="0" u="none" strike="noStrike" dirty="0">
+                        <a:solidFill>
+                          <a:srgbClr val="000000"/>
+                        </a:solidFill>
+                        <a:effectLst/>
+                        <a:latin typeface="Avenir Next LT Pro Light" panose="020B0304020202020204" pitchFamily="34" charset="0"/>
+                      </a:endParaRPr>
+                    </a:p>
+                  </a:txBody>
+                  <a:tcPr marL="9525" marR="9525" marT="9525" marB="0" anchor="b"/>
+                </a:tc>
+                <a:extLst>
+                  <a:ext uri="{0D108BD9-81ED-4DB2-BD59-A6C34878D82A}">
+                    <a16:rowId xmlns:a16="http://schemas.microsoft.com/office/drawing/2014/main" val="1048272460"/>
+                  </a:ext>
+                </a:extLst>
+              </a:tr>
+              <a:tr h="288000">
+                <a:tc>
+                  <a:txBody>
+                    <a:bodyPr/>
+                    <a:lstStyle/>
+                    <a:p>
+                      <a:pPr algn="l" fontAlgn="b"/>
+                      <a:r>
+                        <a:rPr lang="fr-FR" sz="1800" u="none" strike="noStrike" dirty="0">
+                          <a:solidFill>
+                            <a:schemeClr val="bg1"/>
+                          </a:solidFill>
+                          <a:effectLst/>
+                          <a:latin typeface="Avenir Next LT Pro Light" panose="020B0304020202020204" pitchFamily="34" charset="0"/>
+                        </a:rPr>
+                        <a:t>s(t)psi(2T+g)p(f)  </a:t>
+                      </a:r>
+                      <a:endParaRPr lang="fr-FR" sz="1800" b="0" i="0" u="none" strike="noStrike" dirty="0">
+                        <a:solidFill>
+                          <a:schemeClr val="bg1"/>
+                        </a:solidFill>
+                        <a:effectLst/>
+                        <a:latin typeface="Avenir Next LT Pro Light" panose="020B0304020202020204" pitchFamily="34" charset="0"/>
+                      </a:endParaRPr>
+                    </a:p>
+                  </a:txBody>
+                  <a:tcPr marL="9525" marR="9525" marT="9525" marB="0" anchor="b">
+                    <a:solidFill>
+                      <a:schemeClr val="accent1">
+                        <a:lumMod val="75000"/>
+                      </a:schemeClr>
+                    </a:solidFill>
+                  </a:tcPr>
+                </a:tc>
+                <a:tc>
+                  <a:txBody>
+                    <a:bodyPr/>
+                    <a:lstStyle/>
+                    <a:p>
+                      <a:pPr algn="ctr" fontAlgn="b"/>
+                      <a:r>
+                        <a:rPr lang="fr-FR" sz="1800" u="none" strike="noStrike">
+                          <a:solidFill>
+                            <a:schemeClr val="bg1"/>
+                          </a:solidFill>
+                          <a:effectLst/>
+                          <a:latin typeface="Avenir Next LT Pro Light" panose="020B0304020202020204" pitchFamily="34" charset="0"/>
+                        </a:rPr>
+                        <a:t>29</a:t>
+                      </a:r>
+                      <a:endParaRPr lang="fr-FR" sz="1800" b="0" i="0" u="none" strike="noStrike">
+                        <a:solidFill>
+                          <a:schemeClr val="bg1"/>
+                        </a:solidFill>
+                        <a:effectLst/>
+                        <a:latin typeface="Avenir Next LT Pro Light" panose="020B0304020202020204" pitchFamily="34" charset="0"/>
+                      </a:endParaRPr>
+                    </a:p>
+                  </a:txBody>
+                  <a:tcPr marL="9525" marR="9525" marT="9525" marB="0" anchor="b">
+                    <a:solidFill>
+                      <a:schemeClr val="accent1">
+                        <a:lumMod val="75000"/>
+                      </a:schemeClr>
+                    </a:solidFill>
+                  </a:tcPr>
+                </a:tc>
+                <a:tc>
+                  <a:txBody>
+                    <a:bodyPr/>
+                    <a:lstStyle/>
+                    <a:p>
+                      <a:pPr algn="ctr" fontAlgn="b"/>
+                      <a:r>
+                        <a:rPr lang="fr-FR" sz="1800" u="none" strike="noStrike">
+                          <a:solidFill>
+                            <a:schemeClr val="bg1"/>
+                          </a:solidFill>
+                          <a:effectLst/>
+                          <a:latin typeface="Avenir Next LT Pro Light" panose="020B0304020202020204" pitchFamily="34" charset="0"/>
+                        </a:rPr>
+                        <a:t>1911.07</a:t>
+                      </a:r>
+                      <a:endParaRPr lang="fr-FR" sz="1800" b="0" i="0" u="none" strike="noStrike">
+                        <a:solidFill>
+                          <a:schemeClr val="bg1"/>
+                        </a:solidFill>
+                        <a:effectLst/>
+                        <a:latin typeface="Avenir Next LT Pro Light" panose="020B0304020202020204" pitchFamily="34" charset="0"/>
+                      </a:endParaRPr>
+                    </a:p>
+                  </a:txBody>
+                  <a:tcPr marL="9525" marR="9525" marT="9525" marB="0" anchor="b">
+                    <a:solidFill>
+                      <a:schemeClr val="accent1">
+                        <a:lumMod val="75000"/>
+                      </a:schemeClr>
+                    </a:solidFill>
+                  </a:tcPr>
+                </a:tc>
+                <a:tc>
+                  <a:txBody>
+                    <a:bodyPr/>
+                    <a:lstStyle/>
+                    <a:p>
+                      <a:pPr algn="ctr" fontAlgn="b"/>
+                      <a:r>
+                        <a:rPr lang="fr-FR" sz="1800" u="none" strike="noStrike">
+                          <a:solidFill>
+                            <a:schemeClr val="bg1"/>
+                          </a:solidFill>
+                          <a:effectLst/>
+                          <a:latin typeface="Avenir Next LT Pro Light" panose="020B0304020202020204" pitchFamily="34" charset="0"/>
+                        </a:rPr>
+                        <a:t>1969.07</a:t>
+                      </a:r>
+                      <a:endParaRPr lang="fr-FR" sz="1800" b="0" i="0" u="none" strike="noStrike">
+                        <a:solidFill>
+                          <a:schemeClr val="bg1"/>
+                        </a:solidFill>
+                        <a:effectLst/>
+                        <a:latin typeface="Avenir Next LT Pro Light" panose="020B0304020202020204" pitchFamily="34" charset="0"/>
+                      </a:endParaRPr>
+                    </a:p>
+                  </a:txBody>
+                  <a:tcPr marL="9525" marR="9525" marT="9525" marB="0" anchor="b">
+                    <a:solidFill>
+                      <a:schemeClr val="accent1">
+                        <a:lumMod val="75000"/>
+                      </a:schemeClr>
+                    </a:solidFill>
+                  </a:tcPr>
+                </a:tc>
+                <a:tc>
+                  <a:txBody>
+                    <a:bodyPr/>
+                    <a:lstStyle/>
+                    <a:p>
+                      <a:pPr algn="ctr" fontAlgn="b"/>
+                      <a:r>
+                        <a:rPr lang="fr-FR" sz="1800" u="none" strike="noStrike" dirty="0">
+                          <a:solidFill>
+                            <a:schemeClr val="bg1"/>
+                          </a:solidFill>
+                          <a:effectLst/>
+                          <a:latin typeface="Avenir Next LT Pro Light" panose="020B0304020202020204" pitchFamily="34" charset="0"/>
+                        </a:rPr>
+                        <a:t>1970.1138</a:t>
+                      </a:r>
+                      <a:endParaRPr lang="fr-FR" sz="1800" b="0" i="0" u="none" strike="noStrike" dirty="0">
+                        <a:solidFill>
+                          <a:schemeClr val="bg1"/>
+                        </a:solidFill>
+                        <a:effectLst/>
+                        <a:latin typeface="Avenir Next LT Pro Light" panose="020B0304020202020204" pitchFamily="34" charset="0"/>
+                      </a:endParaRPr>
+                    </a:p>
+                  </a:txBody>
+                  <a:tcPr marL="9525" marR="9525" marT="9525" marB="0" anchor="b">
+                    <a:solidFill>
+                      <a:schemeClr val="accent1">
+                        <a:lumMod val="75000"/>
+                      </a:schemeClr>
+                    </a:solidFill>
+                  </a:tcPr>
+                </a:tc>
+                <a:extLst>
+                  <a:ext uri="{0D108BD9-81ED-4DB2-BD59-A6C34878D82A}">
+                    <a16:rowId xmlns:a16="http://schemas.microsoft.com/office/drawing/2014/main" val="2026578549"/>
+                  </a:ext>
+                </a:extLst>
+              </a:tr>
+              <a:tr h="288000">
+                <a:tc>
+                  <a:txBody>
+                    <a:bodyPr/>
+                    <a:lstStyle/>
+                    <a:p>
+                      <a:pPr algn="l" fontAlgn="b"/>
+                      <a:r>
+                        <a:rPr lang="fr-FR" sz="2400" b="1" u="none" strike="noStrike" dirty="0">
+                          <a:solidFill>
+                            <a:schemeClr val="bg1"/>
+                          </a:solidFill>
+                          <a:effectLst/>
+                          <a:latin typeface="Avenir Next LT Pro Light" panose="020B0304020202020204" pitchFamily="34" charset="0"/>
+                        </a:rPr>
+                        <a:t>s(t)psi(2T)p(f)  </a:t>
+                      </a:r>
+                      <a:endParaRPr lang="fr-FR" sz="2400" b="1" i="0" u="none" strike="noStrike" dirty="0">
+                        <a:solidFill>
+                          <a:schemeClr val="bg1"/>
+                        </a:solidFill>
+                        <a:effectLst/>
+                        <a:latin typeface="Avenir Next LT Pro Light" panose="020B0304020202020204" pitchFamily="34" charset="0"/>
+                      </a:endParaRPr>
+                    </a:p>
+                  </a:txBody>
+                  <a:tcPr marL="9525" marR="9525" marT="9525" marB="0" anchor="b">
+                    <a:solidFill>
+                      <a:schemeClr val="accent1">
+                        <a:lumMod val="75000"/>
+                      </a:schemeClr>
+                    </a:solidFill>
+                  </a:tcPr>
+                </a:tc>
+                <a:tc>
+                  <a:txBody>
+                    <a:bodyPr/>
+                    <a:lstStyle/>
+                    <a:p>
+                      <a:pPr algn="ctr" fontAlgn="b"/>
+                      <a:r>
+                        <a:rPr lang="fr-FR" sz="2400" b="1" u="none" strike="noStrike">
+                          <a:solidFill>
+                            <a:schemeClr val="bg1"/>
+                          </a:solidFill>
+                          <a:effectLst/>
+                          <a:latin typeface="Avenir Next LT Pro Light" panose="020B0304020202020204" pitchFamily="34" charset="0"/>
+                        </a:rPr>
+                        <a:t>28</a:t>
+                      </a:r>
+                      <a:endParaRPr lang="fr-FR" sz="2400" b="1" i="0" u="none" strike="noStrike">
+                        <a:solidFill>
+                          <a:schemeClr val="bg1"/>
+                        </a:solidFill>
+                        <a:effectLst/>
+                        <a:latin typeface="Avenir Next LT Pro Light" panose="020B0304020202020204" pitchFamily="34" charset="0"/>
+                      </a:endParaRPr>
+                    </a:p>
+                  </a:txBody>
+                  <a:tcPr marL="9525" marR="9525" marT="9525" marB="0" anchor="b">
+                    <a:solidFill>
+                      <a:schemeClr val="accent1">
+                        <a:lumMod val="75000"/>
+                      </a:schemeClr>
+                    </a:solidFill>
+                  </a:tcPr>
+                </a:tc>
+                <a:tc>
+                  <a:txBody>
+                    <a:bodyPr/>
+                    <a:lstStyle/>
+                    <a:p>
+                      <a:pPr algn="ctr" fontAlgn="b"/>
+                      <a:r>
+                        <a:rPr lang="fr-FR" sz="2400" b="1" u="none" strike="noStrike">
+                          <a:solidFill>
+                            <a:schemeClr val="bg1"/>
+                          </a:solidFill>
+                          <a:effectLst/>
+                          <a:latin typeface="Avenir Next LT Pro Light" panose="020B0304020202020204" pitchFamily="34" charset="0"/>
+                        </a:rPr>
+                        <a:t>1913.1479</a:t>
+                      </a:r>
+                      <a:endParaRPr lang="fr-FR" sz="2400" b="1" i="0" u="none" strike="noStrike">
+                        <a:solidFill>
+                          <a:schemeClr val="bg1"/>
+                        </a:solidFill>
+                        <a:effectLst/>
+                        <a:latin typeface="Avenir Next LT Pro Light" panose="020B0304020202020204" pitchFamily="34" charset="0"/>
+                      </a:endParaRPr>
+                    </a:p>
+                  </a:txBody>
+                  <a:tcPr marL="9525" marR="9525" marT="9525" marB="0" anchor="b">
+                    <a:solidFill>
+                      <a:schemeClr val="accent1">
+                        <a:lumMod val="75000"/>
+                      </a:schemeClr>
+                    </a:solidFill>
+                  </a:tcPr>
+                </a:tc>
+                <a:tc>
+                  <a:txBody>
+                    <a:bodyPr/>
+                    <a:lstStyle/>
+                    <a:p>
+                      <a:pPr algn="ctr" fontAlgn="b"/>
+                      <a:r>
+                        <a:rPr lang="fr-FR" sz="2400" b="1" u="none" strike="noStrike">
+                          <a:solidFill>
+                            <a:schemeClr val="bg1"/>
+                          </a:solidFill>
+                          <a:effectLst/>
+                          <a:latin typeface="Avenir Next LT Pro Light" panose="020B0304020202020204" pitchFamily="34" charset="0"/>
+                        </a:rPr>
+                        <a:t>1969.1479</a:t>
+                      </a:r>
+                      <a:endParaRPr lang="fr-FR" sz="2400" b="1" i="0" u="none" strike="noStrike">
+                        <a:solidFill>
+                          <a:schemeClr val="bg1"/>
+                        </a:solidFill>
+                        <a:effectLst/>
+                        <a:latin typeface="Avenir Next LT Pro Light" panose="020B0304020202020204" pitchFamily="34" charset="0"/>
+                      </a:endParaRPr>
+                    </a:p>
+                  </a:txBody>
+                  <a:tcPr marL="9525" marR="9525" marT="9525" marB="0" anchor="b">
+                    <a:solidFill>
+                      <a:schemeClr val="accent1">
+                        <a:lumMod val="75000"/>
+                      </a:schemeClr>
+                    </a:solidFill>
+                  </a:tcPr>
+                </a:tc>
+                <a:tc>
+                  <a:txBody>
+                    <a:bodyPr/>
+                    <a:lstStyle/>
+                    <a:p>
+                      <a:pPr algn="ctr" fontAlgn="b"/>
+                      <a:r>
+                        <a:rPr lang="fr-FR" sz="2400" b="1" u="none" strike="noStrike" dirty="0">
+                          <a:solidFill>
+                            <a:schemeClr val="bg1"/>
+                          </a:solidFill>
+                          <a:effectLst/>
+                          <a:latin typeface="Avenir Next LT Pro Light" panose="020B0304020202020204" pitchFamily="34" charset="0"/>
+                        </a:rPr>
+                        <a:t>1970.1215</a:t>
+                      </a:r>
+                      <a:endParaRPr lang="fr-FR" sz="2400" b="1" i="0" u="none" strike="noStrike" dirty="0">
+                        <a:solidFill>
+                          <a:schemeClr val="bg1"/>
+                        </a:solidFill>
+                        <a:effectLst/>
+                        <a:latin typeface="Avenir Next LT Pro Light" panose="020B0304020202020204" pitchFamily="34" charset="0"/>
+                      </a:endParaRPr>
+                    </a:p>
+                  </a:txBody>
+                  <a:tcPr marL="9525" marR="9525" marT="9525" marB="0" anchor="b">
+                    <a:solidFill>
+                      <a:schemeClr val="accent1">
+                        <a:lumMod val="75000"/>
+                      </a:schemeClr>
+                    </a:solidFill>
+                  </a:tcPr>
+                </a:tc>
+                <a:extLst>
+                  <a:ext uri="{0D108BD9-81ED-4DB2-BD59-A6C34878D82A}">
+                    <a16:rowId xmlns:a16="http://schemas.microsoft.com/office/drawing/2014/main" val="1360986429"/>
+                  </a:ext>
+                </a:extLst>
+              </a:tr>
+              <a:tr h="288000">
+                <a:tc>
+                  <a:txBody>
+                    <a:bodyPr/>
+                    <a:lstStyle/>
+                    <a:p>
+                      <a:pPr algn="l" fontAlgn="b"/>
+                      <a:r>
+                        <a:rPr lang="fr-FR" sz="1800" u="none" strike="noStrike">
+                          <a:solidFill>
+                            <a:schemeClr val="bg1"/>
+                          </a:solidFill>
+                          <a:effectLst/>
+                          <a:latin typeface="Avenir Next LT Pro Light" panose="020B0304020202020204" pitchFamily="34" charset="0"/>
+                        </a:rPr>
+                        <a:t>s(t)psi(2T+g)p(f+g)  </a:t>
+                      </a:r>
+                      <a:endParaRPr lang="fr-FR" sz="1800" b="0" i="0" u="none" strike="noStrike">
+                        <a:solidFill>
+                          <a:schemeClr val="bg1"/>
+                        </a:solidFill>
+                        <a:effectLst/>
+                        <a:latin typeface="Avenir Next LT Pro Light" panose="020B0304020202020204" pitchFamily="34" charset="0"/>
+                      </a:endParaRPr>
+                    </a:p>
+                  </a:txBody>
+                  <a:tcPr marL="9525" marR="9525" marT="9525" marB="0" anchor="b">
+                    <a:solidFill>
+                      <a:schemeClr val="accent1">
+                        <a:lumMod val="75000"/>
+                      </a:schemeClr>
+                    </a:solidFill>
+                  </a:tcPr>
+                </a:tc>
+                <a:tc>
+                  <a:txBody>
+                    <a:bodyPr/>
+                    <a:lstStyle/>
+                    <a:p>
+                      <a:pPr algn="ctr" fontAlgn="b"/>
+                      <a:r>
+                        <a:rPr lang="fr-FR" sz="1800" u="none" strike="noStrike">
+                          <a:solidFill>
+                            <a:schemeClr val="bg1"/>
+                          </a:solidFill>
+                          <a:effectLst/>
+                          <a:latin typeface="Avenir Next LT Pro Light" panose="020B0304020202020204" pitchFamily="34" charset="0"/>
+                        </a:rPr>
+                        <a:t>30</a:t>
+                      </a:r>
+                      <a:endParaRPr lang="fr-FR" sz="1800" b="0" i="0" u="none" strike="noStrike">
+                        <a:solidFill>
+                          <a:schemeClr val="bg1"/>
+                        </a:solidFill>
+                        <a:effectLst/>
+                        <a:latin typeface="Avenir Next LT Pro Light" panose="020B0304020202020204" pitchFamily="34" charset="0"/>
+                      </a:endParaRPr>
+                    </a:p>
+                  </a:txBody>
+                  <a:tcPr marL="9525" marR="9525" marT="9525" marB="0" anchor="b">
+                    <a:solidFill>
+                      <a:schemeClr val="accent1">
+                        <a:lumMod val="75000"/>
+                      </a:schemeClr>
+                    </a:solidFill>
+                  </a:tcPr>
+                </a:tc>
+                <a:tc>
+                  <a:txBody>
+                    <a:bodyPr/>
+                    <a:lstStyle/>
+                    <a:p>
+                      <a:pPr algn="ctr" fontAlgn="b"/>
+                      <a:r>
+                        <a:rPr lang="fr-FR" sz="1800" u="none" strike="noStrike">
+                          <a:solidFill>
+                            <a:schemeClr val="bg1"/>
+                          </a:solidFill>
+                          <a:effectLst/>
+                          <a:latin typeface="Avenir Next LT Pro Light" panose="020B0304020202020204" pitchFamily="34" charset="0"/>
+                        </a:rPr>
+                        <a:t>1909.7364</a:t>
+                      </a:r>
+                      <a:endParaRPr lang="fr-FR" sz="1800" b="0" i="0" u="none" strike="noStrike">
+                        <a:solidFill>
+                          <a:schemeClr val="bg1"/>
+                        </a:solidFill>
+                        <a:effectLst/>
+                        <a:latin typeface="Avenir Next LT Pro Light" panose="020B0304020202020204" pitchFamily="34" charset="0"/>
+                      </a:endParaRPr>
+                    </a:p>
+                  </a:txBody>
+                  <a:tcPr marL="9525" marR="9525" marT="9525" marB="0" anchor="b">
+                    <a:solidFill>
+                      <a:schemeClr val="accent1">
+                        <a:lumMod val="75000"/>
+                      </a:schemeClr>
+                    </a:solidFill>
+                  </a:tcPr>
+                </a:tc>
+                <a:tc>
+                  <a:txBody>
+                    <a:bodyPr/>
+                    <a:lstStyle/>
+                    <a:p>
+                      <a:pPr algn="ctr" fontAlgn="b"/>
+                      <a:r>
+                        <a:rPr lang="fr-FR" sz="1800" u="none" strike="noStrike">
+                          <a:solidFill>
+                            <a:schemeClr val="bg1"/>
+                          </a:solidFill>
+                          <a:effectLst/>
+                          <a:latin typeface="Avenir Next LT Pro Light" panose="020B0304020202020204" pitchFamily="34" charset="0"/>
+                        </a:rPr>
+                        <a:t>1969.7364</a:t>
+                      </a:r>
+                      <a:endParaRPr lang="fr-FR" sz="1800" b="0" i="0" u="none" strike="noStrike">
+                        <a:solidFill>
+                          <a:schemeClr val="bg1"/>
+                        </a:solidFill>
+                        <a:effectLst/>
+                        <a:latin typeface="Avenir Next LT Pro Light" panose="020B0304020202020204" pitchFamily="34" charset="0"/>
+                      </a:endParaRPr>
+                    </a:p>
+                  </a:txBody>
+                  <a:tcPr marL="9525" marR="9525" marT="9525" marB="0" anchor="b">
+                    <a:solidFill>
+                      <a:schemeClr val="accent1">
+                        <a:lumMod val="75000"/>
+                      </a:schemeClr>
+                    </a:solidFill>
+                  </a:tcPr>
+                </a:tc>
+                <a:tc>
+                  <a:txBody>
+                    <a:bodyPr/>
+                    <a:lstStyle/>
+                    <a:p>
+                      <a:pPr algn="ctr" fontAlgn="b"/>
+                      <a:r>
+                        <a:rPr lang="fr-FR" sz="1800" u="none" strike="noStrike" dirty="0">
+                          <a:solidFill>
+                            <a:schemeClr val="bg1"/>
+                          </a:solidFill>
+                          <a:effectLst/>
+                          <a:latin typeface="Avenir Next LT Pro Light" panose="020B0304020202020204" pitchFamily="34" charset="0"/>
+                        </a:rPr>
+                        <a:t>1970.8528</a:t>
+                      </a:r>
+                      <a:endParaRPr lang="fr-FR" sz="1800" b="0" i="0" u="none" strike="noStrike" dirty="0">
+                        <a:solidFill>
+                          <a:schemeClr val="bg1"/>
+                        </a:solidFill>
+                        <a:effectLst/>
+                        <a:latin typeface="Avenir Next LT Pro Light" panose="020B0304020202020204" pitchFamily="34" charset="0"/>
+                      </a:endParaRPr>
+                    </a:p>
+                  </a:txBody>
+                  <a:tcPr marL="9525" marR="9525" marT="9525" marB="0" anchor="b">
+                    <a:solidFill>
+                      <a:schemeClr val="accent1">
+                        <a:lumMod val="75000"/>
+                      </a:schemeClr>
+                    </a:solidFill>
+                  </a:tcPr>
+                </a:tc>
+                <a:extLst>
+                  <a:ext uri="{0D108BD9-81ED-4DB2-BD59-A6C34878D82A}">
+                    <a16:rowId xmlns:a16="http://schemas.microsoft.com/office/drawing/2014/main" val="1124182213"/>
+                  </a:ext>
+                </a:extLst>
+              </a:tr>
+              <a:tr h="288000">
+                <a:tc>
+                  <a:txBody>
+                    <a:bodyPr/>
+                    <a:lstStyle/>
+                    <a:p>
+                      <a:pPr algn="l" fontAlgn="b"/>
+                      <a:r>
+                        <a:rPr lang="fr-FR" sz="1800" u="none" strike="noStrike" dirty="0">
+                          <a:solidFill>
+                            <a:schemeClr val="bg1"/>
+                          </a:solidFill>
+                          <a:effectLst/>
+                          <a:latin typeface="Avenir Next LT Pro Light" panose="020B0304020202020204" pitchFamily="34" charset="0"/>
+                        </a:rPr>
+                        <a:t>s(t)psi(2T)p(</a:t>
+                      </a:r>
+                      <a:r>
+                        <a:rPr lang="fr-FR" sz="1800" u="none" strike="noStrike" dirty="0" err="1">
+                          <a:solidFill>
+                            <a:schemeClr val="bg1"/>
+                          </a:solidFill>
+                          <a:effectLst/>
+                          <a:latin typeface="Avenir Next LT Pro Light" panose="020B0304020202020204" pitchFamily="34" charset="0"/>
+                        </a:rPr>
+                        <a:t>f+g</a:t>
+                      </a:r>
+                      <a:r>
+                        <a:rPr lang="fr-FR" sz="1800" u="none" strike="noStrike" dirty="0">
+                          <a:solidFill>
+                            <a:schemeClr val="bg1"/>
+                          </a:solidFill>
+                          <a:effectLst/>
+                          <a:latin typeface="Avenir Next LT Pro Light" panose="020B0304020202020204" pitchFamily="34" charset="0"/>
+                        </a:rPr>
+                        <a:t>)  </a:t>
+                      </a:r>
+                      <a:endParaRPr lang="fr-FR" sz="1800" b="0" i="0" u="none" strike="noStrike" dirty="0">
+                        <a:solidFill>
+                          <a:schemeClr val="bg1"/>
+                        </a:solidFill>
+                        <a:effectLst/>
+                        <a:latin typeface="Avenir Next LT Pro Light" panose="020B0304020202020204" pitchFamily="34" charset="0"/>
+                      </a:endParaRPr>
+                    </a:p>
+                  </a:txBody>
+                  <a:tcPr marL="9525" marR="9525" marT="9525" marB="0" anchor="b">
+                    <a:solidFill>
+                      <a:schemeClr val="accent1">
+                        <a:lumMod val="75000"/>
+                      </a:schemeClr>
+                    </a:solidFill>
+                  </a:tcPr>
+                </a:tc>
+                <a:tc>
+                  <a:txBody>
+                    <a:bodyPr/>
+                    <a:lstStyle/>
+                    <a:p>
+                      <a:pPr algn="ctr" fontAlgn="b"/>
+                      <a:r>
+                        <a:rPr lang="fr-FR" sz="1800" u="none" strike="noStrike">
+                          <a:solidFill>
+                            <a:schemeClr val="bg1"/>
+                          </a:solidFill>
+                          <a:effectLst/>
+                          <a:latin typeface="Avenir Next LT Pro Light" panose="020B0304020202020204" pitchFamily="34" charset="0"/>
+                        </a:rPr>
+                        <a:t>29</a:t>
+                      </a:r>
+                      <a:endParaRPr lang="fr-FR" sz="1800" b="0" i="0" u="none" strike="noStrike">
+                        <a:solidFill>
+                          <a:schemeClr val="bg1"/>
+                        </a:solidFill>
+                        <a:effectLst/>
+                        <a:latin typeface="Avenir Next LT Pro Light" panose="020B0304020202020204" pitchFamily="34" charset="0"/>
+                      </a:endParaRPr>
+                    </a:p>
+                  </a:txBody>
+                  <a:tcPr marL="9525" marR="9525" marT="9525" marB="0" anchor="b">
+                    <a:solidFill>
+                      <a:schemeClr val="accent1">
+                        <a:lumMod val="75000"/>
+                      </a:schemeClr>
+                    </a:solidFill>
+                  </a:tcPr>
+                </a:tc>
+                <a:tc>
+                  <a:txBody>
+                    <a:bodyPr/>
+                    <a:lstStyle/>
+                    <a:p>
+                      <a:pPr algn="ctr" fontAlgn="b"/>
+                      <a:r>
+                        <a:rPr lang="fr-FR" sz="1800" u="none" strike="noStrike">
+                          <a:solidFill>
+                            <a:schemeClr val="bg1"/>
+                          </a:solidFill>
+                          <a:effectLst/>
+                          <a:latin typeface="Avenir Next LT Pro Light" panose="020B0304020202020204" pitchFamily="34" charset="0"/>
+                        </a:rPr>
+                        <a:t>1912.0355</a:t>
+                      </a:r>
+                      <a:endParaRPr lang="fr-FR" sz="1800" b="0" i="0" u="none" strike="noStrike">
+                        <a:solidFill>
+                          <a:schemeClr val="bg1"/>
+                        </a:solidFill>
+                        <a:effectLst/>
+                        <a:latin typeface="Avenir Next LT Pro Light" panose="020B0304020202020204" pitchFamily="34" charset="0"/>
+                      </a:endParaRPr>
+                    </a:p>
+                  </a:txBody>
+                  <a:tcPr marL="9525" marR="9525" marT="9525" marB="0" anchor="b">
+                    <a:solidFill>
+                      <a:schemeClr val="accent1">
+                        <a:lumMod val="75000"/>
+                      </a:schemeClr>
+                    </a:solidFill>
+                  </a:tcPr>
+                </a:tc>
+                <a:tc>
+                  <a:txBody>
+                    <a:bodyPr/>
+                    <a:lstStyle/>
+                    <a:p>
+                      <a:pPr algn="ctr" fontAlgn="b"/>
+                      <a:r>
+                        <a:rPr lang="fr-FR" sz="1800" u="none" strike="noStrike">
+                          <a:solidFill>
+                            <a:schemeClr val="bg1"/>
+                          </a:solidFill>
+                          <a:effectLst/>
+                          <a:latin typeface="Avenir Next LT Pro Light" panose="020B0304020202020204" pitchFamily="34" charset="0"/>
+                        </a:rPr>
+                        <a:t>1970.0355</a:t>
+                      </a:r>
+                      <a:endParaRPr lang="fr-FR" sz="1800" b="0" i="0" u="none" strike="noStrike">
+                        <a:solidFill>
+                          <a:schemeClr val="bg1"/>
+                        </a:solidFill>
+                        <a:effectLst/>
+                        <a:latin typeface="Avenir Next LT Pro Light" panose="020B0304020202020204" pitchFamily="34" charset="0"/>
+                      </a:endParaRPr>
+                    </a:p>
+                  </a:txBody>
+                  <a:tcPr marL="9525" marR="9525" marT="9525" marB="0" anchor="b">
+                    <a:solidFill>
+                      <a:schemeClr val="accent1">
+                        <a:lumMod val="75000"/>
+                      </a:schemeClr>
+                    </a:solidFill>
+                  </a:tcPr>
+                </a:tc>
+                <a:tc>
+                  <a:txBody>
+                    <a:bodyPr/>
+                    <a:lstStyle/>
+                    <a:p>
+                      <a:pPr algn="ctr" fontAlgn="b"/>
+                      <a:r>
+                        <a:rPr lang="fr-FR" sz="1800" u="none" strike="noStrike" dirty="0">
+                          <a:solidFill>
+                            <a:schemeClr val="bg1"/>
+                          </a:solidFill>
+                          <a:effectLst/>
+                          <a:latin typeface="Avenir Next LT Pro Light" panose="020B0304020202020204" pitchFamily="34" charset="0"/>
+                        </a:rPr>
+                        <a:t>1971.0793</a:t>
+                      </a:r>
+                      <a:endParaRPr lang="fr-FR" sz="1800" b="0" i="0" u="none" strike="noStrike" dirty="0">
+                        <a:solidFill>
+                          <a:schemeClr val="bg1"/>
+                        </a:solidFill>
+                        <a:effectLst/>
+                        <a:latin typeface="Avenir Next LT Pro Light" panose="020B0304020202020204" pitchFamily="34" charset="0"/>
+                      </a:endParaRPr>
+                    </a:p>
+                  </a:txBody>
+                  <a:tcPr marL="9525" marR="9525" marT="9525" marB="0" anchor="b">
+                    <a:solidFill>
+                      <a:schemeClr val="accent1">
+                        <a:lumMod val="75000"/>
+                      </a:schemeClr>
+                    </a:solidFill>
+                  </a:tcPr>
+                </a:tc>
+                <a:extLst>
+                  <a:ext uri="{0D108BD9-81ED-4DB2-BD59-A6C34878D82A}">
+                    <a16:rowId xmlns:a16="http://schemas.microsoft.com/office/drawing/2014/main" val="2539967718"/>
+                  </a:ext>
+                </a:extLst>
+              </a:tr>
+              <a:tr h="288000">
+                <a:tc>
+                  <a:txBody>
+                    <a:bodyPr/>
+                    <a:lstStyle/>
+                    <a:p>
+                      <a:pPr algn="l" fontAlgn="b"/>
+                      <a:r>
+                        <a:rPr lang="fr-FR" sz="1600" u="none" strike="noStrike" dirty="0">
+                          <a:effectLst/>
+                          <a:latin typeface="Avenir Next LT Pro Light" panose="020B0304020202020204" pitchFamily="34" charset="0"/>
+                        </a:rPr>
+                        <a:t>s(</a:t>
+                      </a:r>
+                      <a:r>
+                        <a:rPr lang="fr-FR" sz="1600" u="none" strike="noStrike" dirty="0" err="1">
+                          <a:effectLst/>
+                          <a:latin typeface="Avenir Next LT Pro Light" panose="020B0304020202020204" pitchFamily="34" charset="0"/>
+                        </a:rPr>
+                        <a:t>g+t</a:t>
+                      </a:r>
+                      <a:r>
+                        <a:rPr lang="fr-FR" sz="1600" u="none" strike="noStrike" dirty="0">
+                          <a:effectLst/>
+                          <a:latin typeface="Avenir Next LT Pro Light" panose="020B0304020202020204" pitchFamily="34" charset="0"/>
+                        </a:rPr>
+                        <a:t>)psi(2T+g)p(f)  </a:t>
+                      </a:r>
+                      <a:endParaRPr lang="fr-FR" sz="1600" b="0" i="0" u="none" strike="noStrike" dirty="0">
+                        <a:solidFill>
+                          <a:srgbClr val="000000"/>
+                        </a:solidFill>
+                        <a:effectLst/>
+                        <a:latin typeface="Avenir Next LT Pro Light" panose="020B0304020202020204" pitchFamily="34" charset="0"/>
+                      </a:endParaRPr>
+                    </a:p>
+                  </a:txBody>
+                  <a:tcPr marL="9525" marR="9525" marT="9525" marB="0" anchor="b"/>
+                </a:tc>
+                <a:tc>
+                  <a:txBody>
+                    <a:bodyPr/>
+                    <a:lstStyle/>
+                    <a:p>
+                      <a:pPr algn="ctr" fontAlgn="b"/>
+                      <a:r>
+                        <a:rPr lang="fr-FR" sz="1600" u="none" strike="noStrike">
+                          <a:effectLst/>
+                          <a:latin typeface="Avenir Next LT Pro Light" panose="020B0304020202020204" pitchFamily="34" charset="0"/>
+                        </a:rPr>
+                        <a:t>30</a:t>
+                      </a:r>
+                      <a:endParaRPr lang="fr-FR" sz="1600" b="0" i="0" u="none" strike="noStrike">
+                        <a:solidFill>
+                          <a:srgbClr val="000000"/>
+                        </a:solidFill>
+                        <a:effectLst/>
+                        <a:latin typeface="Avenir Next LT Pro Light" panose="020B0304020202020204" pitchFamily="34" charset="0"/>
+                      </a:endParaRPr>
+                    </a:p>
+                  </a:txBody>
+                  <a:tcPr marL="9525" marR="9525" marT="9525" marB="0" anchor="b"/>
+                </a:tc>
+                <a:tc>
+                  <a:txBody>
+                    <a:bodyPr/>
+                    <a:lstStyle/>
+                    <a:p>
+                      <a:pPr algn="ctr" fontAlgn="b"/>
+                      <a:r>
+                        <a:rPr lang="fr-FR" sz="1600" u="none" strike="noStrike">
+                          <a:effectLst/>
+                          <a:latin typeface="Avenir Next LT Pro Light" panose="020B0304020202020204" pitchFamily="34" charset="0"/>
+                        </a:rPr>
+                        <a:t>1910.9856</a:t>
+                      </a:r>
+                      <a:endParaRPr lang="fr-FR" sz="1600" b="0" i="0" u="none" strike="noStrike">
+                        <a:solidFill>
+                          <a:srgbClr val="000000"/>
+                        </a:solidFill>
+                        <a:effectLst/>
+                        <a:latin typeface="Avenir Next LT Pro Light" panose="020B0304020202020204" pitchFamily="34" charset="0"/>
+                      </a:endParaRPr>
+                    </a:p>
+                  </a:txBody>
+                  <a:tcPr marL="9525" marR="9525" marT="9525" marB="0" anchor="b"/>
+                </a:tc>
+                <a:tc>
+                  <a:txBody>
+                    <a:bodyPr/>
+                    <a:lstStyle/>
+                    <a:p>
+                      <a:pPr algn="ctr" fontAlgn="b"/>
+                      <a:r>
+                        <a:rPr lang="fr-FR" sz="1600" u="none" strike="noStrike">
+                          <a:effectLst/>
+                          <a:latin typeface="Avenir Next LT Pro Light" panose="020B0304020202020204" pitchFamily="34" charset="0"/>
+                        </a:rPr>
+                        <a:t>1970.9856</a:t>
+                      </a:r>
+                      <a:endParaRPr lang="fr-FR" sz="1600" b="0" i="0" u="none" strike="noStrike">
+                        <a:solidFill>
+                          <a:srgbClr val="000000"/>
+                        </a:solidFill>
+                        <a:effectLst/>
+                        <a:latin typeface="Avenir Next LT Pro Light" panose="020B0304020202020204" pitchFamily="34" charset="0"/>
+                      </a:endParaRPr>
+                    </a:p>
+                  </a:txBody>
+                  <a:tcPr marL="9525" marR="9525" marT="9525" marB="0" anchor="b"/>
+                </a:tc>
+                <a:tc>
+                  <a:txBody>
+                    <a:bodyPr/>
+                    <a:lstStyle/>
+                    <a:p>
+                      <a:pPr algn="ctr" fontAlgn="b"/>
+                      <a:r>
+                        <a:rPr lang="fr-FR" sz="1600" u="none" strike="noStrike">
+                          <a:effectLst/>
+                          <a:latin typeface="Avenir Next LT Pro Light" panose="020B0304020202020204" pitchFamily="34" charset="0"/>
+                        </a:rPr>
+                        <a:t>1972.1021</a:t>
+                      </a:r>
+                      <a:endParaRPr lang="fr-FR" sz="1600" b="0" i="0" u="none" strike="noStrike">
+                        <a:solidFill>
+                          <a:srgbClr val="000000"/>
+                        </a:solidFill>
+                        <a:effectLst/>
+                        <a:latin typeface="Avenir Next LT Pro Light" panose="020B0304020202020204" pitchFamily="34" charset="0"/>
+                      </a:endParaRPr>
+                    </a:p>
+                  </a:txBody>
+                  <a:tcPr marL="9525" marR="9525" marT="9525" marB="0" anchor="b"/>
+                </a:tc>
+                <a:extLst>
+                  <a:ext uri="{0D108BD9-81ED-4DB2-BD59-A6C34878D82A}">
+                    <a16:rowId xmlns:a16="http://schemas.microsoft.com/office/drawing/2014/main" val="2474242020"/>
+                  </a:ext>
+                </a:extLst>
+              </a:tr>
+              <a:tr h="288000">
+                <a:tc>
+                  <a:txBody>
+                    <a:bodyPr/>
+                    <a:lstStyle/>
+                    <a:p>
+                      <a:pPr algn="l" fontAlgn="b"/>
+                      <a:r>
+                        <a:rPr lang="fr-FR" sz="1600" u="none" strike="noStrike">
+                          <a:effectLst/>
+                          <a:latin typeface="Avenir Next LT Pro Light" panose="020B0304020202020204" pitchFamily="34" charset="0"/>
+                        </a:rPr>
+                        <a:t>s(g+t)psi(2T)p(f) </a:t>
+                      </a:r>
+                      <a:endParaRPr lang="fr-FR" sz="1600" b="0" i="0" u="none" strike="noStrike">
+                        <a:solidFill>
+                          <a:srgbClr val="000000"/>
+                        </a:solidFill>
+                        <a:effectLst/>
+                        <a:latin typeface="Avenir Next LT Pro Light" panose="020B0304020202020204" pitchFamily="34" charset="0"/>
+                      </a:endParaRPr>
+                    </a:p>
+                  </a:txBody>
+                  <a:tcPr marL="9525" marR="9525" marT="9525" marB="0" anchor="b"/>
+                </a:tc>
+                <a:tc>
+                  <a:txBody>
+                    <a:bodyPr/>
+                    <a:lstStyle/>
+                    <a:p>
+                      <a:pPr algn="ctr" fontAlgn="b"/>
+                      <a:r>
+                        <a:rPr lang="fr-FR" sz="1600" u="none" strike="noStrike">
+                          <a:effectLst/>
+                          <a:latin typeface="Avenir Next LT Pro Light" panose="020B0304020202020204" pitchFamily="34" charset="0"/>
+                        </a:rPr>
+                        <a:t>29</a:t>
+                      </a:r>
+                      <a:endParaRPr lang="fr-FR" sz="1600" b="0" i="0" u="none" strike="noStrike">
+                        <a:solidFill>
+                          <a:srgbClr val="000000"/>
+                        </a:solidFill>
+                        <a:effectLst/>
+                        <a:latin typeface="Avenir Next LT Pro Light" panose="020B0304020202020204" pitchFamily="34" charset="0"/>
+                      </a:endParaRPr>
+                    </a:p>
+                  </a:txBody>
+                  <a:tcPr marL="9525" marR="9525" marT="9525" marB="0" anchor="b"/>
+                </a:tc>
+                <a:tc>
+                  <a:txBody>
+                    <a:bodyPr/>
+                    <a:lstStyle/>
+                    <a:p>
+                      <a:pPr algn="ctr" fontAlgn="b"/>
+                      <a:r>
+                        <a:rPr lang="fr-FR" sz="1600" u="none" strike="noStrike">
+                          <a:effectLst/>
+                          <a:latin typeface="Avenir Next LT Pro Light" panose="020B0304020202020204" pitchFamily="34" charset="0"/>
+                        </a:rPr>
+                        <a:t>1913.059</a:t>
+                      </a:r>
+                      <a:endParaRPr lang="fr-FR" sz="1600" b="0" i="0" u="none" strike="noStrike">
+                        <a:solidFill>
+                          <a:srgbClr val="000000"/>
+                        </a:solidFill>
+                        <a:effectLst/>
+                        <a:latin typeface="Avenir Next LT Pro Light" panose="020B0304020202020204" pitchFamily="34" charset="0"/>
+                      </a:endParaRPr>
+                    </a:p>
+                  </a:txBody>
+                  <a:tcPr marL="9525" marR="9525" marT="9525" marB="0" anchor="b"/>
+                </a:tc>
+                <a:tc>
+                  <a:txBody>
+                    <a:bodyPr/>
+                    <a:lstStyle/>
+                    <a:p>
+                      <a:pPr algn="ctr" fontAlgn="b"/>
+                      <a:r>
+                        <a:rPr lang="fr-FR" sz="1600" u="none" strike="noStrike">
+                          <a:effectLst/>
+                          <a:latin typeface="Avenir Next LT Pro Light" panose="020B0304020202020204" pitchFamily="34" charset="0"/>
+                        </a:rPr>
+                        <a:t>1971.059</a:t>
+                      </a:r>
+                      <a:endParaRPr lang="fr-FR" sz="1600" b="0" i="0" u="none" strike="noStrike">
+                        <a:solidFill>
+                          <a:srgbClr val="000000"/>
+                        </a:solidFill>
+                        <a:effectLst/>
+                        <a:latin typeface="Avenir Next LT Pro Light" panose="020B0304020202020204" pitchFamily="34" charset="0"/>
+                      </a:endParaRPr>
+                    </a:p>
+                  </a:txBody>
+                  <a:tcPr marL="9525" marR="9525" marT="9525" marB="0" anchor="b"/>
+                </a:tc>
+                <a:tc>
+                  <a:txBody>
+                    <a:bodyPr/>
+                    <a:lstStyle/>
+                    <a:p>
+                      <a:pPr algn="ctr" fontAlgn="b"/>
+                      <a:r>
+                        <a:rPr lang="fr-FR" sz="1600" u="none" strike="noStrike">
+                          <a:effectLst/>
+                          <a:latin typeface="Avenir Next LT Pro Light" panose="020B0304020202020204" pitchFamily="34" charset="0"/>
+                        </a:rPr>
+                        <a:t>1972.1028</a:t>
+                      </a:r>
+                      <a:endParaRPr lang="fr-FR" sz="1600" b="0" i="0" u="none" strike="noStrike">
+                        <a:solidFill>
+                          <a:srgbClr val="000000"/>
+                        </a:solidFill>
+                        <a:effectLst/>
+                        <a:latin typeface="Avenir Next LT Pro Light" panose="020B0304020202020204" pitchFamily="34" charset="0"/>
+                      </a:endParaRPr>
+                    </a:p>
+                  </a:txBody>
+                  <a:tcPr marL="9525" marR="9525" marT="9525" marB="0" anchor="b"/>
+                </a:tc>
+                <a:extLst>
+                  <a:ext uri="{0D108BD9-81ED-4DB2-BD59-A6C34878D82A}">
+                    <a16:rowId xmlns:a16="http://schemas.microsoft.com/office/drawing/2014/main" val="96383008"/>
+                  </a:ext>
+                </a:extLst>
+              </a:tr>
+              <a:tr h="288000">
+                <a:tc>
+                  <a:txBody>
+                    <a:bodyPr/>
+                    <a:lstStyle/>
+                    <a:p>
+                      <a:pPr algn="l" fontAlgn="b"/>
+                      <a:r>
+                        <a:rPr lang="fr-FR" sz="1600" u="none" strike="noStrike">
+                          <a:effectLst/>
+                          <a:latin typeface="Avenir Next LT Pro Light" panose="020B0304020202020204" pitchFamily="34" charset="0"/>
+                        </a:rPr>
+                        <a:t>s(g+t)psi(2T+g)p(f+g)  </a:t>
+                      </a:r>
+                      <a:endParaRPr lang="fr-FR" sz="1600" b="0" i="0" u="none" strike="noStrike">
+                        <a:solidFill>
+                          <a:srgbClr val="000000"/>
+                        </a:solidFill>
+                        <a:effectLst/>
+                        <a:latin typeface="Avenir Next LT Pro Light" panose="020B0304020202020204" pitchFamily="34" charset="0"/>
+                      </a:endParaRPr>
+                    </a:p>
+                  </a:txBody>
+                  <a:tcPr marL="9525" marR="9525" marT="9525" marB="0" anchor="b"/>
+                </a:tc>
+                <a:tc>
+                  <a:txBody>
+                    <a:bodyPr/>
+                    <a:lstStyle/>
+                    <a:p>
+                      <a:pPr algn="ctr" fontAlgn="b"/>
+                      <a:r>
+                        <a:rPr lang="fr-FR" sz="1600" u="none" strike="noStrike">
+                          <a:effectLst/>
+                          <a:latin typeface="Avenir Next LT Pro Light" panose="020B0304020202020204" pitchFamily="34" charset="0"/>
+                        </a:rPr>
+                        <a:t>31</a:t>
+                      </a:r>
+                      <a:endParaRPr lang="fr-FR" sz="1600" b="0" i="0" u="none" strike="noStrike">
+                        <a:solidFill>
+                          <a:srgbClr val="000000"/>
+                        </a:solidFill>
+                        <a:effectLst/>
+                        <a:latin typeface="Avenir Next LT Pro Light" panose="020B0304020202020204" pitchFamily="34" charset="0"/>
+                      </a:endParaRPr>
+                    </a:p>
+                  </a:txBody>
+                  <a:tcPr marL="9525" marR="9525" marT="9525" marB="0" anchor="b"/>
+                </a:tc>
+                <a:tc>
+                  <a:txBody>
+                    <a:bodyPr/>
+                    <a:lstStyle/>
+                    <a:p>
+                      <a:pPr algn="ctr" fontAlgn="b"/>
+                      <a:r>
+                        <a:rPr lang="fr-FR" sz="1600" u="none" strike="noStrike">
+                          <a:effectLst/>
+                          <a:latin typeface="Avenir Next LT Pro Light" panose="020B0304020202020204" pitchFamily="34" charset="0"/>
+                        </a:rPr>
+                        <a:t>1909.6619</a:t>
+                      </a:r>
+                      <a:endParaRPr lang="fr-FR" sz="1600" b="0" i="0" u="none" strike="noStrike">
+                        <a:solidFill>
+                          <a:srgbClr val="000000"/>
+                        </a:solidFill>
+                        <a:effectLst/>
+                        <a:latin typeface="Avenir Next LT Pro Light" panose="020B0304020202020204" pitchFamily="34" charset="0"/>
+                      </a:endParaRPr>
+                    </a:p>
+                  </a:txBody>
+                  <a:tcPr marL="9525" marR="9525" marT="9525" marB="0" anchor="b"/>
+                </a:tc>
+                <a:tc>
+                  <a:txBody>
+                    <a:bodyPr/>
+                    <a:lstStyle/>
+                    <a:p>
+                      <a:pPr algn="ctr" fontAlgn="b"/>
+                      <a:r>
+                        <a:rPr lang="fr-FR" sz="1600" u="none" strike="noStrike">
+                          <a:effectLst/>
+                          <a:latin typeface="Avenir Next LT Pro Light" panose="020B0304020202020204" pitchFamily="34" charset="0"/>
+                        </a:rPr>
+                        <a:t>1971.6619</a:t>
+                      </a:r>
+                      <a:endParaRPr lang="fr-FR" sz="1600" b="0" i="0" u="none" strike="noStrike">
+                        <a:solidFill>
+                          <a:srgbClr val="000000"/>
+                        </a:solidFill>
+                        <a:effectLst/>
+                        <a:latin typeface="Avenir Next LT Pro Light" panose="020B0304020202020204" pitchFamily="34" charset="0"/>
+                      </a:endParaRPr>
+                    </a:p>
+                  </a:txBody>
+                  <a:tcPr marL="9525" marR="9525" marT="9525" marB="0" anchor="b"/>
+                </a:tc>
+                <a:tc>
+                  <a:txBody>
+                    <a:bodyPr/>
+                    <a:lstStyle/>
+                    <a:p>
+                      <a:pPr algn="ctr" fontAlgn="b"/>
+                      <a:r>
+                        <a:rPr lang="fr-FR" sz="1600" u="none" strike="noStrike" dirty="0">
+                          <a:effectLst/>
+                          <a:latin typeface="Avenir Next LT Pro Light" panose="020B0304020202020204" pitchFamily="34" charset="0"/>
+                        </a:rPr>
+                        <a:t>1972.8534</a:t>
+                      </a:r>
+                      <a:endParaRPr lang="fr-FR" sz="1600" b="0" i="0" u="none" strike="noStrike" dirty="0">
+                        <a:solidFill>
+                          <a:srgbClr val="000000"/>
+                        </a:solidFill>
+                        <a:effectLst/>
+                        <a:latin typeface="Avenir Next LT Pro Light" panose="020B0304020202020204" pitchFamily="34" charset="0"/>
+                      </a:endParaRPr>
+                    </a:p>
+                  </a:txBody>
+                  <a:tcPr marL="9525" marR="9525" marT="9525" marB="0" anchor="b"/>
+                </a:tc>
+                <a:extLst>
+                  <a:ext uri="{0D108BD9-81ED-4DB2-BD59-A6C34878D82A}">
+                    <a16:rowId xmlns:a16="http://schemas.microsoft.com/office/drawing/2014/main" val="378272579"/>
+                  </a:ext>
+                </a:extLst>
+              </a:tr>
+              <a:tr h="288000">
+                <a:tc>
+                  <a:txBody>
+                    <a:bodyPr/>
+                    <a:lstStyle/>
+                    <a:p>
+                      <a:pPr algn="l" fontAlgn="b"/>
+                      <a:r>
+                        <a:rPr lang="fr-FR" sz="1600" u="none" strike="noStrike">
+                          <a:effectLst/>
+                          <a:latin typeface="Avenir Next LT Pro Light" panose="020B0304020202020204" pitchFamily="34" charset="0"/>
+                        </a:rPr>
+                        <a:t>s(g+t)psi(2T)p(f+g) </a:t>
+                      </a:r>
+                      <a:endParaRPr lang="fr-FR" sz="1600" b="0" i="0" u="none" strike="noStrike">
+                        <a:solidFill>
+                          <a:srgbClr val="000000"/>
+                        </a:solidFill>
+                        <a:effectLst/>
+                        <a:latin typeface="Avenir Next LT Pro Light" panose="020B0304020202020204" pitchFamily="34" charset="0"/>
+                      </a:endParaRPr>
+                    </a:p>
+                  </a:txBody>
+                  <a:tcPr marL="9525" marR="9525" marT="9525" marB="0" anchor="b"/>
+                </a:tc>
+                <a:tc>
+                  <a:txBody>
+                    <a:bodyPr/>
+                    <a:lstStyle/>
+                    <a:p>
+                      <a:pPr algn="ctr" fontAlgn="b"/>
+                      <a:r>
+                        <a:rPr lang="fr-FR" sz="1600" u="none" strike="noStrike">
+                          <a:effectLst/>
+                          <a:latin typeface="Avenir Next LT Pro Light" panose="020B0304020202020204" pitchFamily="34" charset="0"/>
+                        </a:rPr>
+                        <a:t>30</a:t>
+                      </a:r>
+                      <a:endParaRPr lang="fr-FR" sz="1600" b="0" i="0" u="none" strike="noStrike">
+                        <a:solidFill>
+                          <a:srgbClr val="000000"/>
+                        </a:solidFill>
+                        <a:effectLst/>
+                        <a:latin typeface="Avenir Next LT Pro Light" panose="020B0304020202020204" pitchFamily="34" charset="0"/>
+                      </a:endParaRPr>
+                    </a:p>
+                  </a:txBody>
+                  <a:tcPr marL="9525" marR="9525" marT="9525" marB="0" anchor="b"/>
+                </a:tc>
+                <a:tc>
+                  <a:txBody>
+                    <a:bodyPr/>
+                    <a:lstStyle/>
+                    <a:p>
+                      <a:pPr algn="ctr" fontAlgn="b"/>
+                      <a:r>
+                        <a:rPr lang="fr-FR" sz="1600" u="none" strike="noStrike">
+                          <a:effectLst/>
+                          <a:latin typeface="Avenir Next LT Pro Light" panose="020B0304020202020204" pitchFamily="34" charset="0"/>
+                        </a:rPr>
+                        <a:t>1911.956</a:t>
+                      </a:r>
+                      <a:endParaRPr lang="fr-FR" sz="1600" b="0" i="0" u="none" strike="noStrike">
+                        <a:solidFill>
+                          <a:srgbClr val="000000"/>
+                        </a:solidFill>
+                        <a:effectLst/>
+                        <a:latin typeface="Avenir Next LT Pro Light" panose="020B0304020202020204" pitchFamily="34" charset="0"/>
+                      </a:endParaRPr>
+                    </a:p>
+                  </a:txBody>
+                  <a:tcPr marL="9525" marR="9525" marT="9525" marB="0" anchor="b"/>
+                </a:tc>
+                <a:tc>
+                  <a:txBody>
+                    <a:bodyPr/>
+                    <a:lstStyle/>
+                    <a:p>
+                      <a:pPr algn="ctr" fontAlgn="b"/>
+                      <a:r>
+                        <a:rPr lang="fr-FR" sz="1600" u="none" strike="noStrike">
+                          <a:effectLst/>
+                          <a:latin typeface="Avenir Next LT Pro Light" panose="020B0304020202020204" pitchFamily="34" charset="0"/>
+                        </a:rPr>
+                        <a:t>1971.956</a:t>
+                      </a:r>
+                      <a:endParaRPr lang="fr-FR" sz="1600" b="0" i="0" u="none" strike="noStrike">
+                        <a:solidFill>
+                          <a:srgbClr val="000000"/>
+                        </a:solidFill>
+                        <a:effectLst/>
+                        <a:latin typeface="Avenir Next LT Pro Light" panose="020B0304020202020204" pitchFamily="34" charset="0"/>
+                      </a:endParaRPr>
+                    </a:p>
+                  </a:txBody>
+                  <a:tcPr marL="9525" marR="9525" marT="9525" marB="0" anchor="b"/>
+                </a:tc>
+                <a:tc>
+                  <a:txBody>
+                    <a:bodyPr/>
+                    <a:lstStyle/>
+                    <a:p>
+                      <a:pPr algn="ctr" fontAlgn="b"/>
+                      <a:r>
+                        <a:rPr lang="fr-FR" sz="1600" u="none" strike="noStrike">
+                          <a:effectLst/>
+                          <a:latin typeface="Avenir Next LT Pro Light" panose="020B0304020202020204" pitchFamily="34" charset="0"/>
+                        </a:rPr>
+                        <a:t>1973.0725</a:t>
+                      </a:r>
+                      <a:endParaRPr lang="fr-FR" sz="1600" b="0" i="0" u="none" strike="noStrike">
+                        <a:solidFill>
+                          <a:srgbClr val="000000"/>
+                        </a:solidFill>
+                        <a:effectLst/>
+                        <a:latin typeface="Avenir Next LT Pro Light" panose="020B0304020202020204" pitchFamily="34" charset="0"/>
+                      </a:endParaRPr>
+                    </a:p>
+                  </a:txBody>
+                  <a:tcPr marL="9525" marR="9525" marT="9525" marB="0" anchor="b"/>
+                </a:tc>
+                <a:extLst>
+                  <a:ext uri="{0D108BD9-81ED-4DB2-BD59-A6C34878D82A}">
+                    <a16:rowId xmlns:a16="http://schemas.microsoft.com/office/drawing/2014/main" val="1853222961"/>
+                  </a:ext>
+                </a:extLst>
+              </a:tr>
+              <a:tr h="288000">
+                <a:tc>
+                  <a:txBody>
+                    <a:bodyPr/>
+                    <a:lstStyle/>
+                    <a:p>
+                      <a:pPr algn="l" fontAlgn="b"/>
+                      <a:r>
+                        <a:rPr lang="fr-FR" sz="1600" u="none" strike="noStrike">
+                          <a:effectLst/>
+                          <a:latin typeface="Avenir Next LT Pro Light" panose="020B0304020202020204" pitchFamily="34" charset="0"/>
+                        </a:rPr>
+                        <a:t>s(t)psi(2T+g)p(f.g)  </a:t>
+                      </a:r>
+                      <a:endParaRPr lang="fr-FR" sz="1600" b="0" i="0" u="none" strike="noStrike">
+                        <a:solidFill>
+                          <a:srgbClr val="000000"/>
+                        </a:solidFill>
+                        <a:effectLst/>
+                        <a:latin typeface="Avenir Next LT Pro Light" panose="020B0304020202020204" pitchFamily="34" charset="0"/>
+                      </a:endParaRPr>
+                    </a:p>
+                  </a:txBody>
+                  <a:tcPr marL="9525" marR="9525" marT="9525" marB="0" anchor="b"/>
+                </a:tc>
+                <a:tc>
+                  <a:txBody>
+                    <a:bodyPr/>
+                    <a:lstStyle/>
+                    <a:p>
+                      <a:pPr algn="ctr" fontAlgn="b"/>
+                      <a:r>
+                        <a:rPr lang="fr-FR" sz="1600" u="none" strike="noStrike">
+                          <a:effectLst/>
+                          <a:latin typeface="Avenir Next LT Pro Light" panose="020B0304020202020204" pitchFamily="34" charset="0"/>
+                        </a:rPr>
+                        <a:t>32</a:t>
+                      </a:r>
+                      <a:endParaRPr lang="fr-FR" sz="1600" b="0" i="0" u="none" strike="noStrike">
+                        <a:solidFill>
+                          <a:srgbClr val="000000"/>
+                        </a:solidFill>
+                        <a:effectLst/>
+                        <a:latin typeface="Avenir Next LT Pro Light" panose="020B0304020202020204" pitchFamily="34" charset="0"/>
+                      </a:endParaRPr>
+                    </a:p>
+                  </a:txBody>
+                  <a:tcPr marL="9525" marR="9525" marT="9525" marB="0" anchor="b"/>
+                </a:tc>
+                <a:tc>
+                  <a:txBody>
+                    <a:bodyPr/>
+                    <a:lstStyle/>
+                    <a:p>
+                      <a:pPr algn="ctr" fontAlgn="b"/>
+                      <a:r>
+                        <a:rPr lang="fr-FR" sz="1600" u="none" strike="noStrike">
+                          <a:effectLst/>
+                          <a:latin typeface="Avenir Next LT Pro Light" panose="020B0304020202020204" pitchFamily="34" charset="0"/>
+                        </a:rPr>
+                        <a:t>1908.297</a:t>
+                      </a:r>
+                      <a:endParaRPr lang="fr-FR" sz="1600" b="0" i="0" u="none" strike="noStrike">
+                        <a:solidFill>
+                          <a:srgbClr val="000000"/>
+                        </a:solidFill>
+                        <a:effectLst/>
+                        <a:latin typeface="Avenir Next LT Pro Light" panose="020B0304020202020204" pitchFamily="34" charset="0"/>
+                      </a:endParaRPr>
+                    </a:p>
+                  </a:txBody>
+                  <a:tcPr marL="9525" marR="9525" marT="9525" marB="0" anchor="b"/>
+                </a:tc>
+                <a:tc>
+                  <a:txBody>
+                    <a:bodyPr/>
+                    <a:lstStyle/>
+                    <a:p>
+                      <a:pPr algn="ctr" fontAlgn="b"/>
+                      <a:r>
+                        <a:rPr lang="fr-FR" sz="1600" u="none" strike="noStrike">
+                          <a:effectLst/>
+                          <a:latin typeface="Avenir Next LT Pro Light" panose="020B0304020202020204" pitchFamily="34" charset="0"/>
+                        </a:rPr>
+                        <a:t>1972.297</a:t>
+                      </a:r>
+                      <a:endParaRPr lang="fr-FR" sz="1600" b="0" i="0" u="none" strike="noStrike">
+                        <a:solidFill>
+                          <a:srgbClr val="000000"/>
+                        </a:solidFill>
+                        <a:effectLst/>
+                        <a:latin typeface="Avenir Next LT Pro Light" panose="020B0304020202020204" pitchFamily="34" charset="0"/>
+                      </a:endParaRPr>
+                    </a:p>
+                  </a:txBody>
+                  <a:tcPr marL="9525" marR="9525" marT="9525" marB="0" anchor="b"/>
+                </a:tc>
+                <a:tc>
+                  <a:txBody>
+                    <a:bodyPr/>
+                    <a:lstStyle/>
+                    <a:p>
+                      <a:pPr algn="ctr" fontAlgn="b"/>
+                      <a:r>
+                        <a:rPr lang="fr-FR" sz="1600" u="none" strike="noStrike">
+                          <a:effectLst/>
+                          <a:latin typeface="Avenir Next LT Pro Light" panose="020B0304020202020204" pitchFamily="34" charset="0"/>
+                        </a:rPr>
+                        <a:t>1973.5663</a:t>
+                      </a:r>
+                      <a:endParaRPr lang="fr-FR" sz="1600" b="0" i="0" u="none" strike="noStrike">
+                        <a:solidFill>
+                          <a:srgbClr val="000000"/>
+                        </a:solidFill>
+                        <a:effectLst/>
+                        <a:latin typeface="Avenir Next LT Pro Light" panose="020B0304020202020204" pitchFamily="34" charset="0"/>
+                      </a:endParaRPr>
+                    </a:p>
+                  </a:txBody>
+                  <a:tcPr marL="9525" marR="9525" marT="9525" marB="0" anchor="b"/>
+                </a:tc>
+                <a:extLst>
+                  <a:ext uri="{0D108BD9-81ED-4DB2-BD59-A6C34878D82A}">
+                    <a16:rowId xmlns:a16="http://schemas.microsoft.com/office/drawing/2014/main" val="2451930557"/>
+                  </a:ext>
+                </a:extLst>
+              </a:tr>
+              <a:tr h="288000">
+                <a:tc>
+                  <a:txBody>
+                    <a:bodyPr/>
+                    <a:lstStyle/>
+                    <a:p>
+                      <a:pPr algn="l" fontAlgn="b"/>
+                      <a:r>
+                        <a:rPr lang="fr-FR" sz="1600" u="none" strike="noStrike">
+                          <a:effectLst/>
+                          <a:latin typeface="Avenir Next LT Pro Light" panose="020B0304020202020204" pitchFamily="34" charset="0"/>
+                        </a:rPr>
+                        <a:t>s(t)psi(2T)p(f.g)  </a:t>
+                      </a:r>
+                      <a:endParaRPr lang="fr-FR" sz="1600" b="0" i="0" u="none" strike="noStrike">
+                        <a:solidFill>
+                          <a:srgbClr val="000000"/>
+                        </a:solidFill>
+                        <a:effectLst/>
+                        <a:latin typeface="Avenir Next LT Pro Light" panose="020B0304020202020204" pitchFamily="34" charset="0"/>
+                      </a:endParaRPr>
+                    </a:p>
+                  </a:txBody>
+                  <a:tcPr marL="9525" marR="9525" marT="9525" marB="0" anchor="b"/>
+                </a:tc>
+                <a:tc>
+                  <a:txBody>
+                    <a:bodyPr/>
+                    <a:lstStyle/>
+                    <a:p>
+                      <a:pPr algn="ctr" fontAlgn="b"/>
+                      <a:r>
+                        <a:rPr lang="fr-FR" sz="1600" u="none" strike="noStrike">
+                          <a:effectLst/>
+                          <a:latin typeface="Avenir Next LT Pro Light" panose="020B0304020202020204" pitchFamily="34" charset="0"/>
+                        </a:rPr>
+                        <a:t>31</a:t>
+                      </a:r>
+                      <a:endParaRPr lang="fr-FR" sz="1600" b="0" i="0" u="none" strike="noStrike">
+                        <a:solidFill>
+                          <a:srgbClr val="000000"/>
+                        </a:solidFill>
+                        <a:effectLst/>
+                        <a:latin typeface="Avenir Next LT Pro Light" panose="020B0304020202020204" pitchFamily="34" charset="0"/>
+                      </a:endParaRPr>
+                    </a:p>
+                  </a:txBody>
+                  <a:tcPr marL="9525" marR="9525" marT="9525" marB="0" anchor="b"/>
+                </a:tc>
+                <a:tc>
+                  <a:txBody>
+                    <a:bodyPr/>
+                    <a:lstStyle/>
+                    <a:p>
+                      <a:pPr algn="ctr" fontAlgn="b"/>
+                      <a:r>
+                        <a:rPr lang="fr-FR" sz="1600" u="none" strike="noStrike">
+                          <a:effectLst/>
+                          <a:latin typeface="Avenir Next LT Pro Light" panose="020B0304020202020204" pitchFamily="34" charset="0"/>
+                        </a:rPr>
+                        <a:t>1910.6514</a:t>
+                      </a:r>
+                      <a:endParaRPr lang="fr-FR" sz="1600" b="0" i="0" u="none" strike="noStrike">
+                        <a:solidFill>
+                          <a:srgbClr val="000000"/>
+                        </a:solidFill>
+                        <a:effectLst/>
+                        <a:latin typeface="Avenir Next LT Pro Light" panose="020B0304020202020204" pitchFamily="34" charset="0"/>
+                      </a:endParaRPr>
+                    </a:p>
+                  </a:txBody>
+                  <a:tcPr marL="9525" marR="9525" marT="9525" marB="0" anchor="b"/>
+                </a:tc>
+                <a:tc>
+                  <a:txBody>
+                    <a:bodyPr/>
+                    <a:lstStyle/>
+                    <a:p>
+                      <a:pPr algn="ctr" fontAlgn="b"/>
+                      <a:r>
+                        <a:rPr lang="fr-FR" sz="1600" u="none" strike="noStrike">
+                          <a:effectLst/>
+                          <a:latin typeface="Avenir Next LT Pro Light" panose="020B0304020202020204" pitchFamily="34" charset="0"/>
+                        </a:rPr>
+                        <a:t>1972.6514</a:t>
+                      </a:r>
+                      <a:endParaRPr lang="fr-FR" sz="1600" b="0" i="0" u="none" strike="noStrike">
+                        <a:solidFill>
+                          <a:srgbClr val="000000"/>
+                        </a:solidFill>
+                        <a:effectLst/>
+                        <a:latin typeface="Avenir Next LT Pro Light" panose="020B0304020202020204" pitchFamily="34" charset="0"/>
+                      </a:endParaRPr>
+                    </a:p>
+                  </a:txBody>
+                  <a:tcPr marL="9525" marR="9525" marT="9525" marB="0" anchor="b"/>
+                </a:tc>
+                <a:tc>
+                  <a:txBody>
+                    <a:bodyPr/>
+                    <a:lstStyle/>
+                    <a:p>
+                      <a:pPr algn="ctr" fontAlgn="b"/>
+                      <a:r>
+                        <a:rPr lang="fr-FR" sz="1600" u="none" strike="noStrike">
+                          <a:effectLst/>
+                          <a:latin typeface="Avenir Next LT Pro Light" panose="020B0304020202020204" pitchFamily="34" charset="0"/>
+                        </a:rPr>
+                        <a:t>1973.843</a:t>
+                      </a:r>
+                      <a:endParaRPr lang="fr-FR" sz="1600" b="0" i="0" u="none" strike="noStrike">
+                        <a:solidFill>
+                          <a:srgbClr val="000000"/>
+                        </a:solidFill>
+                        <a:effectLst/>
+                        <a:latin typeface="Avenir Next LT Pro Light" panose="020B0304020202020204" pitchFamily="34" charset="0"/>
+                      </a:endParaRPr>
+                    </a:p>
+                  </a:txBody>
+                  <a:tcPr marL="9525" marR="9525" marT="9525" marB="0" anchor="b"/>
+                </a:tc>
+                <a:extLst>
+                  <a:ext uri="{0D108BD9-81ED-4DB2-BD59-A6C34878D82A}">
+                    <a16:rowId xmlns:a16="http://schemas.microsoft.com/office/drawing/2014/main" val="634564318"/>
+                  </a:ext>
+                </a:extLst>
+              </a:tr>
+              <a:tr h="288000">
+                <a:tc>
+                  <a:txBody>
+                    <a:bodyPr/>
+                    <a:lstStyle/>
+                    <a:p>
+                      <a:pPr algn="l" fontAlgn="b"/>
+                      <a:r>
+                        <a:rPr lang="fr-FR" sz="1600" u="none" strike="noStrike">
+                          <a:effectLst/>
+                          <a:latin typeface="Avenir Next LT Pro Light" panose="020B0304020202020204" pitchFamily="34" charset="0"/>
+                        </a:rPr>
+                        <a:t>s(t)psi(3T+g)p(f)  </a:t>
+                      </a:r>
+                      <a:endParaRPr lang="fr-FR" sz="1600" b="0" i="0" u="none" strike="noStrike">
+                        <a:solidFill>
+                          <a:srgbClr val="000000"/>
+                        </a:solidFill>
+                        <a:effectLst/>
+                        <a:latin typeface="Avenir Next LT Pro Light" panose="020B0304020202020204" pitchFamily="34" charset="0"/>
+                      </a:endParaRPr>
+                    </a:p>
+                  </a:txBody>
+                  <a:tcPr marL="9525" marR="9525" marT="9525" marB="0" anchor="b"/>
+                </a:tc>
+                <a:tc>
+                  <a:txBody>
+                    <a:bodyPr/>
+                    <a:lstStyle/>
+                    <a:p>
+                      <a:pPr algn="ctr" fontAlgn="b"/>
+                      <a:r>
+                        <a:rPr lang="fr-FR" sz="1600" u="none" strike="noStrike">
+                          <a:effectLst/>
+                          <a:latin typeface="Avenir Next LT Pro Light" panose="020B0304020202020204" pitchFamily="34" charset="0"/>
+                        </a:rPr>
+                        <a:t>35</a:t>
+                      </a:r>
+                      <a:endParaRPr lang="fr-FR" sz="1600" b="0" i="0" u="none" strike="noStrike">
+                        <a:solidFill>
+                          <a:srgbClr val="000000"/>
+                        </a:solidFill>
+                        <a:effectLst/>
+                        <a:latin typeface="Avenir Next LT Pro Light" panose="020B0304020202020204" pitchFamily="34" charset="0"/>
+                      </a:endParaRPr>
+                    </a:p>
+                  </a:txBody>
+                  <a:tcPr marL="9525" marR="9525" marT="9525" marB="0" anchor="b"/>
+                </a:tc>
+                <a:tc>
+                  <a:txBody>
+                    <a:bodyPr/>
+                    <a:lstStyle/>
+                    <a:p>
+                      <a:pPr algn="ctr" fontAlgn="b"/>
+                      <a:r>
+                        <a:rPr lang="fr-FR" sz="1600" u="none" strike="noStrike">
+                          <a:effectLst/>
+                          <a:latin typeface="Avenir Next LT Pro Light" panose="020B0304020202020204" pitchFamily="34" charset="0"/>
+                        </a:rPr>
+                        <a:t>1903.9585</a:t>
+                      </a:r>
+                      <a:endParaRPr lang="fr-FR" sz="1600" b="0" i="0" u="none" strike="noStrike">
+                        <a:solidFill>
+                          <a:srgbClr val="000000"/>
+                        </a:solidFill>
+                        <a:effectLst/>
+                        <a:latin typeface="Avenir Next LT Pro Light" panose="020B0304020202020204" pitchFamily="34" charset="0"/>
+                      </a:endParaRPr>
+                    </a:p>
+                  </a:txBody>
+                  <a:tcPr marL="9525" marR="9525" marT="9525" marB="0" anchor="b"/>
+                </a:tc>
+                <a:tc>
+                  <a:txBody>
+                    <a:bodyPr/>
+                    <a:lstStyle/>
+                    <a:p>
+                      <a:pPr algn="ctr" fontAlgn="b"/>
+                      <a:r>
+                        <a:rPr lang="fr-FR" sz="1600" u="none" strike="noStrike">
+                          <a:effectLst/>
+                          <a:latin typeface="Avenir Next LT Pro Light" panose="020B0304020202020204" pitchFamily="34" charset="0"/>
+                        </a:rPr>
+                        <a:t>1973.9585</a:t>
+                      </a:r>
+                      <a:endParaRPr lang="fr-FR" sz="1600" b="0" i="0" u="none" strike="noStrike">
+                        <a:solidFill>
+                          <a:srgbClr val="000000"/>
+                        </a:solidFill>
+                        <a:effectLst/>
+                        <a:latin typeface="Avenir Next LT Pro Light" panose="020B0304020202020204" pitchFamily="34" charset="0"/>
+                      </a:endParaRPr>
+                    </a:p>
+                  </a:txBody>
+                  <a:tcPr marL="9525" marR="9525" marT="9525" marB="0" anchor="b"/>
+                </a:tc>
+                <a:tc>
+                  <a:txBody>
+                    <a:bodyPr/>
+                    <a:lstStyle/>
+                    <a:p>
+                      <a:pPr algn="ctr" fontAlgn="b"/>
+                      <a:r>
+                        <a:rPr lang="fr-FR" sz="1600" u="none" strike="noStrike" dirty="0">
+                          <a:effectLst/>
+                          <a:latin typeface="Avenir Next LT Pro Light" panose="020B0304020202020204" pitchFamily="34" charset="0"/>
+                        </a:rPr>
+                        <a:t>1975.4756</a:t>
+                      </a:r>
+                      <a:endParaRPr lang="fr-FR" sz="1600" b="0" i="0" u="none" strike="noStrike" dirty="0">
+                        <a:solidFill>
+                          <a:srgbClr val="000000"/>
+                        </a:solidFill>
+                        <a:effectLst/>
+                        <a:latin typeface="Avenir Next LT Pro Light" panose="020B0304020202020204" pitchFamily="34" charset="0"/>
+                      </a:endParaRPr>
+                    </a:p>
+                  </a:txBody>
+                  <a:tcPr marL="9525" marR="9525" marT="9525" marB="0" anchor="b"/>
+                </a:tc>
+                <a:extLst>
+                  <a:ext uri="{0D108BD9-81ED-4DB2-BD59-A6C34878D82A}">
+                    <a16:rowId xmlns:a16="http://schemas.microsoft.com/office/drawing/2014/main" val="3889847119"/>
+                  </a:ext>
+                </a:extLst>
+              </a:tr>
+              <a:tr h="288000">
+                <a:tc>
+                  <a:txBody>
+                    <a:bodyPr/>
+                    <a:lstStyle/>
+                    <a:p>
+                      <a:pPr algn="l" fontAlgn="b"/>
+                      <a:r>
+                        <a:rPr lang="fr-FR" sz="1600" u="none" strike="noStrike">
+                          <a:effectLst/>
+                          <a:latin typeface="Avenir Next LT Pro Light" panose="020B0304020202020204" pitchFamily="34" charset="0"/>
+                        </a:rPr>
+                        <a:t>s(t)psi(3T+g)p(f) </a:t>
+                      </a:r>
+                      <a:endParaRPr lang="fr-FR" sz="1600" b="0" i="0" u="none" strike="noStrike">
+                        <a:solidFill>
+                          <a:srgbClr val="000000"/>
+                        </a:solidFill>
+                        <a:effectLst/>
+                        <a:latin typeface="Avenir Next LT Pro Light" panose="020B0304020202020204" pitchFamily="34" charset="0"/>
+                      </a:endParaRPr>
+                    </a:p>
+                  </a:txBody>
+                  <a:tcPr marL="9525" marR="9525" marT="9525" marB="0" anchor="b"/>
+                </a:tc>
+                <a:tc>
+                  <a:txBody>
+                    <a:bodyPr/>
+                    <a:lstStyle/>
+                    <a:p>
+                      <a:pPr algn="ctr" fontAlgn="b"/>
+                      <a:r>
+                        <a:rPr lang="fr-FR" sz="1600" u="none" strike="noStrike">
+                          <a:effectLst/>
+                          <a:latin typeface="Avenir Next LT Pro Light" panose="020B0304020202020204" pitchFamily="34" charset="0"/>
+                        </a:rPr>
+                        <a:t>35</a:t>
+                      </a:r>
+                      <a:endParaRPr lang="fr-FR" sz="1600" b="0" i="0" u="none" strike="noStrike">
+                        <a:solidFill>
+                          <a:srgbClr val="000000"/>
+                        </a:solidFill>
+                        <a:effectLst/>
+                        <a:latin typeface="Avenir Next LT Pro Light" panose="020B0304020202020204" pitchFamily="34" charset="0"/>
+                      </a:endParaRPr>
+                    </a:p>
+                  </a:txBody>
+                  <a:tcPr marL="9525" marR="9525" marT="9525" marB="0" anchor="b"/>
+                </a:tc>
+                <a:tc>
+                  <a:txBody>
+                    <a:bodyPr/>
+                    <a:lstStyle/>
+                    <a:p>
+                      <a:pPr algn="ctr" fontAlgn="b"/>
+                      <a:r>
+                        <a:rPr lang="fr-FR" sz="1600" u="none" strike="noStrike">
+                          <a:effectLst/>
+                          <a:latin typeface="Avenir Next LT Pro Light" panose="020B0304020202020204" pitchFamily="34" charset="0"/>
+                        </a:rPr>
+                        <a:t>1903.9585</a:t>
+                      </a:r>
+                      <a:endParaRPr lang="fr-FR" sz="1600" b="0" i="0" u="none" strike="noStrike">
+                        <a:solidFill>
+                          <a:srgbClr val="000000"/>
+                        </a:solidFill>
+                        <a:effectLst/>
+                        <a:latin typeface="Avenir Next LT Pro Light" panose="020B0304020202020204" pitchFamily="34" charset="0"/>
+                      </a:endParaRPr>
+                    </a:p>
+                  </a:txBody>
+                  <a:tcPr marL="9525" marR="9525" marT="9525" marB="0" anchor="b"/>
+                </a:tc>
+                <a:tc>
+                  <a:txBody>
+                    <a:bodyPr/>
+                    <a:lstStyle/>
+                    <a:p>
+                      <a:pPr algn="ctr" fontAlgn="b"/>
+                      <a:r>
+                        <a:rPr lang="fr-FR" sz="1600" u="none" strike="noStrike">
+                          <a:effectLst/>
+                          <a:latin typeface="Avenir Next LT Pro Light" panose="020B0304020202020204" pitchFamily="34" charset="0"/>
+                        </a:rPr>
+                        <a:t>1973.9585</a:t>
+                      </a:r>
+                      <a:endParaRPr lang="fr-FR" sz="1600" b="0" i="0" u="none" strike="noStrike">
+                        <a:solidFill>
+                          <a:srgbClr val="000000"/>
+                        </a:solidFill>
+                        <a:effectLst/>
+                        <a:latin typeface="Avenir Next LT Pro Light" panose="020B0304020202020204" pitchFamily="34" charset="0"/>
+                      </a:endParaRPr>
+                    </a:p>
+                  </a:txBody>
+                  <a:tcPr marL="9525" marR="9525" marT="9525" marB="0" anchor="b"/>
+                </a:tc>
+                <a:tc>
+                  <a:txBody>
+                    <a:bodyPr/>
+                    <a:lstStyle/>
+                    <a:p>
+                      <a:pPr algn="ctr" fontAlgn="b"/>
+                      <a:r>
+                        <a:rPr lang="fr-FR" sz="1600" u="none" strike="noStrike" dirty="0">
+                          <a:effectLst/>
+                          <a:latin typeface="Avenir Next LT Pro Light" panose="020B0304020202020204" pitchFamily="34" charset="0"/>
+                        </a:rPr>
+                        <a:t>1975.4756</a:t>
+                      </a:r>
+                      <a:endParaRPr lang="fr-FR" sz="1600" b="0" i="0" u="none" strike="noStrike" dirty="0">
+                        <a:solidFill>
+                          <a:srgbClr val="000000"/>
+                        </a:solidFill>
+                        <a:effectLst/>
+                        <a:latin typeface="Avenir Next LT Pro Light" panose="020B0304020202020204" pitchFamily="34" charset="0"/>
+                      </a:endParaRPr>
+                    </a:p>
+                  </a:txBody>
+                  <a:tcPr marL="9525" marR="9525" marT="9525" marB="0" anchor="b"/>
+                </a:tc>
+                <a:extLst>
+                  <a:ext uri="{0D108BD9-81ED-4DB2-BD59-A6C34878D82A}">
+                    <a16:rowId xmlns:a16="http://schemas.microsoft.com/office/drawing/2014/main" val="3155017008"/>
+                  </a:ext>
+                </a:extLst>
+              </a:tr>
+              <a:tr h="288000">
+                <a:tc>
+                  <a:txBody>
+                    <a:bodyPr/>
+                    <a:lstStyle/>
+                    <a:p>
+                      <a:pPr algn="l" fontAlgn="b"/>
+                      <a:r>
+                        <a:rPr lang="fr-FR" sz="1600" u="none" strike="noStrike">
+                          <a:effectLst/>
+                          <a:latin typeface="Avenir Next LT Pro Light" panose="020B0304020202020204" pitchFamily="34" charset="0"/>
+                        </a:rPr>
+                        <a:t>s(t)psi(3T)p(f) </a:t>
+                      </a:r>
+                      <a:endParaRPr lang="fr-FR" sz="1600" b="0" i="0" u="none" strike="noStrike">
+                        <a:solidFill>
+                          <a:srgbClr val="000000"/>
+                        </a:solidFill>
+                        <a:effectLst/>
+                        <a:latin typeface="Avenir Next LT Pro Light" panose="020B0304020202020204" pitchFamily="34" charset="0"/>
+                      </a:endParaRPr>
+                    </a:p>
+                  </a:txBody>
+                  <a:tcPr marL="9525" marR="9525" marT="9525" marB="0" anchor="b"/>
+                </a:tc>
+                <a:tc>
+                  <a:txBody>
+                    <a:bodyPr/>
+                    <a:lstStyle/>
+                    <a:p>
+                      <a:pPr algn="ctr" fontAlgn="b"/>
+                      <a:r>
+                        <a:rPr lang="fr-FR" sz="1600" u="none" strike="noStrike">
+                          <a:effectLst/>
+                          <a:latin typeface="Avenir Next LT Pro Light" panose="020B0304020202020204" pitchFamily="34" charset="0"/>
+                        </a:rPr>
+                        <a:t>34</a:t>
+                      </a:r>
+                      <a:endParaRPr lang="fr-FR" sz="1600" b="0" i="0" u="none" strike="noStrike">
+                        <a:solidFill>
+                          <a:srgbClr val="000000"/>
+                        </a:solidFill>
+                        <a:effectLst/>
+                        <a:latin typeface="Avenir Next LT Pro Light" panose="020B0304020202020204" pitchFamily="34" charset="0"/>
+                      </a:endParaRPr>
+                    </a:p>
+                  </a:txBody>
+                  <a:tcPr marL="9525" marR="9525" marT="9525" marB="0" anchor="b"/>
+                </a:tc>
+                <a:tc>
+                  <a:txBody>
+                    <a:bodyPr/>
+                    <a:lstStyle/>
+                    <a:p>
+                      <a:pPr algn="ctr" fontAlgn="b"/>
+                      <a:r>
+                        <a:rPr lang="fr-FR" sz="1600" u="none" strike="noStrike">
+                          <a:effectLst/>
+                          <a:latin typeface="Avenir Next LT Pro Light" panose="020B0304020202020204" pitchFamily="34" charset="0"/>
+                        </a:rPr>
+                        <a:t>1906.2005</a:t>
+                      </a:r>
+                      <a:endParaRPr lang="fr-FR" sz="1600" b="0" i="0" u="none" strike="noStrike">
+                        <a:solidFill>
+                          <a:srgbClr val="000000"/>
+                        </a:solidFill>
+                        <a:effectLst/>
+                        <a:latin typeface="Avenir Next LT Pro Light" panose="020B0304020202020204" pitchFamily="34" charset="0"/>
+                      </a:endParaRPr>
+                    </a:p>
+                  </a:txBody>
+                  <a:tcPr marL="9525" marR="9525" marT="9525" marB="0" anchor="b"/>
+                </a:tc>
+                <a:tc>
+                  <a:txBody>
+                    <a:bodyPr/>
+                    <a:lstStyle/>
+                    <a:p>
+                      <a:pPr algn="ctr" fontAlgn="b"/>
+                      <a:r>
+                        <a:rPr lang="fr-FR" sz="1600" u="none" strike="noStrike">
+                          <a:effectLst/>
+                          <a:latin typeface="Avenir Next LT Pro Light" panose="020B0304020202020204" pitchFamily="34" charset="0"/>
+                        </a:rPr>
+                        <a:t>1974.2005</a:t>
+                      </a:r>
+                      <a:endParaRPr lang="fr-FR" sz="1600" b="0" i="0" u="none" strike="noStrike">
+                        <a:solidFill>
+                          <a:srgbClr val="000000"/>
+                        </a:solidFill>
+                        <a:effectLst/>
+                        <a:latin typeface="Avenir Next LT Pro Light" panose="020B0304020202020204" pitchFamily="34" charset="0"/>
+                      </a:endParaRPr>
+                    </a:p>
+                  </a:txBody>
+                  <a:tcPr marL="9525" marR="9525" marT="9525" marB="0" anchor="b"/>
+                </a:tc>
+                <a:tc>
+                  <a:txBody>
+                    <a:bodyPr/>
+                    <a:lstStyle/>
+                    <a:p>
+                      <a:pPr algn="ctr" fontAlgn="b"/>
+                      <a:r>
+                        <a:rPr lang="fr-FR" sz="1600" u="none" strike="noStrike" dirty="0">
+                          <a:effectLst/>
+                          <a:latin typeface="Avenir Next LT Pro Light" panose="020B0304020202020204" pitchFamily="34" charset="0"/>
+                        </a:rPr>
+                        <a:t>1975.6325</a:t>
+                      </a:r>
+                      <a:endParaRPr lang="fr-FR" sz="1600" b="0" i="0" u="none" strike="noStrike" dirty="0">
+                        <a:solidFill>
+                          <a:srgbClr val="000000"/>
+                        </a:solidFill>
+                        <a:effectLst/>
+                        <a:latin typeface="Avenir Next LT Pro Light" panose="020B0304020202020204" pitchFamily="34" charset="0"/>
+                      </a:endParaRPr>
+                    </a:p>
+                  </a:txBody>
+                  <a:tcPr marL="9525" marR="9525" marT="9525" marB="0" anchor="b"/>
+                </a:tc>
+                <a:extLst>
+                  <a:ext uri="{0D108BD9-81ED-4DB2-BD59-A6C34878D82A}">
+                    <a16:rowId xmlns:a16="http://schemas.microsoft.com/office/drawing/2014/main" val="1294626162"/>
+                  </a:ext>
+                </a:extLst>
+              </a:tr>
+              <a:tr h="288000">
+                <a:tc>
+                  <a:txBody>
+                    <a:bodyPr/>
+                    <a:lstStyle/>
+                    <a:p>
+                      <a:pPr algn="l" fontAlgn="b"/>
+                      <a:r>
+                        <a:rPr lang="fr-FR" sz="1600" u="none" strike="noStrike">
+                          <a:effectLst/>
+                          <a:latin typeface="Avenir Next LT Pro Light" panose="020B0304020202020204" pitchFamily="34" charset="0"/>
+                        </a:rPr>
+                        <a:t>s(g+t)psi(2T+g)p(f.g)  </a:t>
+                      </a:r>
+                      <a:endParaRPr lang="fr-FR" sz="1600" b="0" i="0" u="none" strike="noStrike">
+                        <a:solidFill>
+                          <a:srgbClr val="000000"/>
+                        </a:solidFill>
+                        <a:effectLst/>
+                        <a:latin typeface="Avenir Next LT Pro Light" panose="020B0304020202020204" pitchFamily="34" charset="0"/>
+                      </a:endParaRPr>
+                    </a:p>
+                  </a:txBody>
+                  <a:tcPr marL="9525" marR="9525" marT="9525" marB="0" anchor="b"/>
+                </a:tc>
+                <a:tc>
+                  <a:txBody>
+                    <a:bodyPr/>
+                    <a:lstStyle/>
+                    <a:p>
+                      <a:pPr algn="ctr" fontAlgn="b"/>
+                      <a:r>
+                        <a:rPr lang="fr-FR" sz="1600" u="none" strike="noStrike">
+                          <a:effectLst/>
+                          <a:latin typeface="Avenir Next LT Pro Light" panose="020B0304020202020204" pitchFamily="34" charset="0"/>
+                        </a:rPr>
+                        <a:t>33</a:t>
+                      </a:r>
+                      <a:endParaRPr lang="fr-FR" sz="1600" b="0" i="0" u="none" strike="noStrike">
+                        <a:solidFill>
+                          <a:srgbClr val="000000"/>
+                        </a:solidFill>
+                        <a:effectLst/>
+                        <a:latin typeface="Avenir Next LT Pro Light" panose="020B0304020202020204" pitchFamily="34" charset="0"/>
+                      </a:endParaRPr>
+                    </a:p>
+                  </a:txBody>
+                  <a:tcPr marL="9525" marR="9525" marT="9525" marB="0" anchor="b"/>
+                </a:tc>
+                <a:tc>
+                  <a:txBody>
+                    <a:bodyPr/>
+                    <a:lstStyle/>
+                    <a:p>
+                      <a:pPr algn="ctr" fontAlgn="b"/>
+                      <a:r>
+                        <a:rPr lang="fr-FR" sz="1600" u="none" strike="noStrike">
+                          <a:effectLst/>
+                          <a:latin typeface="Avenir Next LT Pro Light" panose="020B0304020202020204" pitchFamily="34" charset="0"/>
+                        </a:rPr>
+                        <a:t>1908.2209</a:t>
+                      </a:r>
+                      <a:endParaRPr lang="fr-FR" sz="1600" b="0" i="0" u="none" strike="noStrike">
+                        <a:solidFill>
+                          <a:srgbClr val="000000"/>
+                        </a:solidFill>
+                        <a:effectLst/>
+                        <a:latin typeface="Avenir Next LT Pro Light" panose="020B0304020202020204" pitchFamily="34" charset="0"/>
+                      </a:endParaRPr>
+                    </a:p>
+                  </a:txBody>
+                  <a:tcPr marL="9525" marR="9525" marT="9525" marB="0" anchor="b"/>
+                </a:tc>
+                <a:tc>
+                  <a:txBody>
+                    <a:bodyPr/>
+                    <a:lstStyle/>
+                    <a:p>
+                      <a:pPr algn="ctr" fontAlgn="b"/>
+                      <a:r>
+                        <a:rPr lang="fr-FR" sz="1600" u="none" strike="noStrike">
+                          <a:effectLst/>
+                          <a:latin typeface="Avenir Next LT Pro Light" panose="020B0304020202020204" pitchFamily="34" charset="0"/>
+                        </a:rPr>
+                        <a:t>1974.2209</a:t>
+                      </a:r>
+                      <a:endParaRPr lang="fr-FR" sz="1600" b="0" i="0" u="none" strike="noStrike">
+                        <a:solidFill>
+                          <a:srgbClr val="000000"/>
+                        </a:solidFill>
+                        <a:effectLst/>
+                        <a:latin typeface="Avenir Next LT Pro Light" panose="020B0304020202020204" pitchFamily="34" charset="0"/>
+                      </a:endParaRPr>
+                    </a:p>
+                  </a:txBody>
+                  <a:tcPr marL="9525" marR="9525" marT="9525" marB="0" anchor="b"/>
+                </a:tc>
+                <a:tc>
+                  <a:txBody>
+                    <a:bodyPr/>
+                    <a:lstStyle/>
+                    <a:p>
+                      <a:pPr algn="ctr" fontAlgn="b"/>
+                      <a:r>
+                        <a:rPr lang="fr-FR" sz="1600" u="none" strike="noStrike" dirty="0">
+                          <a:effectLst/>
+                          <a:latin typeface="Avenir Next LT Pro Light" panose="020B0304020202020204" pitchFamily="34" charset="0"/>
+                        </a:rPr>
+                        <a:t>1975.5703</a:t>
+                      </a:r>
+                      <a:endParaRPr lang="fr-FR" sz="1600" b="0" i="0" u="none" strike="noStrike" dirty="0">
+                        <a:solidFill>
+                          <a:srgbClr val="000000"/>
+                        </a:solidFill>
+                        <a:effectLst/>
+                        <a:latin typeface="Avenir Next LT Pro Light" panose="020B0304020202020204" pitchFamily="34" charset="0"/>
+                      </a:endParaRPr>
+                    </a:p>
+                  </a:txBody>
+                  <a:tcPr marL="9525" marR="9525" marT="9525" marB="0" anchor="b"/>
+                </a:tc>
+                <a:extLst>
+                  <a:ext uri="{0D108BD9-81ED-4DB2-BD59-A6C34878D82A}">
+                    <a16:rowId xmlns:a16="http://schemas.microsoft.com/office/drawing/2014/main" val="4162019316"/>
+                  </a:ext>
+                </a:extLst>
+              </a:tr>
+              <a:tr h="288000">
+                <a:tc>
+                  <a:txBody>
+                    <a:bodyPr/>
+                    <a:lstStyle/>
+                    <a:p>
+                      <a:pPr algn="l" fontAlgn="b"/>
+                      <a:r>
+                        <a:rPr lang="fr-FR" sz="1600" u="none" strike="noStrike">
+                          <a:effectLst/>
+                          <a:latin typeface="Avenir Next LT Pro Light" panose="020B0304020202020204" pitchFamily="34" charset="0"/>
+                        </a:rPr>
+                        <a:t>s(g+t)psi(2T)p(f.g) </a:t>
+                      </a:r>
+                      <a:endParaRPr lang="fr-FR" sz="1600" b="0" i="0" u="none" strike="noStrike">
+                        <a:solidFill>
+                          <a:srgbClr val="000000"/>
+                        </a:solidFill>
+                        <a:effectLst/>
+                        <a:latin typeface="Avenir Next LT Pro Light" panose="020B0304020202020204" pitchFamily="34" charset="0"/>
+                      </a:endParaRPr>
+                    </a:p>
+                  </a:txBody>
+                  <a:tcPr marL="9525" marR="9525" marT="9525" marB="0" anchor="b"/>
+                </a:tc>
+                <a:tc>
+                  <a:txBody>
+                    <a:bodyPr/>
+                    <a:lstStyle/>
+                    <a:p>
+                      <a:pPr algn="ctr" fontAlgn="b"/>
+                      <a:r>
+                        <a:rPr lang="fr-FR" sz="1600" u="none" strike="noStrike">
+                          <a:effectLst/>
+                          <a:latin typeface="Avenir Next LT Pro Light" panose="020B0304020202020204" pitchFamily="34" charset="0"/>
+                        </a:rPr>
+                        <a:t>32</a:t>
+                      </a:r>
+                      <a:endParaRPr lang="fr-FR" sz="1600" b="0" i="0" u="none" strike="noStrike">
+                        <a:solidFill>
+                          <a:srgbClr val="000000"/>
+                        </a:solidFill>
+                        <a:effectLst/>
+                        <a:latin typeface="Avenir Next LT Pro Light" panose="020B0304020202020204" pitchFamily="34" charset="0"/>
+                      </a:endParaRPr>
+                    </a:p>
+                  </a:txBody>
+                  <a:tcPr marL="9525" marR="9525" marT="9525" marB="0" anchor="b"/>
+                </a:tc>
+                <a:tc>
+                  <a:txBody>
+                    <a:bodyPr/>
+                    <a:lstStyle/>
+                    <a:p>
+                      <a:pPr algn="ctr" fontAlgn="b"/>
+                      <a:r>
+                        <a:rPr lang="fr-FR" sz="1600" u="none" strike="noStrike">
+                          <a:effectLst/>
+                          <a:latin typeface="Avenir Next LT Pro Light" panose="020B0304020202020204" pitchFamily="34" charset="0"/>
+                        </a:rPr>
+                        <a:t>1910.5707</a:t>
+                      </a:r>
+                      <a:endParaRPr lang="fr-FR" sz="1600" b="0" i="0" u="none" strike="noStrike">
+                        <a:solidFill>
+                          <a:srgbClr val="000000"/>
+                        </a:solidFill>
+                        <a:effectLst/>
+                        <a:latin typeface="Avenir Next LT Pro Light" panose="020B0304020202020204" pitchFamily="34" charset="0"/>
+                      </a:endParaRPr>
+                    </a:p>
+                  </a:txBody>
+                  <a:tcPr marL="9525" marR="9525" marT="9525" marB="0" anchor="b"/>
+                </a:tc>
+                <a:tc>
+                  <a:txBody>
+                    <a:bodyPr/>
+                    <a:lstStyle/>
+                    <a:p>
+                      <a:pPr algn="ctr" fontAlgn="b"/>
+                      <a:r>
+                        <a:rPr lang="fr-FR" sz="1600" u="none" strike="noStrike">
+                          <a:effectLst/>
+                          <a:latin typeface="Avenir Next LT Pro Light" panose="020B0304020202020204" pitchFamily="34" charset="0"/>
+                        </a:rPr>
+                        <a:t>1974.5707</a:t>
+                      </a:r>
+                      <a:endParaRPr lang="fr-FR" sz="1600" b="0" i="0" u="none" strike="noStrike">
+                        <a:solidFill>
+                          <a:srgbClr val="000000"/>
+                        </a:solidFill>
+                        <a:effectLst/>
+                        <a:latin typeface="Avenir Next LT Pro Light" panose="020B0304020202020204" pitchFamily="34" charset="0"/>
+                      </a:endParaRPr>
+                    </a:p>
+                  </a:txBody>
+                  <a:tcPr marL="9525" marR="9525" marT="9525" marB="0" anchor="b"/>
+                </a:tc>
+                <a:tc>
+                  <a:txBody>
+                    <a:bodyPr/>
+                    <a:lstStyle/>
+                    <a:p>
+                      <a:pPr algn="ctr" fontAlgn="b"/>
+                      <a:r>
+                        <a:rPr lang="fr-FR" sz="1600" u="none" strike="noStrike" dirty="0">
+                          <a:effectLst/>
+                          <a:latin typeface="Avenir Next LT Pro Light" panose="020B0304020202020204" pitchFamily="34" charset="0"/>
+                        </a:rPr>
+                        <a:t>1975.8399</a:t>
+                      </a:r>
+                      <a:endParaRPr lang="fr-FR" sz="1600" b="0" i="0" u="none" strike="noStrike" dirty="0">
+                        <a:solidFill>
+                          <a:srgbClr val="000000"/>
+                        </a:solidFill>
+                        <a:effectLst/>
+                        <a:latin typeface="Avenir Next LT Pro Light" panose="020B0304020202020204" pitchFamily="34" charset="0"/>
+                      </a:endParaRPr>
+                    </a:p>
+                  </a:txBody>
+                  <a:tcPr marL="9525" marR="9525" marT="9525" marB="0" anchor="b"/>
+                </a:tc>
+                <a:extLst>
+                  <a:ext uri="{0D108BD9-81ED-4DB2-BD59-A6C34878D82A}">
+                    <a16:rowId xmlns:a16="http://schemas.microsoft.com/office/drawing/2014/main" val="3740798393"/>
+                  </a:ext>
+                </a:extLst>
+              </a:tr>
+              <a:tr h="288000">
+                <a:tc>
+                  <a:txBody>
+                    <a:bodyPr/>
+                    <a:lstStyle/>
+                    <a:p>
+                      <a:pPr algn="l" fontAlgn="b"/>
+                      <a:r>
+                        <a:rPr lang="fr-FR" sz="1600" u="none" strike="noStrike">
+                          <a:effectLst/>
+                          <a:latin typeface="Avenir Next LT Pro Light" panose="020B0304020202020204" pitchFamily="34" charset="0"/>
+                        </a:rPr>
+                        <a:t>s(t)psi(3T)p(f+g) </a:t>
+                      </a:r>
+                      <a:endParaRPr lang="fr-FR" sz="1600" b="0" i="0" u="none" strike="noStrike">
+                        <a:solidFill>
+                          <a:srgbClr val="000000"/>
+                        </a:solidFill>
+                        <a:effectLst/>
+                        <a:latin typeface="Avenir Next LT Pro Light" panose="020B0304020202020204" pitchFamily="34" charset="0"/>
+                      </a:endParaRPr>
+                    </a:p>
+                  </a:txBody>
+                  <a:tcPr marL="9525" marR="9525" marT="9525" marB="0" anchor="b"/>
+                </a:tc>
+                <a:tc>
+                  <a:txBody>
+                    <a:bodyPr/>
+                    <a:lstStyle/>
+                    <a:p>
+                      <a:pPr algn="ctr" fontAlgn="b"/>
+                      <a:r>
+                        <a:rPr lang="fr-FR" sz="1600" u="none" strike="noStrike">
+                          <a:effectLst/>
+                          <a:latin typeface="Avenir Next LT Pro Light" panose="020B0304020202020204" pitchFamily="34" charset="0"/>
+                        </a:rPr>
+                        <a:t>36</a:t>
+                      </a:r>
+                      <a:endParaRPr lang="fr-FR" sz="1600" b="0" i="0" u="none" strike="noStrike">
+                        <a:solidFill>
+                          <a:srgbClr val="000000"/>
+                        </a:solidFill>
+                        <a:effectLst/>
+                        <a:latin typeface="Avenir Next LT Pro Light" panose="020B0304020202020204" pitchFamily="34" charset="0"/>
+                      </a:endParaRPr>
+                    </a:p>
+                  </a:txBody>
+                  <a:tcPr marL="9525" marR="9525" marT="9525" marB="0" anchor="b"/>
+                </a:tc>
+                <a:tc>
+                  <a:txBody>
+                    <a:bodyPr/>
+                    <a:lstStyle/>
+                    <a:p>
+                      <a:pPr algn="ctr" fontAlgn="b"/>
+                      <a:r>
+                        <a:rPr lang="fr-FR" sz="1600" u="none" strike="noStrike">
+                          <a:effectLst/>
+                          <a:latin typeface="Avenir Next LT Pro Light" panose="020B0304020202020204" pitchFamily="34" charset="0"/>
+                        </a:rPr>
+                        <a:t>1902.6874</a:t>
+                      </a:r>
+                      <a:endParaRPr lang="fr-FR" sz="1600" b="0" i="0" u="none" strike="noStrike">
+                        <a:solidFill>
+                          <a:srgbClr val="000000"/>
+                        </a:solidFill>
+                        <a:effectLst/>
+                        <a:latin typeface="Avenir Next LT Pro Light" panose="020B0304020202020204" pitchFamily="34" charset="0"/>
+                      </a:endParaRPr>
+                    </a:p>
+                  </a:txBody>
+                  <a:tcPr marL="9525" marR="9525" marT="9525" marB="0" anchor="b"/>
+                </a:tc>
+                <a:tc>
+                  <a:txBody>
+                    <a:bodyPr/>
+                    <a:lstStyle/>
+                    <a:p>
+                      <a:pPr algn="ctr" fontAlgn="b"/>
+                      <a:r>
+                        <a:rPr lang="fr-FR" sz="1600" u="none" strike="noStrike">
+                          <a:effectLst/>
+                          <a:latin typeface="Avenir Next LT Pro Light" panose="020B0304020202020204" pitchFamily="34" charset="0"/>
+                        </a:rPr>
+                        <a:t>1974.6874</a:t>
+                      </a:r>
+                      <a:endParaRPr lang="fr-FR" sz="1600" b="0" i="0" u="none" strike="noStrike">
+                        <a:solidFill>
+                          <a:srgbClr val="000000"/>
+                        </a:solidFill>
+                        <a:effectLst/>
+                        <a:latin typeface="Avenir Next LT Pro Light" panose="020B0304020202020204" pitchFamily="34" charset="0"/>
+                      </a:endParaRPr>
+                    </a:p>
+                  </a:txBody>
+                  <a:tcPr marL="9525" marR="9525" marT="9525" marB="0" anchor="b"/>
+                </a:tc>
+                <a:tc>
+                  <a:txBody>
+                    <a:bodyPr/>
+                    <a:lstStyle/>
+                    <a:p>
+                      <a:pPr algn="ctr" fontAlgn="b"/>
+                      <a:r>
+                        <a:rPr lang="fr-FR" sz="1600" u="none" strike="noStrike" dirty="0">
+                          <a:effectLst/>
+                          <a:latin typeface="Avenir Next LT Pro Light" panose="020B0304020202020204" pitchFamily="34" charset="0"/>
+                        </a:rPr>
+                        <a:t>1976.2922</a:t>
+                      </a:r>
+                      <a:endParaRPr lang="fr-FR" sz="1600" b="0" i="0" u="none" strike="noStrike" dirty="0">
+                        <a:solidFill>
+                          <a:srgbClr val="000000"/>
+                        </a:solidFill>
+                        <a:effectLst/>
+                        <a:latin typeface="Avenir Next LT Pro Light" panose="020B0304020202020204" pitchFamily="34" charset="0"/>
+                      </a:endParaRPr>
+                    </a:p>
+                  </a:txBody>
+                  <a:tcPr marL="9525" marR="9525" marT="9525" marB="0" anchor="b"/>
+                </a:tc>
+                <a:extLst>
+                  <a:ext uri="{0D108BD9-81ED-4DB2-BD59-A6C34878D82A}">
+                    <a16:rowId xmlns:a16="http://schemas.microsoft.com/office/drawing/2014/main" val="2510266349"/>
+                  </a:ext>
+                </a:extLst>
+              </a:tr>
+              <a:tr h="288000">
+                <a:tc>
+                  <a:txBody>
+                    <a:bodyPr/>
+                    <a:lstStyle/>
+                    <a:p>
+                      <a:pPr algn="l" fontAlgn="b"/>
+                      <a:r>
+                        <a:rPr lang="fr-FR" sz="1600" u="none" strike="noStrike" dirty="0">
+                          <a:effectLst/>
+                          <a:latin typeface="Avenir Next LT Pro Light" panose="020B0304020202020204" pitchFamily="34" charset="0"/>
+                        </a:rPr>
+                        <a:t>s(t)psi(3T+g)p(</a:t>
+                      </a:r>
+                      <a:r>
+                        <a:rPr lang="fr-FR" sz="1600" u="none" strike="noStrike" dirty="0" err="1">
+                          <a:effectLst/>
+                          <a:latin typeface="Avenir Next LT Pro Light" panose="020B0304020202020204" pitchFamily="34" charset="0"/>
+                        </a:rPr>
+                        <a:t>f+g</a:t>
+                      </a:r>
+                      <a:r>
+                        <a:rPr lang="fr-FR" sz="1600" u="none" strike="noStrike" dirty="0">
+                          <a:effectLst/>
+                          <a:latin typeface="Avenir Next LT Pro Light" panose="020B0304020202020204" pitchFamily="34" charset="0"/>
+                        </a:rPr>
+                        <a:t>) </a:t>
+                      </a:r>
+                      <a:endParaRPr lang="fr-FR" sz="1600" b="0" i="0" u="none" strike="noStrike" dirty="0">
+                        <a:solidFill>
+                          <a:srgbClr val="000000"/>
+                        </a:solidFill>
+                        <a:effectLst/>
+                        <a:latin typeface="Avenir Next LT Pro Light" panose="020B0304020202020204" pitchFamily="34" charset="0"/>
+                      </a:endParaRPr>
+                    </a:p>
+                  </a:txBody>
+                  <a:tcPr marL="9525" marR="9525" marT="9525" marB="0" anchor="b"/>
+                </a:tc>
+                <a:tc>
+                  <a:txBody>
+                    <a:bodyPr/>
+                    <a:lstStyle/>
+                    <a:p>
+                      <a:pPr algn="ctr" fontAlgn="b"/>
+                      <a:r>
+                        <a:rPr lang="fr-FR" sz="1600" u="none" strike="noStrike">
+                          <a:effectLst/>
+                          <a:latin typeface="Avenir Next LT Pro Light" panose="020B0304020202020204" pitchFamily="34" charset="0"/>
+                        </a:rPr>
+                        <a:t>36</a:t>
+                      </a:r>
+                      <a:endParaRPr lang="fr-FR" sz="1600" b="0" i="0" u="none" strike="noStrike">
+                        <a:solidFill>
+                          <a:srgbClr val="000000"/>
+                        </a:solidFill>
+                        <a:effectLst/>
+                        <a:latin typeface="Avenir Next LT Pro Light" panose="020B0304020202020204" pitchFamily="34" charset="0"/>
+                      </a:endParaRPr>
+                    </a:p>
+                  </a:txBody>
+                  <a:tcPr marL="9525" marR="9525" marT="9525" marB="0" anchor="b"/>
+                </a:tc>
+                <a:tc>
+                  <a:txBody>
+                    <a:bodyPr/>
+                    <a:lstStyle/>
+                    <a:p>
+                      <a:pPr algn="ctr" fontAlgn="b"/>
+                      <a:r>
+                        <a:rPr lang="fr-FR" sz="1600" u="none" strike="noStrike">
+                          <a:effectLst/>
+                          <a:latin typeface="Avenir Next LT Pro Light" panose="020B0304020202020204" pitchFamily="34" charset="0"/>
+                        </a:rPr>
+                        <a:t>1902.6874</a:t>
+                      </a:r>
+                      <a:endParaRPr lang="fr-FR" sz="1600" b="0" i="0" u="none" strike="noStrike">
+                        <a:solidFill>
+                          <a:srgbClr val="000000"/>
+                        </a:solidFill>
+                        <a:effectLst/>
+                        <a:latin typeface="Avenir Next LT Pro Light" panose="020B0304020202020204" pitchFamily="34" charset="0"/>
+                      </a:endParaRPr>
+                    </a:p>
+                  </a:txBody>
+                  <a:tcPr marL="9525" marR="9525" marT="9525" marB="0" anchor="b"/>
+                </a:tc>
+                <a:tc>
+                  <a:txBody>
+                    <a:bodyPr/>
+                    <a:lstStyle/>
+                    <a:p>
+                      <a:pPr algn="ctr" fontAlgn="b"/>
+                      <a:r>
+                        <a:rPr lang="fr-FR" sz="1600" u="none" strike="noStrike">
+                          <a:effectLst/>
+                          <a:latin typeface="Avenir Next LT Pro Light" panose="020B0304020202020204" pitchFamily="34" charset="0"/>
+                        </a:rPr>
+                        <a:t>1974.6874</a:t>
+                      </a:r>
+                      <a:endParaRPr lang="fr-FR" sz="1600" b="0" i="0" u="none" strike="noStrike">
+                        <a:solidFill>
+                          <a:srgbClr val="000000"/>
+                        </a:solidFill>
+                        <a:effectLst/>
+                        <a:latin typeface="Avenir Next LT Pro Light" panose="020B0304020202020204" pitchFamily="34" charset="0"/>
+                      </a:endParaRPr>
+                    </a:p>
+                  </a:txBody>
+                  <a:tcPr marL="9525" marR="9525" marT="9525" marB="0" anchor="b"/>
+                </a:tc>
+                <a:tc>
+                  <a:txBody>
+                    <a:bodyPr/>
+                    <a:lstStyle/>
+                    <a:p>
+                      <a:pPr algn="ctr" fontAlgn="b"/>
+                      <a:r>
+                        <a:rPr lang="fr-FR" sz="1600" u="none" strike="noStrike" dirty="0">
+                          <a:effectLst/>
+                          <a:latin typeface="Avenir Next LT Pro Light" panose="020B0304020202020204" pitchFamily="34" charset="0"/>
+                        </a:rPr>
+                        <a:t>1976.2922</a:t>
+                      </a:r>
+                      <a:endParaRPr lang="fr-FR" sz="1600" b="0" i="0" u="none" strike="noStrike" dirty="0">
+                        <a:solidFill>
+                          <a:srgbClr val="000000"/>
+                        </a:solidFill>
+                        <a:effectLst/>
+                        <a:latin typeface="Avenir Next LT Pro Light" panose="020B0304020202020204" pitchFamily="34" charset="0"/>
+                      </a:endParaRPr>
+                    </a:p>
+                  </a:txBody>
+                  <a:tcPr marL="9525" marR="9525" marT="9525" marB="0" anchor="b"/>
+                </a:tc>
+                <a:extLst>
+                  <a:ext uri="{0D108BD9-81ED-4DB2-BD59-A6C34878D82A}">
+                    <a16:rowId xmlns:a16="http://schemas.microsoft.com/office/drawing/2014/main" val="2362255286"/>
+                  </a:ext>
+                </a:extLst>
+              </a:tr>
+              <a:tr h="288000">
+                <a:tc>
+                  <a:txBody>
+                    <a:bodyPr/>
+                    <a:lstStyle/>
+                    <a:p>
+                      <a:pPr algn="l" fontAlgn="b"/>
+                      <a:r>
+                        <a:rPr lang="fr-FR" sz="1600" u="none" strike="noStrike" dirty="0">
+                          <a:effectLst/>
+                          <a:latin typeface="Avenir Next LT Pro Light" panose="020B0304020202020204" pitchFamily="34" charset="0"/>
+                        </a:rPr>
+                        <a:t>s(t)psi(3T)p(</a:t>
+                      </a:r>
+                      <a:r>
+                        <a:rPr lang="fr-FR" sz="1600" u="none" strike="noStrike" dirty="0" err="1">
+                          <a:effectLst/>
+                          <a:latin typeface="Avenir Next LT Pro Light" panose="020B0304020202020204" pitchFamily="34" charset="0"/>
+                        </a:rPr>
+                        <a:t>f+g</a:t>
+                      </a:r>
+                      <a:r>
+                        <a:rPr lang="fr-FR" sz="1600" u="none" strike="noStrike" dirty="0">
+                          <a:effectLst/>
+                          <a:latin typeface="Avenir Next LT Pro Light" panose="020B0304020202020204" pitchFamily="34" charset="0"/>
+                        </a:rPr>
+                        <a:t>) </a:t>
+                      </a:r>
+                      <a:endParaRPr lang="fr-FR" sz="1600" b="0" i="0" u="none" strike="noStrike" dirty="0">
+                        <a:solidFill>
+                          <a:srgbClr val="000000"/>
+                        </a:solidFill>
+                        <a:effectLst/>
+                        <a:latin typeface="Avenir Next LT Pro Light" panose="020B0304020202020204" pitchFamily="34" charset="0"/>
+                      </a:endParaRPr>
+                    </a:p>
+                  </a:txBody>
+                  <a:tcPr marL="9525" marR="9525" marT="9525" marB="0" anchor="b"/>
+                </a:tc>
+                <a:tc>
+                  <a:txBody>
+                    <a:bodyPr/>
+                    <a:lstStyle/>
+                    <a:p>
+                      <a:pPr algn="ctr" fontAlgn="b"/>
+                      <a:r>
+                        <a:rPr lang="fr-FR" sz="1600" u="none" strike="noStrike" dirty="0">
+                          <a:effectLst/>
+                          <a:latin typeface="Avenir Next LT Pro Light" panose="020B0304020202020204" pitchFamily="34" charset="0"/>
+                        </a:rPr>
+                        <a:t>35</a:t>
+                      </a:r>
+                      <a:endParaRPr lang="fr-FR" sz="1600" b="0" i="0" u="none" strike="noStrike" dirty="0">
+                        <a:solidFill>
+                          <a:srgbClr val="000000"/>
+                        </a:solidFill>
+                        <a:effectLst/>
+                        <a:latin typeface="Avenir Next LT Pro Light" panose="020B0304020202020204" pitchFamily="34" charset="0"/>
+                      </a:endParaRPr>
+                    </a:p>
+                  </a:txBody>
+                  <a:tcPr marL="9525" marR="9525" marT="9525" marB="0" anchor="b"/>
+                </a:tc>
+                <a:tc>
+                  <a:txBody>
+                    <a:bodyPr/>
+                    <a:lstStyle/>
+                    <a:p>
+                      <a:pPr algn="ctr" fontAlgn="b"/>
+                      <a:r>
+                        <a:rPr lang="fr-FR" sz="1600" u="none" strike="noStrike" dirty="0">
+                          <a:effectLst/>
+                          <a:latin typeface="Avenir Next LT Pro Light" panose="020B0304020202020204" pitchFamily="34" charset="0"/>
+                        </a:rPr>
+                        <a:t>1904.9845</a:t>
+                      </a:r>
+                      <a:endParaRPr lang="fr-FR" sz="1600" b="0" i="0" u="none" strike="noStrike" dirty="0">
+                        <a:solidFill>
+                          <a:srgbClr val="000000"/>
+                        </a:solidFill>
+                        <a:effectLst/>
+                        <a:latin typeface="Avenir Next LT Pro Light" panose="020B0304020202020204" pitchFamily="34" charset="0"/>
+                      </a:endParaRPr>
+                    </a:p>
+                  </a:txBody>
+                  <a:tcPr marL="9525" marR="9525" marT="9525" marB="0" anchor="b"/>
+                </a:tc>
+                <a:tc>
+                  <a:txBody>
+                    <a:bodyPr/>
+                    <a:lstStyle/>
+                    <a:p>
+                      <a:pPr algn="ctr" fontAlgn="b"/>
+                      <a:r>
+                        <a:rPr lang="fr-FR" sz="1600" u="none" strike="noStrike" dirty="0">
+                          <a:effectLst/>
+                          <a:latin typeface="Avenir Next LT Pro Light" panose="020B0304020202020204" pitchFamily="34" charset="0"/>
+                        </a:rPr>
+                        <a:t>1974.9845</a:t>
+                      </a:r>
+                      <a:endParaRPr lang="fr-FR" sz="1600" b="0" i="0" u="none" strike="noStrike" dirty="0">
+                        <a:solidFill>
+                          <a:srgbClr val="000000"/>
+                        </a:solidFill>
+                        <a:effectLst/>
+                        <a:latin typeface="Avenir Next LT Pro Light" panose="020B0304020202020204" pitchFamily="34" charset="0"/>
+                      </a:endParaRPr>
+                    </a:p>
+                  </a:txBody>
+                  <a:tcPr marL="9525" marR="9525" marT="9525" marB="0" anchor="b"/>
+                </a:tc>
+                <a:tc>
+                  <a:txBody>
+                    <a:bodyPr/>
+                    <a:lstStyle/>
+                    <a:p>
+                      <a:pPr algn="ctr" fontAlgn="b"/>
+                      <a:r>
+                        <a:rPr lang="fr-FR" sz="1600" u="none" strike="noStrike" dirty="0">
+                          <a:effectLst/>
+                          <a:latin typeface="Avenir Next LT Pro Light" panose="020B0304020202020204" pitchFamily="34" charset="0"/>
+                        </a:rPr>
+                        <a:t>1976.5016</a:t>
+                      </a:r>
+                      <a:endParaRPr lang="fr-FR" sz="1600" b="0" i="0" u="none" strike="noStrike" dirty="0">
+                        <a:solidFill>
+                          <a:srgbClr val="000000"/>
+                        </a:solidFill>
+                        <a:effectLst/>
+                        <a:latin typeface="Avenir Next LT Pro Light" panose="020B0304020202020204" pitchFamily="34" charset="0"/>
+                      </a:endParaRPr>
+                    </a:p>
+                  </a:txBody>
+                  <a:tcPr marL="9525" marR="9525" marT="9525" marB="0" anchor="b"/>
+                </a:tc>
+                <a:extLst>
+                  <a:ext uri="{0D108BD9-81ED-4DB2-BD59-A6C34878D82A}">
+                    <a16:rowId xmlns:a16="http://schemas.microsoft.com/office/drawing/2014/main" val="3211570418"/>
+                  </a:ext>
+                </a:extLst>
+              </a:tr>
+            </a:tbl>
+          </a:graphicData>
+        </a:graphic>
+      </p:graphicFrame>
+      <p:sp>
+        <p:nvSpPr>
+          <p:cNvPr id="6" name="ZoneTexte 5">
+            <a:extLst>
+              <a:ext uri="{FF2B5EF4-FFF2-40B4-BE49-F238E27FC236}">
+                <a16:creationId xmlns:a16="http://schemas.microsoft.com/office/drawing/2014/main" id="{C8081752-EB2F-4FF5-8E92-626934E8FC4C}"/>
+              </a:ext>
+            </a:extLst>
+          </p:cNvPr>
+          <p:cNvSpPr txBox="1"/>
+          <p:nvPr/>
+        </p:nvSpPr>
+        <p:spPr>
+          <a:xfrm>
+            <a:off x="967154" y="211015"/>
+            <a:ext cx="5011615" cy="461665"/>
+          </a:xfrm>
+          <a:prstGeom prst="rect">
+            <a:avLst/>
+          </a:prstGeom>
+          <a:noFill/>
+        </p:spPr>
+        <p:txBody>
+          <a:bodyPr wrap="square" rtlCol="0">
+            <a:spAutoFit/>
+          </a:bodyPr>
+          <a:lstStyle/>
+          <a:p>
+            <a:r>
+              <a:rPr lang="fr-FR" sz="2400" b="1" dirty="0"/>
+              <a:t>Model </a:t>
+            </a:r>
+            <a:r>
+              <a:rPr lang="fr-FR" sz="2400" b="1" dirty="0" err="1"/>
+              <a:t>selection</a:t>
+            </a:r>
+            <a:endParaRPr lang="fr-FR" sz="2400" b="1" dirty="0"/>
+          </a:p>
+        </p:txBody>
+      </p:sp>
+    </p:spTree>
+    <p:extLst>
+      <p:ext uri="{BB962C8B-B14F-4D97-AF65-F5344CB8AC3E}">
+        <p14:creationId xmlns:p14="http://schemas.microsoft.com/office/powerpoint/2010/main" val="2720338322"/>
+      </p:ext>
+    </p:extLst>
+  </p:cSld>
+  <p:clrMapOvr>
+    <a:masterClrMapping/>
+  </p:clrMapOvr>
+</p:sld>
+</file>
+
+<file path=ppt/slides/slide4.xml><?xml version="1.0" encoding="utf-8"?>
+<p:sld xmlns:a="http://schemas.openxmlformats.org/drawingml/2006/main" xmlns:r="http://schemas.openxmlformats.org/officeDocument/2006/relationships" xmlns:p="http://schemas.openxmlformats.org/presentationml/2006/main">
+  <p:cSld>
+    <p:bg>
+      <p:bgPr>
+        <a:solidFill>
+          <a:schemeClr val="bg1"/>
+        </a:solidFill>
+        <a:effectLst/>
+      </p:bgPr>
+    </p:bg>
+    <p:spTree>
+      <p:nvGrpSpPr>
+        <p:cNvPr id="1" name=""/>
+        <p:cNvGrpSpPr/>
+        <p:nvPr/>
+      </p:nvGrpSpPr>
+      <p:grpSpPr>
+        <a:xfrm>
+          <a:off x="0" y="0"/>
+          <a:ext cx="0" cy="0"/>
+          <a:chOff x="0" y="0"/>
+          <a:chExt cx="0" cy="0"/>
+        </a:xfrm>
+      </p:grpSpPr>
+      <p:sp>
+        <p:nvSpPr>
+          <p:cNvPr id="2" name="Titre 1">
+            <a:extLst>
+              <a:ext uri="{FF2B5EF4-FFF2-40B4-BE49-F238E27FC236}">
+                <a16:creationId xmlns:a16="http://schemas.microsoft.com/office/drawing/2014/main" id="{4E2D8DE4-1439-4DA3-935E-D1C319AD4095}"/>
+              </a:ext>
+            </a:extLst>
+          </p:cNvPr>
+          <p:cNvSpPr>
+            <a:spLocks noGrp="1"/>
+          </p:cNvSpPr>
+          <p:nvPr>
+            <p:ph type="title"/>
+          </p:nvPr>
+        </p:nvSpPr>
+        <p:spPr/>
+        <p:txBody>
+          <a:bodyPr/>
+          <a:lstStyle/>
+          <a:p>
+            <a:endParaRPr lang="fr-FR"/>
+          </a:p>
+        </p:txBody>
+      </p:sp>
+      <p:pic>
+        <p:nvPicPr>
+          <p:cNvPr id="5" name="Espace réservé du contenu 4">
+            <a:extLst>
+              <a:ext uri="{FF2B5EF4-FFF2-40B4-BE49-F238E27FC236}">
+                <a16:creationId xmlns:a16="http://schemas.microsoft.com/office/drawing/2014/main" id="{87F8EF2A-149A-4A57-9017-2689E7BA92D0}"/>
+              </a:ext>
+            </a:extLst>
+          </p:cNvPr>
+          <p:cNvPicPr>
+            <a:picLocks noGrp="1" noChangeAspect="1"/>
+          </p:cNvPicPr>
+          <p:nvPr>
+            <p:ph idx="1"/>
+          </p:nvPr>
+        </p:nvPicPr>
+        <p:blipFill>
+          <a:blip r:embed="rId2">
+            <a:extLst>
+              <a:ext uri="{28A0092B-C50C-407E-A947-70E740481C1C}">
+                <a14:useLocalDpi xmlns:a14="http://schemas.microsoft.com/office/drawing/2010/main" val="0"/>
+              </a:ext>
+            </a:extLst>
+          </a:blip>
+          <a:stretch>
+            <a:fillRect/>
+          </a:stretch>
+        </p:blipFill>
+        <p:spPr>
+          <a:xfrm>
+            <a:off x="926807" y="417451"/>
+            <a:ext cx="9720677" cy="6075424"/>
+          </a:xfrm>
+        </p:spPr>
+      </p:pic>
+      <p:sp>
+        <p:nvSpPr>
+          <p:cNvPr id="6" name="Rectangle 5">
+            <a:extLst>
+              <a:ext uri="{FF2B5EF4-FFF2-40B4-BE49-F238E27FC236}">
+                <a16:creationId xmlns:a16="http://schemas.microsoft.com/office/drawing/2014/main" id="{F8FC4FDC-22FF-4B91-9226-698CF063E1B5}"/>
+              </a:ext>
+            </a:extLst>
+          </p:cNvPr>
+          <p:cNvSpPr/>
+          <p:nvPr/>
+        </p:nvSpPr>
+        <p:spPr>
+          <a:xfrm>
+            <a:off x="6096000" y="491613"/>
+            <a:ext cx="2203938" cy="5557495"/>
+          </a:xfrm>
+          <a:prstGeom prst="rect">
+            <a:avLst/>
+          </a:prstGeom>
+          <a:gradFill flip="none" rotWithShape="1">
+            <a:gsLst>
+              <a:gs pos="100000">
+                <a:schemeClr val="accent2">
+                  <a:lumMod val="5000"/>
+                  <a:lumOff val="95000"/>
+                  <a:alpha val="30000"/>
+                </a:schemeClr>
+              </a:gs>
+              <a:gs pos="0">
+                <a:schemeClr val="accent2">
+                  <a:lumMod val="45000"/>
+                  <a:lumOff val="55000"/>
+                  <a:alpha val="30000"/>
+                </a:schemeClr>
+              </a:gs>
+            </a:gsLst>
+            <a:lin ang="5400000" scaled="1"/>
+            <a:tileRect/>
+          </a:gradFill>
+          <a:ln>
+            <a:solidFill>
+              <a:srgbClr val="C00000"/>
+            </a:solidFill>
+          </a:ln>
+        </p:spPr>
+        <p:style>
+          <a:lnRef idx="2">
+            <a:schemeClr val="accent1">
+              <a:shade val="50000"/>
+            </a:schemeClr>
+          </a:lnRef>
+          <a:fillRef idx="1">
+            <a:schemeClr val="accent1"/>
+          </a:fillRef>
+          <a:effectRef idx="0">
+            <a:schemeClr val="accent1"/>
+          </a:effectRef>
+          <a:fontRef idx="minor">
+            <a:schemeClr val="lt1"/>
+          </a:fontRef>
+        </p:style>
+        <p:txBody>
+          <a:bodyPr rtlCol="0" anchor="ctr"/>
+          <a:lstStyle/>
+          <a:p>
+            <a:pPr algn="ctr"/>
+            <a:endParaRPr lang="fr-FR" dirty="0"/>
+          </a:p>
+        </p:txBody>
+      </p:sp>
+      <p:sp>
+        <p:nvSpPr>
+          <p:cNvPr id="7" name="ZoneTexte 6">
+            <a:extLst>
+              <a:ext uri="{FF2B5EF4-FFF2-40B4-BE49-F238E27FC236}">
+                <a16:creationId xmlns:a16="http://schemas.microsoft.com/office/drawing/2014/main" id="{D08ADDD3-62DB-4B0A-BAC8-53DD4816CE5A}"/>
+              </a:ext>
+            </a:extLst>
+          </p:cNvPr>
+          <p:cNvSpPr txBox="1"/>
+          <p:nvPr/>
+        </p:nvSpPr>
+        <p:spPr>
+          <a:xfrm>
+            <a:off x="6308480" y="624254"/>
+            <a:ext cx="1661746" cy="646331"/>
+          </a:xfrm>
+          <a:prstGeom prst="rect">
+            <a:avLst/>
+          </a:prstGeom>
+          <a:noFill/>
+        </p:spPr>
+        <p:txBody>
+          <a:bodyPr wrap="square" rtlCol="0">
+            <a:spAutoFit/>
+          </a:bodyPr>
+          <a:lstStyle/>
+          <a:p>
+            <a:pPr algn="ctr"/>
+            <a:r>
+              <a:rPr lang="fr-FR" b="1" dirty="0">
+                <a:latin typeface="Avenir Next LT Pro Light" panose="020B0304020202020204" pitchFamily="34" charset="0"/>
+              </a:rPr>
+              <a:t>Yellow </a:t>
+            </a:r>
+            <a:r>
+              <a:rPr lang="fr-FR" b="1" dirty="0" err="1">
+                <a:latin typeface="Avenir Next LT Pro Light" panose="020B0304020202020204" pitchFamily="34" charset="0"/>
+              </a:rPr>
+              <a:t>fever</a:t>
+            </a:r>
+            <a:r>
+              <a:rPr lang="fr-FR" b="1" dirty="0">
+                <a:latin typeface="Avenir Next LT Pro Light" panose="020B0304020202020204" pitchFamily="34" charset="0"/>
+              </a:rPr>
+              <a:t> </a:t>
+            </a:r>
+            <a:r>
+              <a:rPr lang="fr-FR" b="1" dirty="0" err="1">
+                <a:latin typeface="Avenir Next LT Pro Light" panose="020B0304020202020204" pitchFamily="34" charset="0"/>
+              </a:rPr>
+              <a:t>outbreak</a:t>
+            </a:r>
+            <a:endParaRPr lang="fr-FR" b="1" dirty="0">
+              <a:latin typeface="Avenir Next LT Pro Light" panose="020B0304020202020204" pitchFamily="34" charset="0"/>
+            </a:endParaRPr>
+          </a:p>
+        </p:txBody>
+      </p:sp>
+      <p:cxnSp>
+        <p:nvCxnSpPr>
+          <p:cNvPr id="14" name="Connecteur droit 13">
+            <a:extLst>
+              <a:ext uri="{FF2B5EF4-FFF2-40B4-BE49-F238E27FC236}">
+                <a16:creationId xmlns:a16="http://schemas.microsoft.com/office/drawing/2014/main" id="{77B39D06-3988-4F07-B0EC-350B42617DBF}"/>
+              </a:ext>
+            </a:extLst>
+          </p:cNvPr>
+          <p:cNvCxnSpPr>
+            <a:cxnSpLocks/>
+          </p:cNvCxnSpPr>
+          <p:nvPr/>
+        </p:nvCxnSpPr>
+        <p:spPr>
+          <a:xfrm>
+            <a:off x="1459523" y="6455630"/>
+            <a:ext cx="4636477" cy="0"/>
+          </a:xfrm>
+          <a:prstGeom prst="line">
+            <a:avLst/>
+          </a:prstGeom>
+          <a:ln w="38100">
+            <a:solidFill>
+              <a:srgbClr val="00B050"/>
+            </a:solidFill>
+          </a:ln>
+        </p:spPr>
+        <p:style>
+          <a:lnRef idx="1">
+            <a:schemeClr val="accent1"/>
+          </a:lnRef>
+          <a:fillRef idx="0">
+            <a:schemeClr val="accent1"/>
+          </a:fillRef>
+          <a:effectRef idx="0">
+            <a:schemeClr val="accent1"/>
+          </a:effectRef>
+          <a:fontRef idx="minor">
+            <a:schemeClr val="tx1"/>
+          </a:fontRef>
+        </p:style>
+      </p:cxnSp>
+      <p:cxnSp>
+        <p:nvCxnSpPr>
+          <p:cNvPr id="15" name="Connecteur droit 14">
+            <a:extLst>
+              <a:ext uri="{FF2B5EF4-FFF2-40B4-BE49-F238E27FC236}">
+                <a16:creationId xmlns:a16="http://schemas.microsoft.com/office/drawing/2014/main" id="{4232566D-9D9A-423C-8C9B-66BF5809772C}"/>
+              </a:ext>
+            </a:extLst>
+          </p:cNvPr>
+          <p:cNvCxnSpPr>
+            <a:cxnSpLocks/>
+          </p:cNvCxnSpPr>
+          <p:nvPr/>
+        </p:nvCxnSpPr>
+        <p:spPr>
+          <a:xfrm>
+            <a:off x="8329245" y="6455630"/>
+            <a:ext cx="2256693" cy="0"/>
+          </a:xfrm>
+          <a:prstGeom prst="line">
+            <a:avLst/>
+          </a:prstGeom>
+          <a:ln w="38100">
+            <a:solidFill>
+              <a:srgbClr val="00B050"/>
+            </a:solidFill>
+          </a:ln>
+        </p:spPr>
+        <p:style>
+          <a:lnRef idx="1">
+            <a:schemeClr val="accent1"/>
+          </a:lnRef>
+          <a:fillRef idx="0">
+            <a:schemeClr val="accent1"/>
+          </a:fillRef>
+          <a:effectRef idx="0">
+            <a:schemeClr val="accent1"/>
+          </a:effectRef>
+          <a:fontRef idx="minor">
+            <a:schemeClr val="tx1"/>
+          </a:fontRef>
+        </p:style>
+      </p:cxnSp>
+      <p:cxnSp>
+        <p:nvCxnSpPr>
+          <p:cNvPr id="20" name="Connecteur droit 19">
+            <a:extLst>
+              <a:ext uri="{FF2B5EF4-FFF2-40B4-BE49-F238E27FC236}">
+                <a16:creationId xmlns:a16="http://schemas.microsoft.com/office/drawing/2014/main" id="{ED8A8AAF-031D-4087-A67E-5F2DF283BC9A}"/>
+              </a:ext>
+            </a:extLst>
+          </p:cNvPr>
+          <p:cNvCxnSpPr/>
+          <p:nvPr/>
+        </p:nvCxnSpPr>
+        <p:spPr>
+          <a:xfrm>
+            <a:off x="6096000" y="6640296"/>
+            <a:ext cx="2233245" cy="0"/>
+          </a:xfrm>
+          <a:prstGeom prst="line">
+            <a:avLst/>
+          </a:prstGeom>
+          <a:ln w="38100">
+            <a:solidFill>
+              <a:srgbClr val="FF0000"/>
+            </a:solidFill>
+            <a:prstDash val="sysDot"/>
+          </a:ln>
+        </p:spPr>
+        <p:style>
+          <a:lnRef idx="1">
+            <a:schemeClr val="accent1"/>
+          </a:lnRef>
+          <a:fillRef idx="0">
+            <a:schemeClr val="accent1"/>
+          </a:fillRef>
+          <a:effectRef idx="0">
+            <a:schemeClr val="accent1"/>
+          </a:effectRef>
+          <a:fontRef idx="minor">
+            <a:schemeClr val="tx1"/>
+          </a:fontRef>
+        </p:style>
+      </p:cxnSp>
+    </p:spTree>
+    <p:extLst>
+      <p:ext uri="{BB962C8B-B14F-4D97-AF65-F5344CB8AC3E}">
+        <p14:creationId xmlns:p14="http://schemas.microsoft.com/office/powerpoint/2010/main" val="1820366298"/>
+      </p:ext>
+    </p:extLst>
+  </p:cSld>
+  <p:clrMapOvr>
+    <a:masterClrMapping/>
+  </p:clrMapOvr>
+</p:sld>
+</file>
+
+<file path=ppt/slides/slide5.xml><?xml version="1.0" encoding="utf-8"?>
 <p:sld xmlns:a="http://schemas.openxmlformats.org/drawingml/2006/main" xmlns:r="http://schemas.openxmlformats.org/officeDocument/2006/relationships" xmlns:p="http://schemas.openxmlformats.org/presentationml/2006/main">
   <p:cSld>
     <p:spTree>
@@ -6999,7 +10525,7 @@
 </p:sld>
 </file>
 
-<file path=ppt/slides/slide3.xml><?xml version="1.0" encoding="utf-8"?>
+<file path=ppt/slides/slide6.xml><?xml version="1.0" encoding="utf-8"?>
 <p:sld xmlns:a="http://schemas.openxmlformats.org/drawingml/2006/main" xmlns:r="http://schemas.openxmlformats.org/officeDocument/2006/relationships" xmlns:p="http://schemas.openxmlformats.org/presentationml/2006/main">
   <p:cSld>
     <p:spTree>
@@ -10424,6 +13950,1292 @@
     <p:extLst>
       <p:ext uri="{BB962C8B-B14F-4D97-AF65-F5344CB8AC3E}">
         <p14:creationId xmlns:p14="http://schemas.microsoft.com/office/powerpoint/2010/main" val="1935252263"/>
+      </p:ext>
+    </p:extLst>
+  </p:cSld>
+  <p:clrMapOvr>
+    <a:masterClrMapping/>
+  </p:clrMapOvr>
+</p:sld>
+</file>
+
+<file path=ppt/slides/slide7.xml><?xml version="1.0" encoding="utf-8"?>
+<p:sld xmlns:a="http://schemas.openxmlformats.org/drawingml/2006/main" xmlns:r="http://schemas.openxmlformats.org/officeDocument/2006/relationships" xmlns:p="http://schemas.openxmlformats.org/presentationml/2006/main">
+  <p:cSld>
+    <p:spTree>
+      <p:nvGrpSpPr>
+        <p:cNvPr id="1" name=""/>
+        <p:cNvGrpSpPr/>
+        <p:nvPr/>
+      </p:nvGrpSpPr>
+      <p:grpSpPr>
+        <a:xfrm>
+          <a:off x="0" y="0"/>
+          <a:ext cx="0" cy="0"/>
+          <a:chOff x="0" y="0"/>
+          <a:chExt cx="0" cy="0"/>
+        </a:xfrm>
+      </p:grpSpPr>
+      <p:sp>
+        <p:nvSpPr>
+          <p:cNvPr id="16" name="Rectangle 15">
+            <a:extLst>
+              <a:ext uri="{FF2B5EF4-FFF2-40B4-BE49-F238E27FC236}">
+                <a16:creationId xmlns:a16="http://schemas.microsoft.com/office/drawing/2014/main" id="{47F47FAD-1DA9-4B31-8591-F6AB708A11F0}"/>
+              </a:ext>
+            </a:extLst>
+          </p:cNvPr>
+          <p:cNvSpPr/>
+          <p:nvPr/>
+        </p:nvSpPr>
+        <p:spPr>
+          <a:xfrm>
+            <a:off x="848413" y="1613555"/>
+            <a:ext cx="3333164" cy="3028238"/>
+          </a:xfrm>
+          <a:prstGeom prst="rect">
+            <a:avLst/>
+          </a:prstGeom>
+          <a:solidFill>
+            <a:schemeClr val="accent2">
+              <a:lumMod val="20000"/>
+              <a:lumOff val="80000"/>
+            </a:schemeClr>
+          </a:solidFill>
+          <a:ln>
+            <a:solidFill>
+              <a:schemeClr val="accent2">
+                <a:lumMod val="75000"/>
+              </a:schemeClr>
+            </a:solidFill>
+          </a:ln>
+        </p:spPr>
+        <p:style>
+          <a:lnRef idx="2">
+            <a:schemeClr val="accent1">
+              <a:shade val="50000"/>
+            </a:schemeClr>
+          </a:lnRef>
+          <a:fillRef idx="1">
+            <a:schemeClr val="accent1"/>
+          </a:fillRef>
+          <a:effectRef idx="0">
+            <a:schemeClr val="accent1"/>
+          </a:effectRef>
+          <a:fontRef idx="minor">
+            <a:schemeClr val="lt1"/>
+          </a:fontRef>
+        </p:style>
+        <p:txBody>
+          <a:bodyPr rtlCol="0" anchor="ctr"/>
+          <a:lstStyle/>
+          <a:p>
+            <a:pPr algn="ctr"/>
+            <a:endParaRPr lang="fr-FR" dirty="0">
+              <a:latin typeface="Avenir Next LT Pro Light" panose="020B0304020202020204" pitchFamily="34" charset="0"/>
+            </a:endParaRPr>
+          </a:p>
+        </p:txBody>
+      </p:sp>
+      <p:sp>
+        <p:nvSpPr>
+          <p:cNvPr id="17" name="Ellipse 16">
+            <a:extLst>
+              <a:ext uri="{FF2B5EF4-FFF2-40B4-BE49-F238E27FC236}">
+                <a16:creationId xmlns:a16="http://schemas.microsoft.com/office/drawing/2014/main" id="{72CC2D58-FAEF-4FC0-94E2-F589746D0C4D}"/>
+              </a:ext>
+            </a:extLst>
+          </p:cNvPr>
+          <p:cNvSpPr/>
+          <p:nvPr/>
+        </p:nvSpPr>
+        <p:spPr>
+          <a:xfrm>
+            <a:off x="1099167" y="3448773"/>
+            <a:ext cx="1046375" cy="1036948"/>
+          </a:xfrm>
+          <a:prstGeom prst="ellipse">
+            <a:avLst/>
+          </a:prstGeom>
+          <a:solidFill>
+            <a:schemeClr val="accent2">
+              <a:lumMod val="60000"/>
+              <a:lumOff val="40000"/>
+            </a:schemeClr>
+          </a:solidFill>
+          <a:ln>
+            <a:noFill/>
+          </a:ln>
+        </p:spPr>
+        <p:style>
+          <a:lnRef idx="2">
+            <a:schemeClr val="accent1">
+              <a:shade val="50000"/>
+            </a:schemeClr>
+          </a:lnRef>
+          <a:fillRef idx="1">
+            <a:schemeClr val="accent1"/>
+          </a:fillRef>
+          <a:effectRef idx="0">
+            <a:schemeClr val="accent1"/>
+          </a:effectRef>
+          <a:fontRef idx="minor">
+            <a:schemeClr val="lt1"/>
+          </a:fontRef>
+        </p:style>
+        <p:txBody>
+          <a:bodyPr rtlCol="0" anchor="ctr"/>
+          <a:lstStyle/>
+          <a:p>
+            <a:pPr algn="ctr"/>
+            <a:endParaRPr lang="fr-FR">
+              <a:latin typeface="Avenir Next LT Pro Light" panose="020B0304020202020204" pitchFamily="34" charset="0"/>
+            </a:endParaRPr>
+          </a:p>
+        </p:txBody>
+      </p:sp>
+      <p:sp>
+        <p:nvSpPr>
+          <p:cNvPr id="18" name="Ellipse 17">
+            <a:extLst>
+              <a:ext uri="{FF2B5EF4-FFF2-40B4-BE49-F238E27FC236}">
+                <a16:creationId xmlns:a16="http://schemas.microsoft.com/office/drawing/2014/main" id="{0F06E93F-2F21-4ED5-8AAA-17B2C74D5168}"/>
+              </a:ext>
+            </a:extLst>
+          </p:cNvPr>
+          <p:cNvSpPr/>
+          <p:nvPr/>
+        </p:nvSpPr>
+        <p:spPr>
+          <a:xfrm>
+            <a:off x="2917864" y="2331489"/>
+            <a:ext cx="1046375" cy="1036948"/>
+          </a:xfrm>
+          <a:prstGeom prst="ellipse">
+            <a:avLst/>
+          </a:prstGeom>
+          <a:solidFill>
+            <a:schemeClr val="accent2">
+              <a:lumMod val="50000"/>
+            </a:schemeClr>
+          </a:solidFill>
+          <a:ln>
+            <a:noFill/>
+          </a:ln>
+        </p:spPr>
+        <p:style>
+          <a:lnRef idx="2">
+            <a:schemeClr val="accent1">
+              <a:shade val="50000"/>
+            </a:schemeClr>
+          </a:lnRef>
+          <a:fillRef idx="1">
+            <a:schemeClr val="accent1"/>
+          </a:fillRef>
+          <a:effectRef idx="0">
+            <a:schemeClr val="accent1"/>
+          </a:effectRef>
+          <a:fontRef idx="minor">
+            <a:schemeClr val="lt1"/>
+          </a:fontRef>
+        </p:style>
+        <p:txBody>
+          <a:bodyPr rtlCol="0" anchor="ctr"/>
+          <a:lstStyle/>
+          <a:p>
+            <a:pPr algn="ctr"/>
+            <a:endParaRPr lang="fr-FR">
+              <a:latin typeface="Avenir Next LT Pro Light" panose="020B0304020202020204" pitchFamily="34" charset="0"/>
+            </a:endParaRPr>
+          </a:p>
+        </p:txBody>
+      </p:sp>
+      <p:sp>
+        <p:nvSpPr>
+          <p:cNvPr id="19" name="ZoneTexte 18">
+            <a:extLst>
+              <a:ext uri="{FF2B5EF4-FFF2-40B4-BE49-F238E27FC236}">
+                <a16:creationId xmlns:a16="http://schemas.microsoft.com/office/drawing/2014/main" id="{63DC0B9D-31FC-4B15-9120-8952E21D7C82}"/>
+              </a:ext>
+            </a:extLst>
+          </p:cNvPr>
+          <p:cNvSpPr txBox="1"/>
+          <p:nvPr/>
+        </p:nvSpPr>
+        <p:spPr>
+          <a:xfrm>
+            <a:off x="816550" y="1236642"/>
+            <a:ext cx="2891800" cy="369332"/>
+          </a:xfrm>
+          <a:prstGeom prst="rect">
+            <a:avLst/>
+          </a:prstGeom>
+          <a:noFill/>
+        </p:spPr>
+        <p:txBody>
+          <a:bodyPr wrap="square" rtlCol="0">
+            <a:spAutoFit/>
+          </a:bodyPr>
+          <a:lstStyle/>
+          <a:p>
+            <a:r>
+              <a:rPr lang="fr-FR" dirty="0">
+                <a:latin typeface="Avenir Next LT Pro Light" panose="020B0304020202020204" pitchFamily="34" charset="0"/>
+              </a:rPr>
+              <a:t>Conservation unit1</a:t>
+            </a:r>
+          </a:p>
+        </p:txBody>
+      </p:sp>
+      <p:sp>
+        <p:nvSpPr>
+          <p:cNvPr id="20" name="ZoneTexte 19">
+            <a:extLst>
+              <a:ext uri="{FF2B5EF4-FFF2-40B4-BE49-F238E27FC236}">
+                <a16:creationId xmlns:a16="http://schemas.microsoft.com/office/drawing/2014/main" id="{0B74550D-2300-469A-A5B6-EAF97EF48563}"/>
+              </a:ext>
+            </a:extLst>
+          </p:cNvPr>
+          <p:cNvSpPr txBox="1"/>
+          <p:nvPr/>
+        </p:nvSpPr>
+        <p:spPr>
+          <a:xfrm>
+            <a:off x="868727" y="3217698"/>
+            <a:ext cx="366858" cy="378728"/>
+          </a:xfrm>
+          <a:prstGeom prst="rect">
+            <a:avLst/>
+          </a:prstGeom>
+          <a:noFill/>
+        </p:spPr>
+        <p:txBody>
+          <a:bodyPr wrap="square" rtlCol="0">
+            <a:spAutoFit/>
+          </a:bodyPr>
+          <a:lstStyle/>
+          <a:p>
+            <a:r>
+              <a:rPr lang="fr-FR" b="1" dirty="0">
+                <a:latin typeface="Avenir Next LT Pro Light" panose="020B0304020202020204" pitchFamily="34" charset="0"/>
+              </a:rPr>
+              <a:t>1</a:t>
+            </a:r>
+          </a:p>
+        </p:txBody>
+      </p:sp>
+      <p:sp>
+        <p:nvSpPr>
+          <p:cNvPr id="21" name="ZoneTexte 20">
+            <a:extLst>
+              <a:ext uri="{FF2B5EF4-FFF2-40B4-BE49-F238E27FC236}">
+                <a16:creationId xmlns:a16="http://schemas.microsoft.com/office/drawing/2014/main" id="{8D99B675-D028-4CAA-812D-AC606CADEACB}"/>
+              </a:ext>
+            </a:extLst>
+          </p:cNvPr>
+          <p:cNvSpPr txBox="1"/>
+          <p:nvPr/>
+        </p:nvSpPr>
+        <p:spPr>
+          <a:xfrm>
+            <a:off x="2486754" y="3336561"/>
+            <a:ext cx="366858" cy="378728"/>
+          </a:xfrm>
+          <a:prstGeom prst="rect">
+            <a:avLst/>
+          </a:prstGeom>
+          <a:noFill/>
+        </p:spPr>
+        <p:txBody>
+          <a:bodyPr wrap="square" rtlCol="0">
+            <a:spAutoFit/>
+          </a:bodyPr>
+          <a:lstStyle/>
+          <a:p>
+            <a:r>
+              <a:rPr lang="fr-FR" b="1" dirty="0">
+                <a:latin typeface="Avenir Next LT Pro Light" panose="020B0304020202020204" pitchFamily="34" charset="0"/>
+              </a:rPr>
+              <a:t>2</a:t>
+            </a:r>
+          </a:p>
+        </p:txBody>
+      </p:sp>
+      <p:sp>
+        <p:nvSpPr>
+          <p:cNvPr id="22" name="ZoneTexte 21">
+            <a:extLst>
+              <a:ext uri="{FF2B5EF4-FFF2-40B4-BE49-F238E27FC236}">
+                <a16:creationId xmlns:a16="http://schemas.microsoft.com/office/drawing/2014/main" id="{68A22CF4-711C-431B-A10F-EBA8C9161E23}"/>
+              </a:ext>
+            </a:extLst>
+          </p:cNvPr>
+          <p:cNvSpPr txBox="1"/>
+          <p:nvPr/>
+        </p:nvSpPr>
+        <p:spPr>
+          <a:xfrm>
+            <a:off x="3441051" y="4123573"/>
+            <a:ext cx="366858" cy="378728"/>
+          </a:xfrm>
+          <a:prstGeom prst="rect">
+            <a:avLst/>
+          </a:prstGeom>
+          <a:noFill/>
+        </p:spPr>
+        <p:txBody>
+          <a:bodyPr wrap="square" rtlCol="0">
+            <a:spAutoFit/>
+          </a:bodyPr>
+          <a:lstStyle/>
+          <a:p>
+            <a:r>
+              <a:rPr lang="fr-FR" b="1" dirty="0">
+                <a:latin typeface="Avenir Next LT Pro Light" panose="020B0304020202020204" pitchFamily="34" charset="0"/>
+              </a:rPr>
+              <a:t>3</a:t>
+            </a:r>
+          </a:p>
+        </p:txBody>
+      </p:sp>
+      <p:sp>
+        <p:nvSpPr>
+          <p:cNvPr id="24" name="Arc 23">
+            <a:extLst>
+              <a:ext uri="{FF2B5EF4-FFF2-40B4-BE49-F238E27FC236}">
+                <a16:creationId xmlns:a16="http://schemas.microsoft.com/office/drawing/2014/main" id="{D9AD726B-3324-4E13-B399-0B08F784F6B6}"/>
+              </a:ext>
+            </a:extLst>
+          </p:cNvPr>
+          <p:cNvSpPr/>
+          <p:nvPr/>
+        </p:nvSpPr>
+        <p:spPr>
+          <a:xfrm rot="10396301">
+            <a:off x="975590" y="3519906"/>
+            <a:ext cx="519991" cy="534807"/>
+          </a:xfrm>
+          <a:prstGeom prst="arc">
+            <a:avLst>
+              <a:gd name="adj1" fmla="val 16200000"/>
+              <a:gd name="adj2" fmla="val 9101341"/>
+            </a:avLst>
+          </a:prstGeom>
+          <a:ln w="28575">
+            <a:headEnd type="none" w="med" len="med"/>
+            <a:tailEnd type="arrow" w="med" len="med"/>
+          </a:ln>
+        </p:spPr>
+        <p:style>
+          <a:lnRef idx="1">
+            <a:schemeClr val="dk1"/>
+          </a:lnRef>
+          <a:fillRef idx="0">
+            <a:schemeClr val="dk1"/>
+          </a:fillRef>
+          <a:effectRef idx="0">
+            <a:schemeClr val="dk1"/>
+          </a:effectRef>
+          <a:fontRef idx="minor">
+            <a:schemeClr val="tx1"/>
+          </a:fontRef>
+        </p:style>
+        <p:txBody>
+          <a:bodyPr rtlCol="0" anchor="ctr"/>
+          <a:lstStyle/>
+          <a:p>
+            <a:pPr algn="ctr"/>
+            <a:endParaRPr lang="fr-FR"/>
+          </a:p>
+        </p:txBody>
+      </p:sp>
+      <p:sp>
+        <p:nvSpPr>
+          <p:cNvPr id="25" name="Forme libre : forme 24">
+            <a:extLst>
+              <a:ext uri="{FF2B5EF4-FFF2-40B4-BE49-F238E27FC236}">
+                <a16:creationId xmlns:a16="http://schemas.microsoft.com/office/drawing/2014/main" id="{7CBCC2CE-DAC3-4815-8AAA-81BAB16A1610}"/>
+              </a:ext>
+            </a:extLst>
+          </p:cNvPr>
+          <p:cNvSpPr/>
+          <p:nvPr/>
+        </p:nvSpPr>
+        <p:spPr>
+          <a:xfrm>
+            <a:off x="1885361" y="3007151"/>
+            <a:ext cx="1442301" cy="791851"/>
+          </a:xfrm>
+          <a:custGeom>
+            <a:avLst/>
+            <a:gdLst>
+              <a:gd name="connsiteX0" fmla="*/ 0 w 1442301"/>
+              <a:gd name="connsiteY0" fmla="*/ 791851 h 791851"/>
+              <a:gd name="connsiteX1" fmla="*/ 923827 w 1442301"/>
+              <a:gd name="connsiteY1" fmla="*/ 631595 h 791851"/>
+              <a:gd name="connsiteX2" fmla="*/ 1442301 w 1442301"/>
+              <a:gd name="connsiteY2" fmla="*/ 0 h 791851"/>
+            </a:gdLst>
+            <a:ahLst/>
+            <a:cxnLst>
+              <a:cxn ang="0">
+                <a:pos x="connsiteX0" y="connsiteY0"/>
+              </a:cxn>
+              <a:cxn ang="0">
+                <a:pos x="connsiteX1" y="connsiteY1"/>
+              </a:cxn>
+              <a:cxn ang="0">
+                <a:pos x="connsiteX2" y="connsiteY2"/>
+              </a:cxn>
+            </a:cxnLst>
+            <a:rect l="l" t="t" r="r" b="b"/>
+            <a:pathLst>
+              <a:path w="1442301" h="791851">
+                <a:moveTo>
+                  <a:pt x="0" y="791851"/>
+                </a:moveTo>
+                <a:cubicBezTo>
+                  <a:pt x="341722" y="777710"/>
+                  <a:pt x="683444" y="763570"/>
+                  <a:pt x="923827" y="631595"/>
+                </a:cubicBezTo>
+                <a:cubicBezTo>
+                  <a:pt x="1164210" y="499620"/>
+                  <a:pt x="1303255" y="249810"/>
+                  <a:pt x="1442301" y="0"/>
+                </a:cubicBezTo>
+              </a:path>
+            </a:pathLst>
+          </a:custGeom>
+          <a:ln w="28575">
+            <a:headEnd type="none" w="med" len="med"/>
+            <a:tailEnd type="arrow" w="med" len="med"/>
+          </a:ln>
+        </p:spPr>
+        <p:style>
+          <a:lnRef idx="1">
+            <a:schemeClr val="dk1"/>
+          </a:lnRef>
+          <a:fillRef idx="0">
+            <a:schemeClr val="dk1"/>
+          </a:fillRef>
+          <a:effectRef idx="0">
+            <a:schemeClr val="dk1"/>
+          </a:effectRef>
+          <a:fontRef idx="minor">
+            <a:schemeClr val="tx1"/>
+          </a:fontRef>
+        </p:style>
+        <p:txBody>
+          <a:bodyPr rtlCol="0" anchor="ctr"/>
+          <a:lstStyle/>
+          <a:p>
+            <a:pPr algn="ctr"/>
+            <a:endParaRPr lang="fr-FR"/>
+          </a:p>
+        </p:txBody>
+      </p:sp>
+      <p:sp>
+        <p:nvSpPr>
+          <p:cNvPr id="26" name="Rectangle 25">
+            <a:extLst>
+              <a:ext uri="{FF2B5EF4-FFF2-40B4-BE49-F238E27FC236}">
+                <a16:creationId xmlns:a16="http://schemas.microsoft.com/office/drawing/2014/main" id="{587C4A9C-9868-4A15-97ED-0AE644CDC141}"/>
+              </a:ext>
+            </a:extLst>
+          </p:cNvPr>
+          <p:cNvSpPr/>
+          <p:nvPr/>
+        </p:nvSpPr>
+        <p:spPr>
+          <a:xfrm>
+            <a:off x="4432331" y="1608509"/>
+            <a:ext cx="3333164" cy="3028238"/>
+          </a:xfrm>
+          <a:prstGeom prst="rect">
+            <a:avLst/>
+          </a:prstGeom>
+          <a:solidFill>
+            <a:schemeClr val="accent5">
+              <a:lumMod val="20000"/>
+              <a:lumOff val="80000"/>
+            </a:schemeClr>
+          </a:solidFill>
+          <a:ln>
+            <a:solidFill>
+              <a:schemeClr val="accent5">
+                <a:lumMod val="50000"/>
+              </a:schemeClr>
+            </a:solidFill>
+          </a:ln>
+        </p:spPr>
+        <p:style>
+          <a:lnRef idx="2">
+            <a:schemeClr val="accent1">
+              <a:shade val="50000"/>
+            </a:schemeClr>
+          </a:lnRef>
+          <a:fillRef idx="1">
+            <a:schemeClr val="accent1"/>
+          </a:fillRef>
+          <a:effectRef idx="0">
+            <a:schemeClr val="accent1"/>
+          </a:effectRef>
+          <a:fontRef idx="minor">
+            <a:schemeClr val="lt1"/>
+          </a:fontRef>
+        </p:style>
+        <p:txBody>
+          <a:bodyPr rtlCol="0" anchor="ctr"/>
+          <a:lstStyle/>
+          <a:p>
+            <a:pPr algn="ctr"/>
+            <a:endParaRPr lang="fr-FR" dirty="0">
+              <a:latin typeface="Avenir Next LT Pro Light" panose="020B0304020202020204" pitchFamily="34" charset="0"/>
+            </a:endParaRPr>
+          </a:p>
+        </p:txBody>
+      </p:sp>
+      <p:sp>
+        <p:nvSpPr>
+          <p:cNvPr id="27" name="Ellipse 26">
+            <a:extLst>
+              <a:ext uri="{FF2B5EF4-FFF2-40B4-BE49-F238E27FC236}">
+                <a16:creationId xmlns:a16="http://schemas.microsoft.com/office/drawing/2014/main" id="{E3371FCA-45EE-428C-B09D-E064D405BE2C}"/>
+              </a:ext>
+            </a:extLst>
+          </p:cNvPr>
+          <p:cNvSpPr/>
+          <p:nvPr/>
+        </p:nvSpPr>
+        <p:spPr>
+          <a:xfrm>
+            <a:off x="4683085" y="3443727"/>
+            <a:ext cx="1046375" cy="1036948"/>
+          </a:xfrm>
+          <a:prstGeom prst="ellipse">
+            <a:avLst/>
+          </a:prstGeom>
+          <a:solidFill>
+            <a:schemeClr val="accent5">
+              <a:lumMod val="40000"/>
+              <a:lumOff val="60000"/>
+            </a:schemeClr>
+          </a:solidFill>
+          <a:ln>
+            <a:noFill/>
+          </a:ln>
+        </p:spPr>
+        <p:style>
+          <a:lnRef idx="2">
+            <a:schemeClr val="accent1">
+              <a:shade val="50000"/>
+            </a:schemeClr>
+          </a:lnRef>
+          <a:fillRef idx="1">
+            <a:schemeClr val="accent1"/>
+          </a:fillRef>
+          <a:effectRef idx="0">
+            <a:schemeClr val="accent1"/>
+          </a:effectRef>
+          <a:fontRef idx="minor">
+            <a:schemeClr val="lt1"/>
+          </a:fontRef>
+        </p:style>
+        <p:txBody>
+          <a:bodyPr rtlCol="0" anchor="ctr"/>
+          <a:lstStyle/>
+          <a:p>
+            <a:pPr algn="ctr"/>
+            <a:endParaRPr lang="fr-FR">
+              <a:latin typeface="Avenir Next LT Pro Light" panose="020B0304020202020204" pitchFamily="34" charset="0"/>
+            </a:endParaRPr>
+          </a:p>
+        </p:txBody>
+      </p:sp>
+      <p:sp>
+        <p:nvSpPr>
+          <p:cNvPr id="31" name="Forme libre : forme 30">
+            <a:extLst>
+              <a:ext uri="{FF2B5EF4-FFF2-40B4-BE49-F238E27FC236}">
+                <a16:creationId xmlns:a16="http://schemas.microsoft.com/office/drawing/2014/main" id="{D72C66BB-A146-48FB-B374-9453A02A87BA}"/>
+              </a:ext>
+            </a:extLst>
+          </p:cNvPr>
+          <p:cNvSpPr/>
+          <p:nvPr/>
+        </p:nvSpPr>
+        <p:spPr>
+          <a:xfrm rot="21431949">
+            <a:off x="1944961" y="4086888"/>
+            <a:ext cx="3243631" cy="376137"/>
+          </a:xfrm>
+          <a:custGeom>
+            <a:avLst/>
+            <a:gdLst>
+              <a:gd name="connsiteX0" fmla="*/ 0 w 3638746"/>
+              <a:gd name="connsiteY0" fmla="*/ 169683 h 1207709"/>
+              <a:gd name="connsiteX1" fmla="*/ 2121031 w 3638746"/>
+              <a:gd name="connsiteY1" fmla="*/ 1206631 h 1207709"/>
+              <a:gd name="connsiteX2" fmla="*/ 3638746 w 3638746"/>
+              <a:gd name="connsiteY2" fmla="*/ 0 h 1207709"/>
+            </a:gdLst>
+            <a:ahLst/>
+            <a:cxnLst>
+              <a:cxn ang="0">
+                <a:pos x="connsiteX0" y="connsiteY0"/>
+              </a:cxn>
+              <a:cxn ang="0">
+                <a:pos x="connsiteX1" y="connsiteY1"/>
+              </a:cxn>
+              <a:cxn ang="0">
+                <a:pos x="connsiteX2" y="connsiteY2"/>
+              </a:cxn>
+            </a:cxnLst>
+            <a:rect l="l" t="t" r="r" b="b"/>
+            <a:pathLst>
+              <a:path w="3638746" h="1207709">
+                <a:moveTo>
+                  <a:pt x="0" y="169683"/>
+                </a:moveTo>
+                <a:cubicBezTo>
+                  <a:pt x="757286" y="702297"/>
+                  <a:pt x="1514573" y="1234912"/>
+                  <a:pt x="2121031" y="1206631"/>
+                </a:cubicBezTo>
+                <a:cubicBezTo>
+                  <a:pt x="2727489" y="1178351"/>
+                  <a:pt x="3183117" y="589175"/>
+                  <a:pt x="3638746" y="0"/>
+                </a:cubicBezTo>
+              </a:path>
+            </a:pathLst>
+          </a:custGeom>
+          <a:ln w="28575">
+            <a:headEnd type="none" w="med" len="med"/>
+            <a:tailEnd type="arrow" w="med" len="med"/>
+          </a:ln>
+        </p:spPr>
+        <p:style>
+          <a:lnRef idx="1">
+            <a:schemeClr val="dk1"/>
+          </a:lnRef>
+          <a:fillRef idx="0">
+            <a:schemeClr val="dk1"/>
+          </a:fillRef>
+          <a:effectRef idx="0">
+            <a:schemeClr val="dk1"/>
+          </a:effectRef>
+          <a:fontRef idx="minor">
+            <a:schemeClr val="tx1"/>
+          </a:fontRef>
+        </p:style>
+        <p:txBody>
+          <a:bodyPr rtlCol="0" anchor="ctr"/>
+          <a:lstStyle/>
+          <a:p>
+            <a:pPr algn="ctr"/>
+            <a:endParaRPr lang="fr-FR"/>
+          </a:p>
+        </p:txBody>
+      </p:sp>
+      <p:sp>
+        <p:nvSpPr>
+          <p:cNvPr id="40" name="ZoneTexte 39">
+            <a:extLst>
+              <a:ext uri="{FF2B5EF4-FFF2-40B4-BE49-F238E27FC236}">
+                <a16:creationId xmlns:a16="http://schemas.microsoft.com/office/drawing/2014/main" id="{2D168642-7510-4B01-88CE-2959C8B45FEE}"/>
+              </a:ext>
+            </a:extLst>
+          </p:cNvPr>
+          <p:cNvSpPr txBox="1"/>
+          <p:nvPr/>
+        </p:nvSpPr>
+        <p:spPr>
+          <a:xfrm>
+            <a:off x="4416400" y="1236642"/>
+            <a:ext cx="2891800" cy="369332"/>
+          </a:xfrm>
+          <a:prstGeom prst="rect">
+            <a:avLst/>
+          </a:prstGeom>
+          <a:noFill/>
+        </p:spPr>
+        <p:txBody>
+          <a:bodyPr wrap="square" rtlCol="0">
+            <a:spAutoFit/>
+          </a:bodyPr>
+          <a:lstStyle/>
+          <a:p>
+            <a:r>
+              <a:rPr lang="fr-FR" dirty="0">
+                <a:latin typeface="Avenir Next LT Pro Light" panose="020B0304020202020204" pitchFamily="34" charset="0"/>
+              </a:rPr>
+              <a:t>Conservation unit 2</a:t>
+            </a:r>
+          </a:p>
+        </p:txBody>
+      </p:sp>
+      <p:pic>
+        <p:nvPicPr>
+          <p:cNvPr id="43" name="Image 42">
+            <a:extLst>
+              <a:ext uri="{FF2B5EF4-FFF2-40B4-BE49-F238E27FC236}">
+                <a16:creationId xmlns:a16="http://schemas.microsoft.com/office/drawing/2014/main" id="{EA98886B-BFA3-48F0-B887-069A36B55075}"/>
+              </a:ext>
+            </a:extLst>
+          </p:cNvPr>
+          <p:cNvPicPr>
+            <a:picLocks noChangeAspect="1"/>
+          </p:cNvPicPr>
+          <p:nvPr/>
+        </p:nvPicPr>
+        <p:blipFill>
+          <a:blip r:embed="rId2">
+            <a:extLst>
+              <a:ext uri="{BEBA8EAE-BF5A-486C-A8C5-ECC9F3942E4B}">
+                <a14:imgProps xmlns:a14="http://schemas.microsoft.com/office/drawing/2010/main">
+                  <a14:imgLayer r:embed="rId3">
+                    <a14:imgEffect>
+                      <a14:backgroundRemoval t="10000" b="90000" l="10000" r="90000"/>
+                    </a14:imgEffect>
+                  </a14:imgLayer>
+                </a14:imgProps>
+              </a:ext>
+              <a:ext uri="{28A0092B-C50C-407E-A947-70E740481C1C}">
+                <a14:useLocalDpi xmlns:a14="http://schemas.microsoft.com/office/drawing/2010/main" val="0"/>
+              </a:ext>
+            </a:extLst>
+          </a:blip>
+          <a:stretch>
+            <a:fillRect/>
+          </a:stretch>
+        </p:blipFill>
+        <p:spPr>
+          <a:xfrm>
+            <a:off x="1245339" y="3733403"/>
+            <a:ext cx="653707" cy="457595"/>
+          </a:xfrm>
+          <a:prstGeom prst="rect">
+            <a:avLst/>
+          </a:prstGeom>
+        </p:spPr>
+      </p:pic>
+      <p:sp>
+        <p:nvSpPr>
+          <p:cNvPr id="44" name="ZoneTexte 43">
+            <a:extLst>
+              <a:ext uri="{FF2B5EF4-FFF2-40B4-BE49-F238E27FC236}">
+                <a16:creationId xmlns:a16="http://schemas.microsoft.com/office/drawing/2014/main" id="{755AB8E1-2DBB-4039-A786-4BB43AA03D29}"/>
+              </a:ext>
+            </a:extLst>
+          </p:cNvPr>
+          <p:cNvSpPr txBox="1"/>
+          <p:nvPr/>
+        </p:nvSpPr>
+        <p:spPr>
+          <a:xfrm>
+            <a:off x="1454042" y="4169802"/>
+            <a:ext cx="304926" cy="307777"/>
+          </a:xfrm>
+          <a:prstGeom prst="rect">
+            <a:avLst/>
+          </a:prstGeom>
+        </p:spPr>
+        <p:style>
+          <a:lnRef idx="1">
+            <a:schemeClr val="accent4"/>
+          </a:lnRef>
+          <a:fillRef idx="2">
+            <a:schemeClr val="accent4"/>
+          </a:fillRef>
+          <a:effectRef idx="1">
+            <a:schemeClr val="accent4"/>
+          </a:effectRef>
+          <a:fontRef idx="minor">
+            <a:schemeClr val="dk1"/>
+          </a:fontRef>
+        </p:style>
+        <p:txBody>
+          <a:bodyPr wrap="square" rtlCol="0">
+            <a:spAutoFit/>
+          </a:bodyPr>
+          <a:lstStyle/>
+          <a:p>
+            <a:pPr algn="ctr"/>
+            <a:r>
+              <a:rPr lang="fr-FR" sz="1400" dirty="0">
+                <a:latin typeface="Abadi Extra Light" panose="020B0204020104020204" pitchFamily="34" charset="0"/>
+              </a:rPr>
+              <a:t>1</a:t>
+            </a:r>
+          </a:p>
+        </p:txBody>
+      </p:sp>
+      <p:sp>
+        <p:nvSpPr>
+          <p:cNvPr id="45" name="ZoneTexte 44">
+            <a:extLst>
+              <a:ext uri="{FF2B5EF4-FFF2-40B4-BE49-F238E27FC236}">
+                <a16:creationId xmlns:a16="http://schemas.microsoft.com/office/drawing/2014/main" id="{03BC7F49-C51E-410A-B7BC-B52577FAA0EB}"/>
+              </a:ext>
+            </a:extLst>
+          </p:cNvPr>
+          <p:cNvSpPr txBox="1"/>
+          <p:nvPr/>
+        </p:nvSpPr>
+        <p:spPr>
+          <a:xfrm>
+            <a:off x="3343593" y="2653030"/>
+            <a:ext cx="274678" cy="307777"/>
+          </a:xfrm>
+          <a:prstGeom prst="rect">
+            <a:avLst/>
+          </a:prstGeom>
+        </p:spPr>
+        <p:style>
+          <a:lnRef idx="1">
+            <a:schemeClr val="accent2"/>
+          </a:lnRef>
+          <a:fillRef idx="2">
+            <a:schemeClr val="accent2"/>
+          </a:fillRef>
+          <a:effectRef idx="1">
+            <a:schemeClr val="accent2"/>
+          </a:effectRef>
+          <a:fontRef idx="minor">
+            <a:schemeClr val="dk1"/>
+          </a:fontRef>
+        </p:style>
+        <p:txBody>
+          <a:bodyPr wrap="square" rtlCol="0">
+            <a:spAutoFit/>
+          </a:bodyPr>
+          <a:lstStyle/>
+          <a:p>
+            <a:pPr algn="ctr"/>
+            <a:r>
+              <a:rPr lang="fr-FR" sz="1400" dirty="0">
+                <a:latin typeface="Abadi Extra Light" panose="020B0204020104020204" pitchFamily="34" charset="0"/>
+              </a:rPr>
+              <a:t>1</a:t>
+            </a:r>
+          </a:p>
+        </p:txBody>
+      </p:sp>
+      <p:sp>
+        <p:nvSpPr>
+          <p:cNvPr id="46" name="ZoneTexte 45">
+            <a:extLst>
+              <a:ext uri="{FF2B5EF4-FFF2-40B4-BE49-F238E27FC236}">
+                <a16:creationId xmlns:a16="http://schemas.microsoft.com/office/drawing/2014/main" id="{5DA40449-3C90-4FD4-B35A-313CB6CA5D17}"/>
+              </a:ext>
+            </a:extLst>
+          </p:cNvPr>
+          <p:cNvSpPr txBox="1"/>
+          <p:nvPr/>
+        </p:nvSpPr>
+        <p:spPr>
+          <a:xfrm>
+            <a:off x="4771573" y="3610115"/>
+            <a:ext cx="893904" cy="307777"/>
+          </a:xfrm>
+          <a:prstGeom prst="rect">
+            <a:avLst/>
+          </a:prstGeom>
+        </p:spPr>
+        <p:style>
+          <a:lnRef idx="1">
+            <a:schemeClr val="accent1"/>
+          </a:lnRef>
+          <a:fillRef idx="2">
+            <a:schemeClr val="accent1"/>
+          </a:fillRef>
+          <a:effectRef idx="1">
+            <a:schemeClr val="accent1"/>
+          </a:effectRef>
+          <a:fontRef idx="minor">
+            <a:schemeClr val="dk1"/>
+          </a:fontRef>
+        </p:style>
+        <p:txBody>
+          <a:bodyPr wrap="square" rtlCol="0">
+            <a:spAutoFit/>
+          </a:bodyPr>
+          <a:lstStyle/>
+          <a:p>
+            <a:pPr algn="ctr"/>
+            <a:r>
+              <a:rPr lang="fr-FR" sz="1400" dirty="0">
+                <a:latin typeface="Abadi Extra Light" panose="020B0204020104020204" pitchFamily="34" charset="0"/>
+              </a:rPr>
+              <a:t>0,7±0,1</a:t>
+            </a:r>
+          </a:p>
+        </p:txBody>
+      </p:sp>
+      <p:sp>
+        <p:nvSpPr>
+          <p:cNvPr id="47" name="ZoneTexte 46">
+            <a:extLst>
+              <a:ext uri="{FF2B5EF4-FFF2-40B4-BE49-F238E27FC236}">
+                <a16:creationId xmlns:a16="http://schemas.microsoft.com/office/drawing/2014/main" id="{3030A54B-3E34-4908-A448-C67BF31BC536}"/>
+              </a:ext>
+            </a:extLst>
+          </p:cNvPr>
+          <p:cNvSpPr txBox="1"/>
+          <p:nvPr/>
+        </p:nvSpPr>
+        <p:spPr>
+          <a:xfrm>
+            <a:off x="599768" y="422787"/>
+            <a:ext cx="8898193" cy="523220"/>
+          </a:xfrm>
+          <a:prstGeom prst="rect">
+            <a:avLst/>
+          </a:prstGeom>
+          <a:noFill/>
+        </p:spPr>
+        <p:txBody>
+          <a:bodyPr wrap="square" rtlCol="0">
+            <a:spAutoFit/>
+          </a:bodyPr>
+          <a:lstStyle/>
+          <a:p>
+            <a:r>
+              <a:rPr lang="fr-FR" sz="2800" dirty="0" err="1"/>
+              <a:t>Resighting</a:t>
+            </a:r>
+            <a:r>
+              <a:rPr lang="fr-FR" sz="2800" dirty="0"/>
+              <a:t> </a:t>
+            </a:r>
+            <a:r>
+              <a:rPr lang="fr-FR" sz="2800" dirty="0" err="1"/>
+              <a:t>probabilities</a:t>
+            </a:r>
+            <a:endParaRPr lang="fr-FR" sz="2800" dirty="0"/>
+          </a:p>
+        </p:txBody>
+      </p:sp>
+    </p:spTree>
+    <p:extLst>
+      <p:ext uri="{BB962C8B-B14F-4D97-AF65-F5344CB8AC3E}">
+        <p14:creationId xmlns:p14="http://schemas.microsoft.com/office/powerpoint/2010/main" val="1242003810"/>
+      </p:ext>
+    </p:extLst>
+  </p:cSld>
+  <p:clrMapOvr>
+    <a:masterClrMapping/>
+  </p:clrMapOvr>
+</p:sld>
+</file>
+
+<file path=ppt/slides/slide8.xml><?xml version="1.0" encoding="utf-8"?>
+<p:sld xmlns:a="http://schemas.openxmlformats.org/drawingml/2006/main" xmlns:r="http://schemas.openxmlformats.org/officeDocument/2006/relationships" xmlns:p="http://schemas.openxmlformats.org/presentationml/2006/main">
+  <p:cSld>
+    <p:spTree>
+      <p:nvGrpSpPr>
+        <p:cNvPr id="1" name=""/>
+        <p:cNvGrpSpPr/>
+        <p:nvPr/>
+      </p:nvGrpSpPr>
+      <p:grpSpPr>
+        <a:xfrm>
+          <a:off x="0" y="0"/>
+          <a:ext cx="0" cy="0"/>
+          <a:chOff x="0" y="0"/>
+          <a:chExt cx="0" cy="0"/>
+        </a:xfrm>
+      </p:grpSpPr>
+      <p:sp>
+        <p:nvSpPr>
+          <p:cNvPr id="2" name="Titre 1">
+            <a:extLst>
+              <a:ext uri="{FF2B5EF4-FFF2-40B4-BE49-F238E27FC236}">
+                <a16:creationId xmlns:a16="http://schemas.microsoft.com/office/drawing/2014/main" id="{A4BEC0F1-75C7-45F0-8218-09EB2EF90F7B}"/>
+              </a:ext>
+            </a:extLst>
+          </p:cNvPr>
+          <p:cNvSpPr>
+            <a:spLocks noGrp="1"/>
+          </p:cNvSpPr>
+          <p:nvPr>
+            <p:ph type="title"/>
+          </p:nvPr>
+        </p:nvSpPr>
+        <p:spPr/>
+        <p:txBody>
+          <a:bodyPr/>
+          <a:lstStyle/>
+          <a:p>
+            <a:endParaRPr lang="fr-FR"/>
+          </a:p>
+        </p:txBody>
+      </p:sp>
+      <p:sp>
+        <p:nvSpPr>
+          <p:cNvPr id="3" name="Espace réservé du contenu 2">
+            <a:extLst>
+              <a:ext uri="{FF2B5EF4-FFF2-40B4-BE49-F238E27FC236}">
+                <a16:creationId xmlns:a16="http://schemas.microsoft.com/office/drawing/2014/main" id="{96874A39-2B53-40ED-9E7F-0AE3BFA31431}"/>
+              </a:ext>
+            </a:extLst>
+          </p:cNvPr>
+          <p:cNvSpPr>
+            <a:spLocks noGrp="1"/>
+          </p:cNvSpPr>
+          <p:nvPr>
+            <p:ph idx="1"/>
+          </p:nvPr>
+        </p:nvSpPr>
+        <p:spPr/>
+        <p:txBody>
+          <a:bodyPr/>
+          <a:lstStyle/>
+          <a:p>
+            <a:r>
+              <a:rPr lang="fr-FR" dirty="0"/>
+              <a:t>Try to </a:t>
+            </a:r>
+            <a:r>
+              <a:rPr lang="fr-FR" dirty="0" err="1"/>
+              <a:t>add</a:t>
+            </a:r>
+            <a:r>
+              <a:rPr lang="fr-FR" dirty="0"/>
+              <a:t> </a:t>
+            </a:r>
+            <a:r>
+              <a:rPr lang="fr-FR" dirty="0" err="1"/>
+              <a:t>co-variate</a:t>
+            </a:r>
+            <a:r>
+              <a:rPr lang="fr-FR" dirty="0"/>
+              <a:t> </a:t>
+            </a:r>
+            <a:r>
+              <a:rPr lang="fr-FR" dirty="0" err="1"/>
+              <a:t>density</a:t>
+            </a:r>
+            <a:endParaRPr lang="fr-FR" dirty="0"/>
+          </a:p>
+          <a:p>
+            <a:r>
+              <a:rPr lang="fr-FR" dirty="0"/>
+              <a:t>Distance </a:t>
+            </a:r>
+            <a:r>
+              <a:rPr lang="fr-FR" dirty="0" err="1"/>
+              <a:t>from</a:t>
+            </a:r>
+            <a:r>
+              <a:rPr lang="fr-FR" dirty="0"/>
+              <a:t> groups</a:t>
+            </a:r>
+          </a:p>
+          <a:p>
+            <a:endParaRPr lang="fr-FR" dirty="0"/>
+          </a:p>
+          <a:p>
+            <a:r>
+              <a:rPr lang="fr-FR" dirty="0"/>
+              <a:t>Binomial model </a:t>
+            </a:r>
+            <a:r>
+              <a:rPr lang="fr-FR" dirty="0" err="1"/>
+              <a:t>linking</a:t>
+            </a:r>
+            <a:r>
+              <a:rPr lang="fr-FR" dirty="0"/>
+              <a:t> </a:t>
+            </a:r>
+            <a:r>
+              <a:rPr lang="fr-FR" dirty="0" err="1"/>
+              <a:t>individual</a:t>
+            </a:r>
+            <a:r>
+              <a:rPr lang="fr-FR" dirty="0"/>
+              <a:t> dispersal to fragment size, group size  </a:t>
+            </a:r>
+            <a:r>
+              <a:rPr lang="fr-FR" dirty="0" err="1"/>
+              <a:t>based</a:t>
+            </a:r>
+            <a:r>
+              <a:rPr lang="fr-FR" dirty="0"/>
+              <a:t> on the 2 </a:t>
+            </a:r>
+            <a:r>
+              <a:rPr lang="fr-FR" dirty="0" err="1"/>
+              <a:t>periods</a:t>
+            </a:r>
+            <a:r>
+              <a:rPr lang="fr-FR" dirty="0"/>
+              <a:t> (</a:t>
+            </a:r>
+            <a:r>
+              <a:rPr lang="fr-FR" dirty="0" err="1"/>
+              <a:t>outbreak</a:t>
+            </a:r>
+            <a:r>
+              <a:rPr lang="fr-FR" dirty="0"/>
+              <a:t> or not, distance to </a:t>
+            </a:r>
+            <a:r>
+              <a:rPr lang="fr-FR" dirty="0" err="1"/>
+              <a:t>neighbours</a:t>
+            </a:r>
+            <a:r>
+              <a:rPr lang="fr-FR" dirty="0"/>
+              <a:t>); </a:t>
+            </a:r>
+            <a:r>
+              <a:rPr lang="fr-FR" dirty="0" err="1"/>
+              <a:t>random</a:t>
+            </a:r>
+            <a:r>
+              <a:rPr lang="fr-FR" dirty="0"/>
+              <a:t> </a:t>
+            </a:r>
+            <a:r>
+              <a:rPr lang="fr-FR" dirty="0" err="1"/>
+              <a:t>effect</a:t>
+            </a:r>
+            <a:r>
+              <a:rPr lang="fr-FR" dirty="0"/>
+              <a:t> on conservation </a:t>
+            </a:r>
+            <a:r>
+              <a:rPr lang="fr-FR" dirty="0" err="1"/>
+              <a:t>region</a:t>
+            </a:r>
+            <a:r>
+              <a:rPr lang="fr-FR" dirty="0"/>
+              <a:t>.</a:t>
+            </a:r>
+          </a:p>
+          <a:p>
+            <a:r>
+              <a:rPr lang="fr-FR" dirty="0"/>
+              <a:t>Check </a:t>
+            </a:r>
+            <a:r>
+              <a:rPr lang="fr-FR" dirty="0" err="1"/>
+              <a:t>correlated</a:t>
+            </a:r>
+            <a:r>
+              <a:rPr lang="fr-FR" dirty="0"/>
+              <a:t> variables</a:t>
+            </a:r>
+          </a:p>
+          <a:p>
+            <a:r>
+              <a:rPr lang="fr-FR" dirty="0"/>
+              <a:t>Check </a:t>
+            </a:r>
+            <a:r>
+              <a:rPr lang="fr-FR" dirty="0" err="1"/>
+              <a:t>with</a:t>
+            </a:r>
+            <a:r>
+              <a:rPr lang="fr-FR" dirty="0"/>
+              <a:t> Alexandre</a:t>
+            </a:r>
+          </a:p>
+          <a:p>
+            <a:endParaRPr lang="fr-FR" dirty="0"/>
+          </a:p>
+        </p:txBody>
+      </p:sp>
+    </p:spTree>
+    <p:extLst>
+      <p:ext uri="{BB962C8B-B14F-4D97-AF65-F5344CB8AC3E}">
+        <p14:creationId xmlns:p14="http://schemas.microsoft.com/office/powerpoint/2010/main" val="1303610086"/>
+      </p:ext>
+    </p:extLst>
+  </p:cSld>
+  <p:clrMapOvr>
+    <a:masterClrMapping/>
+  </p:clrMapOvr>
+</p:sld>
+</file>
+
+<file path=ppt/slides/slide9.xml><?xml version="1.0" encoding="utf-8"?>
+<p:sld xmlns:a="http://schemas.openxmlformats.org/drawingml/2006/main" xmlns:r="http://schemas.openxmlformats.org/officeDocument/2006/relationships" xmlns:p="http://schemas.openxmlformats.org/presentationml/2006/main">
+  <p:cSld>
+    <p:spTree>
+      <p:nvGrpSpPr>
+        <p:cNvPr id="1" name=""/>
+        <p:cNvGrpSpPr/>
+        <p:nvPr/>
+      </p:nvGrpSpPr>
+      <p:grpSpPr>
+        <a:xfrm>
+          <a:off x="0" y="0"/>
+          <a:ext cx="0" cy="0"/>
+          <a:chOff x="0" y="0"/>
+          <a:chExt cx="0" cy="0"/>
+        </a:xfrm>
+      </p:grpSpPr>
+      <p:sp>
+        <p:nvSpPr>
+          <p:cNvPr id="2" name="Titre 1">
+            <a:extLst>
+              <a:ext uri="{FF2B5EF4-FFF2-40B4-BE49-F238E27FC236}">
+                <a16:creationId xmlns:a16="http://schemas.microsoft.com/office/drawing/2014/main" id="{08DFEB33-E721-4260-9EBB-AD68A5173C72}"/>
+              </a:ext>
+            </a:extLst>
+          </p:cNvPr>
+          <p:cNvSpPr>
+            <a:spLocks noGrp="1"/>
+          </p:cNvSpPr>
+          <p:nvPr>
+            <p:ph type="title"/>
+          </p:nvPr>
+        </p:nvSpPr>
+        <p:spPr/>
+        <p:txBody>
+          <a:bodyPr/>
+          <a:lstStyle/>
+          <a:p>
+            <a:endParaRPr lang="fr-FR"/>
+          </a:p>
+        </p:txBody>
+      </p:sp>
+      <p:sp>
+        <p:nvSpPr>
+          <p:cNvPr id="3" name="Espace réservé du contenu 2">
+            <a:extLst>
+              <a:ext uri="{FF2B5EF4-FFF2-40B4-BE49-F238E27FC236}">
+                <a16:creationId xmlns:a16="http://schemas.microsoft.com/office/drawing/2014/main" id="{7B24D4DC-74C0-4D81-B275-D883826FD838}"/>
+              </a:ext>
+            </a:extLst>
+          </p:cNvPr>
+          <p:cNvSpPr>
+            <a:spLocks noGrp="1"/>
+          </p:cNvSpPr>
+          <p:nvPr>
+            <p:ph idx="1"/>
+          </p:nvPr>
+        </p:nvSpPr>
+        <p:spPr/>
+        <p:txBody>
+          <a:bodyPr/>
+          <a:lstStyle/>
+          <a:p>
+            <a:r>
+              <a:rPr lang="fr-FR" dirty="0" err="1"/>
+              <a:t>eff</a:t>
+            </a:r>
+            <a:endParaRPr lang="fr-FR" dirty="0"/>
+          </a:p>
+        </p:txBody>
+      </p:sp>
+    </p:spTree>
+    <p:extLst>
+      <p:ext uri="{BB962C8B-B14F-4D97-AF65-F5344CB8AC3E}">
+        <p14:creationId xmlns:p14="http://schemas.microsoft.com/office/powerpoint/2010/main" val="457285405"/>
       </p:ext>
     </p:extLst>
   </p:cSld>

</xml_diff>